<commit_message>
Added animations to Lab 1 and added JS code to turn animations on/off by pressing "t"
</commit_message>
<xml_diff>
--- a/Poster/Regression Lab Poster.pptx
+++ b/Poster/Regression Lab Poster.pptx
@@ -243,7 +243,7 @@
           <a:p>
             <a:fld id="{49A02A90-E5B2-4178-83FD-9ED89742CA66}" type="datetimeFigureOut">
               <a:rPr lang="en-US" smtClean="0"/>
-              <a:t>12/27/2024</a:t>
+              <a:t>1/5/2025</a:t>
             </a:fld>
             <a:endParaRPr lang="en-US"/>
           </a:p>
@@ -413,7 +413,7 @@
           <a:p>
             <a:fld id="{49A02A90-E5B2-4178-83FD-9ED89742CA66}" type="datetimeFigureOut">
               <a:rPr lang="en-US" smtClean="0"/>
-              <a:t>12/27/2024</a:t>
+              <a:t>1/5/2025</a:t>
             </a:fld>
             <a:endParaRPr lang="en-US"/>
           </a:p>
@@ -593,7 +593,7 @@
           <a:p>
             <a:fld id="{49A02A90-E5B2-4178-83FD-9ED89742CA66}" type="datetimeFigureOut">
               <a:rPr lang="en-US" smtClean="0"/>
-              <a:t>12/27/2024</a:t>
+              <a:t>1/5/2025</a:t>
             </a:fld>
             <a:endParaRPr lang="en-US"/>
           </a:p>
@@ -763,7 +763,7 @@
           <a:p>
             <a:fld id="{49A02A90-E5B2-4178-83FD-9ED89742CA66}" type="datetimeFigureOut">
               <a:rPr lang="en-US" smtClean="0"/>
-              <a:t>12/27/2024</a:t>
+              <a:t>1/5/2025</a:t>
             </a:fld>
             <a:endParaRPr lang="en-US"/>
           </a:p>
@@ -1007,7 +1007,7 @@
           <a:p>
             <a:fld id="{49A02A90-E5B2-4178-83FD-9ED89742CA66}" type="datetimeFigureOut">
               <a:rPr lang="en-US" smtClean="0"/>
-              <a:t>12/27/2024</a:t>
+              <a:t>1/5/2025</a:t>
             </a:fld>
             <a:endParaRPr lang="en-US"/>
           </a:p>
@@ -1239,7 +1239,7 @@
           <a:p>
             <a:fld id="{49A02A90-E5B2-4178-83FD-9ED89742CA66}" type="datetimeFigureOut">
               <a:rPr lang="en-US" smtClean="0"/>
-              <a:t>12/27/2024</a:t>
+              <a:t>1/5/2025</a:t>
             </a:fld>
             <a:endParaRPr lang="en-US"/>
           </a:p>
@@ -1606,7 +1606,7 @@
           <a:p>
             <a:fld id="{49A02A90-E5B2-4178-83FD-9ED89742CA66}" type="datetimeFigureOut">
               <a:rPr lang="en-US" smtClean="0"/>
-              <a:t>12/27/2024</a:t>
+              <a:t>1/5/2025</a:t>
             </a:fld>
             <a:endParaRPr lang="en-US"/>
           </a:p>
@@ -1724,7 +1724,7 @@
           <a:p>
             <a:fld id="{49A02A90-E5B2-4178-83FD-9ED89742CA66}" type="datetimeFigureOut">
               <a:rPr lang="en-US" smtClean="0"/>
-              <a:t>12/27/2024</a:t>
+              <a:t>1/5/2025</a:t>
             </a:fld>
             <a:endParaRPr lang="en-US"/>
           </a:p>
@@ -1819,7 +1819,7 @@
           <a:p>
             <a:fld id="{49A02A90-E5B2-4178-83FD-9ED89742CA66}" type="datetimeFigureOut">
               <a:rPr lang="en-US" smtClean="0"/>
-              <a:t>12/27/2024</a:t>
+              <a:t>1/5/2025</a:t>
             </a:fld>
             <a:endParaRPr lang="en-US"/>
           </a:p>
@@ -2096,7 +2096,7 @@
           <a:p>
             <a:fld id="{49A02A90-E5B2-4178-83FD-9ED89742CA66}" type="datetimeFigureOut">
               <a:rPr lang="en-US" smtClean="0"/>
-              <a:t>12/27/2024</a:t>
+              <a:t>1/5/2025</a:t>
             </a:fld>
             <a:endParaRPr lang="en-US"/>
           </a:p>
@@ -2353,7 +2353,7 @@
           <a:p>
             <a:fld id="{49A02A90-E5B2-4178-83FD-9ED89742CA66}" type="datetimeFigureOut">
               <a:rPr lang="en-US" smtClean="0"/>
-              <a:t>12/27/2024</a:t>
+              <a:t>1/5/2025</a:t>
             </a:fld>
             <a:endParaRPr lang="en-US"/>
           </a:p>
@@ -2566,7 +2566,7 @@
           <a:p>
             <a:fld id="{49A02A90-E5B2-4178-83FD-9ED89742CA66}" type="datetimeFigureOut">
               <a:rPr lang="en-US" smtClean="0"/>
-              <a:t>12/27/2024</a:t>
+              <a:t>1/5/2025</a:t>
             </a:fld>
             <a:endParaRPr lang="en-US"/>
           </a:p>

</xml_diff>

<commit_message>
Added lab activities folder
</commit_message>
<xml_diff>
--- a/Poster/Regression Lab Poster.pptx
+++ b/Poster/Regression Lab Poster.pptx
@@ -243,7 +243,7 @@
           <a:p>
             <a:fld id="{49A02A90-E5B2-4178-83FD-9ED89742CA66}" type="datetimeFigureOut">
               <a:rPr lang="en-US" smtClean="0"/>
-              <a:t>1/5/2025</a:t>
+              <a:t>1/15/2025</a:t>
             </a:fld>
             <a:endParaRPr lang="en-US"/>
           </a:p>
@@ -413,7 +413,7 @@
           <a:p>
             <a:fld id="{49A02A90-E5B2-4178-83FD-9ED89742CA66}" type="datetimeFigureOut">
               <a:rPr lang="en-US" smtClean="0"/>
-              <a:t>1/5/2025</a:t>
+              <a:t>1/15/2025</a:t>
             </a:fld>
             <a:endParaRPr lang="en-US"/>
           </a:p>
@@ -593,7 +593,7 @@
           <a:p>
             <a:fld id="{49A02A90-E5B2-4178-83FD-9ED89742CA66}" type="datetimeFigureOut">
               <a:rPr lang="en-US" smtClean="0"/>
-              <a:t>1/5/2025</a:t>
+              <a:t>1/15/2025</a:t>
             </a:fld>
             <a:endParaRPr lang="en-US"/>
           </a:p>
@@ -763,7 +763,7 @@
           <a:p>
             <a:fld id="{49A02A90-E5B2-4178-83FD-9ED89742CA66}" type="datetimeFigureOut">
               <a:rPr lang="en-US" smtClean="0"/>
-              <a:t>1/5/2025</a:t>
+              <a:t>1/15/2025</a:t>
             </a:fld>
             <a:endParaRPr lang="en-US"/>
           </a:p>
@@ -1007,7 +1007,7 @@
           <a:p>
             <a:fld id="{49A02A90-E5B2-4178-83FD-9ED89742CA66}" type="datetimeFigureOut">
               <a:rPr lang="en-US" smtClean="0"/>
-              <a:t>1/5/2025</a:t>
+              <a:t>1/15/2025</a:t>
             </a:fld>
             <a:endParaRPr lang="en-US"/>
           </a:p>
@@ -1239,7 +1239,7 @@
           <a:p>
             <a:fld id="{49A02A90-E5B2-4178-83FD-9ED89742CA66}" type="datetimeFigureOut">
               <a:rPr lang="en-US" smtClean="0"/>
-              <a:t>1/5/2025</a:t>
+              <a:t>1/15/2025</a:t>
             </a:fld>
             <a:endParaRPr lang="en-US"/>
           </a:p>
@@ -1606,7 +1606,7 @@
           <a:p>
             <a:fld id="{49A02A90-E5B2-4178-83FD-9ED89742CA66}" type="datetimeFigureOut">
               <a:rPr lang="en-US" smtClean="0"/>
-              <a:t>1/5/2025</a:t>
+              <a:t>1/15/2025</a:t>
             </a:fld>
             <a:endParaRPr lang="en-US"/>
           </a:p>
@@ -1724,7 +1724,7 @@
           <a:p>
             <a:fld id="{49A02A90-E5B2-4178-83FD-9ED89742CA66}" type="datetimeFigureOut">
               <a:rPr lang="en-US" smtClean="0"/>
-              <a:t>1/5/2025</a:t>
+              <a:t>1/15/2025</a:t>
             </a:fld>
             <a:endParaRPr lang="en-US"/>
           </a:p>
@@ -1819,7 +1819,7 @@
           <a:p>
             <a:fld id="{49A02A90-E5B2-4178-83FD-9ED89742CA66}" type="datetimeFigureOut">
               <a:rPr lang="en-US" smtClean="0"/>
-              <a:t>1/5/2025</a:t>
+              <a:t>1/15/2025</a:t>
             </a:fld>
             <a:endParaRPr lang="en-US"/>
           </a:p>
@@ -2096,7 +2096,7 @@
           <a:p>
             <a:fld id="{49A02A90-E5B2-4178-83FD-9ED89742CA66}" type="datetimeFigureOut">
               <a:rPr lang="en-US" smtClean="0"/>
-              <a:t>1/5/2025</a:t>
+              <a:t>1/15/2025</a:t>
             </a:fld>
             <a:endParaRPr lang="en-US"/>
           </a:p>
@@ -2353,7 +2353,7 @@
           <a:p>
             <a:fld id="{49A02A90-E5B2-4178-83FD-9ED89742CA66}" type="datetimeFigureOut">
               <a:rPr lang="en-US" smtClean="0"/>
-              <a:t>1/5/2025</a:t>
+              <a:t>1/15/2025</a:t>
             </a:fld>
             <a:endParaRPr lang="en-US"/>
           </a:p>
@@ -2566,7 +2566,7 @@
           <a:p>
             <a:fld id="{49A02A90-E5B2-4178-83FD-9ED89742CA66}" type="datetimeFigureOut">
               <a:rPr lang="en-US" smtClean="0"/>
-              <a:t>1/5/2025</a:t>
+              <a:t>1/15/2025</a:t>
             </a:fld>
             <a:endParaRPr lang="en-US"/>
           </a:p>
@@ -3047,127 +3047,181 @@
         <p:spPr>
           <a:xfrm>
             <a:off x="3113209" y="6689391"/>
-            <a:ext cx="11985553" cy="5078313"/>
+            <a:ext cx="15651953" cy="6924973"/>
           </a:xfrm>
           <a:custGeom>
             <a:avLst/>
             <a:gdLst>
-              <a:gd name="connsiteX0" fmla="*/ 0 w 11985553"/>
-              <a:gd name="connsiteY0" fmla="*/ 0 h 5078313"/>
-              <a:gd name="connsiteX1" fmla="*/ 719133 w 11985553"/>
-              <a:gd name="connsiteY1" fmla="*/ 0 h 5078313"/>
-              <a:gd name="connsiteX2" fmla="*/ 1438266 w 11985553"/>
-              <a:gd name="connsiteY2" fmla="*/ 0 h 5078313"/>
-              <a:gd name="connsiteX3" fmla="*/ 1677977 w 11985553"/>
-              <a:gd name="connsiteY3" fmla="*/ 0 h 5078313"/>
-              <a:gd name="connsiteX4" fmla="*/ 2157400 w 11985553"/>
-              <a:gd name="connsiteY4" fmla="*/ 0 h 5078313"/>
-              <a:gd name="connsiteX5" fmla="*/ 2876533 w 11985553"/>
-              <a:gd name="connsiteY5" fmla="*/ 0 h 5078313"/>
-              <a:gd name="connsiteX6" fmla="*/ 3595666 w 11985553"/>
-              <a:gd name="connsiteY6" fmla="*/ 0 h 5078313"/>
-              <a:gd name="connsiteX7" fmla="*/ 4075088 w 11985553"/>
-              <a:gd name="connsiteY7" fmla="*/ 0 h 5078313"/>
-              <a:gd name="connsiteX8" fmla="*/ 4314799 w 11985553"/>
-              <a:gd name="connsiteY8" fmla="*/ 0 h 5078313"/>
-              <a:gd name="connsiteX9" fmla="*/ 4674366 w 11985553"/>
-              <a:gd name="connsiteY9" fmla="*/ 0 h 5078313"/>
-              <a:gd name="connsiteX10" fmla="*/ 5393499 w 11985553"/>
-              <a:gd name="connsiteY10" fmla="*/ 0 h 5078313"/>
-              <a:gd name="connsiteX11" fmla="*/ 5992777 w 11985553"/>
-              <a:gd name="connsiteY11" fmla="*/ 0 h 5078313"/>
-              <a:gd name="connsiteX12" fmla="*/ 6472199 w 11985553"/>
-              <a:gd name="connsiteY12" fmla="*/ 0 h 5078313"/>
-              <a:gd name="connsiteX13" fmla="*/ 7311187 w 11985553"/>
-              <a:gd name="connsiteY13" fmla="*/ 0 h 5078313"/>
-              <a:gd name="connsiteX14" fmla="*/ 7790609 w 11985553"/>
-              <a:gd name="connsiteY14" fmla="*/ 0 h 5078313"/>
-              <a:gd name="connsiteX15" fmla="*/ 8030321 w 11985553"/>
-              <a:gd name="connsiteY15" fmla="*/ 0 h 5078313"/>
-              <a:gd name="connsiteX16" fmla="*/ 8869309 w 11985553"/>
-              <a:gd name="connsiteY16" fmla="*/ 0 h 5078313"/>
-              <a:gd name="connsiteX17" fmla="*/ 9588442 w 11985553"/>
-              <a:gd name="connsiteY17" fmla="*/ 0 h 5078313"/>
-              <a:gd name="connsiteX18" fmla="*/ 10187720 w 11985553"/>
-              <a:gd name="connsiteY18" fmla="*/ 0 h 5078313"/>
-              <a:gd name="connsiteX19" fmla="*/ 10906853 w 11985553"/>
-              <a:gd name="connsiteY19" fmla="*/ 0 h 5078313"/>
-              <a:gd name="connsiteX20" fmla="*/ 11985553 w 11985553"/>
-              <a:gd name="connsiteY20" fmla="*/ 0 h 5078313"/>
-              <a:gd name="connsiteX21" fmla="*/ 11985553 w 11985553"/>
-              <a:gd name="connsiteY21" fmla="*/ 615040 h 5078313"/>
-              <a:gd name="connsiteX22" fmla="*/ 11985553 w 11985553"/>
-              <a:gd name="connsiteY22" fmla="*/ 1128514 h 5078313"/>
-              <a:gd name="connsiteX23" fmla="*/ 11985553 w 11985553"/>
-              <a:gd name="connsiteY23" fmla="*/ 1794337 h 5078313"/>
-              <a:gd name="connsiteX24" fmla="*/ 11985553 w 11985553"/>
-              <a:gd name="connsiteY24" fmla="*/ 2409377 h 5078313"/>
-              <a:gd name="connsiteX25" fmla="*/ 11985553 w 11985553"/>
-              <a:gd name="connsiteY25" fmla="*/ 2973634 h 5078313"/>
-              <a:gd name="connsiteX26" fmla="*/ 11985553 w 11985553"/>
-              <a:gd name="connsiteY26" fmla="*/ 3436325 h 5078313"/>
-              <a:gd name="connsiteX27" fmla="*/ 11985553 w 11985553"/>
-              <a:gd name="connsiteY27" fmla="*/ 3899016 h 5078313"/>
-              <a:gd name="connsiteX28" fmla="*/ 11985553 w 11985553"/>
-              <a:gd name="connsiteY28" fmla="*/ 4463273 h 5078313"/>
-              <a:gd name="connsiteX29" fmla="*/ 11985553 w 11985553"/>
-              <a:gd name="connsiteY29" fmla="*/ 5078313 h 5078313"/>
-              <a:gd name="connsiteX30" fmla="*/ 11266420 w 11985553"/>
-              <a:gd name="connsiteY30" fmla="*/ 5078313 h 5078313"/>
-              <a:gd name="connsiteX31" fmla="*/ 10786998 w 11985553"/>
-              <a:gd name="connsiteY31" fmla="*/ 5078313 h 5078313"/>
-              <a:gd name="connsiteX32" fmla="*/ 9948009 w 11985553"/>
-              <a:gd name="connsiteY32" fmla="*/ 5078313 h 5078313"/>
-              <a:gd name="connsiteX33" fmla="*/ 9588442 w 11985553"/>
-              <a:gd name="connsiteY33" fmla="*/ 5078313 h 5078313"/>
-              <a:gd name="connsiteX34" fmla="*/ 8749454 w 11985553"/>
-              <a:gd name="connsiteY34" fmla="*/ 5078313 h 5078313"/>
-              <a:gd name="connsiteX35" fmla="*/ 8030321 w 11985553"/>
-              <a:gd name="connsiteY35" fmla="*/ 5078313 h 5078313"/>
-              <a:gd name="connsiteX36" fmla="*/ 7670754 w 11985553"/>
-              <a:gd name="connsiteY36" fmla="*/ 5078313 h 5078313"/>
-              <a:gd name="connsiteX37" fmla="*/ 7431043 w 11985553"/>
-              <a:gd name="connsiteY37" fmla="*/ 5078313 h 5078313"/>
-              <a:gd name="connsiteX38" fmla="*/ 6831765 w 11985553"/>
-              <a:gd name="connsiteY38" fmla="*/ 5078313 h 5078313"/>
-              <a:gd name="connsiteX39" fmla="*/ 5992777 w 11985553"/>
-              <a:gd name="connsiteY39" fmla="*/ 5078313 h 5078313"/>
-              <a:gd name="connsiteX40" fmla="*/ 5633210 w 11985553"/>
-              <a:gd name="connsiteY40" fmla="*/ 5078313 h 5078313"/>
-              <a:gd name="connsiteX41" fmla="*/ 4794221 w 11985553"/>
-              <a:gd name="connsiteY41" fmla="*/ 5078313 h 5078313"/>
-              <a:gd name="connsiteX42" fmla="*/ 3955232 w 11985553"/>
-              <a:gd name="connsiteY42" fmla="*/ 5078313 h 5078313"/>
-              <a:gd name="connsiteX43" fmla="*/ 3355955 w 11985553"/>
-              <a:gd name="connsiteY43" fmla="*/ 5078313 h 5078313"/>
-              <a:gd name="connsiteX44" fmla="*/ 3116244 w 11985553"/>
-              <a:gd name="connsiteY44" fmla="*/ 5078313 h 5078313"/>
-              <a:gd name="connsiteX45" fmla="*/ 2516966 w 11985553"/>
-              <a:gd name="connsiteY45" fmla="*/ 5078313 h 5078313"/>
-              <a:gd name="connsiteX46" fmla="*/ 1677977 w 11985553"/>
-              <a:gd name="connsiteY46" fmla="*/ 5078313 h 5078313"/>
-              <a:gd name="connsiteX47" fmla="*/ 838989 w 11985553"/>
-              <a:gd name="connsiteY47" fmla="*/ 5078313 h 5078313"/>
-              <a:gd name="connsiteX48" fmla="*/ 0 w 11985553"/>
-              <a:gd name="connsiteY48" fmla="*/ 5078313 h 5078313"/>
-              <a:gd name="connsiteX49" fmla="*/ 0 w 11985553"/>
-              <a:gd name="connsiteY49" fmla="*/ 4666405 h 5078313"/>
-              <a:gd name="connsiteX50" fmla="*/ 0 w 11985553"/>
-              <a:gd name="connsiteY50" fmla="*/ 4051365 h 5078313"/>
-              <a:gd name="connsiteX51" fmla="*/ 0 w 11985553"/>
-              <a:gd name="connsiteY51" fmla="*/ 3639458 h 5078313"/>
-              <a:gd name="connsiteX52" fmla="*/ 0 w 11985553"/>
-              <a:gd name="connsiteY52" fmla="*/ 3227550 h 5078313"/>
-              <a:gd name="connsiteX53" fmla="*/ 0 w 11985553"/>
-              <a:gd name="connsiteY53" fmla="*/ 2815642 h 5078313"/>
-              <a:gd name="connsiteX54" fmla="*/ 0 w 11985553"/>
-              <a:gd name="connsiteY54" fmla="*/ 2200602 h 5078313"/>
-              <a:gd name="connsiteX55" fmla="*/ 0 w 11985553"/>
-              <a:gd name="connsiteY55" fmla="*/ 1534779 h 5078313"/>
-              <a:gd name="connsiteX56" fmla="*/ 0 w 11985553"/>
-              <a:gd name="connsiteY56" fmla="*/ 868956 h 5078313"/>
-              <a:gd name="connsiteX57" fmla="*/ 0 w 11985553"/>
-              <a:gd name="connsiteY57" fmla="*/ 0 h 5078313"/>
+              <a:gd name="connsiteX0" fmla="*/ 0 w 15651953"/>
+              <a:gd name="connsiteY0" fmla="*/ 0 h 6924973"/>
+              <a:gd name="connsiteX1" fmla="*/ 579702 w 15651953"/>
+              <a:gd name="connsiteY1" fmla="*/ 0 h 6924973"/>
+              <a:gd name="connsiteX2" fmla="*/ 1159404 w 15651953"/>
+              <a:gd name="connsiteY2" fmla="*/ 0 h 6924973"/>
+              <a:gd name="connsiteX3" fmla="*/ 1739106 w 15651953"/>
+              <a:gd name="connsiteY3" fmla="*/ 0 h 6924973"/>
+              <a:gd name="connsiteX4" fmla="*/ 2162288 w 15651953"/>
+              <a:gd name="connsiteY4" fmla="*/ 0 h 6924973"/>
+              <a:gd name="connsiteX5" fmla="*/ 2741990 w 15651953"/>
+              <a:gd name="connsiteY5" fmla="*/ 0 h 6924973"/>
+              <a:gd name="connsiteX6" fmla="*/ 3634731 w 15651953"/>
+              <a:gd name="connsiteY6" fmla="*/ 0 h 6924973"/>
+              <a:gd name="connsiteX7" fmla="*/ 4527472 w 15651953"/>
+              <a:gd name="connsiteY7" fmla="*/ 0 h 6924973"/>
+              <a:gd name="connsiteX8" fmla="*/ 4637616 w 15651953"/>
+              <a:gd name="connsiteY8" fmla="*/ 0 h 6924973"/>
+              <a:gd name="connsiteX9" fmla="*/ 5060798 w 15651953"/>
+              <a:gd name="connsiteY9" fmla="*/ 0 h 6924973"/>
+              <a:gd name="connsiteX10" fmla="*/ 5953539 w 15651953"/>
+              <a:gd name="connsiteY10" fmla="*/ 0 h 6924973"/>
+              <a:gd name="connsiteX11" fmla="*/ 6063683 w 15651953"/>
+              <a:gd name="connsiteY11" fmla="*/ 0 h 6924973"/>
+              <a:gd name="connsiteX12" fmla="*/ 6173826 w 15651953"/>
+              <a:gd name="connsiteY12" fmla="*/ 0 h 6924973"/>
+              <a:gd name="connsiteX13" fmla="*/ 6753528 w 15651953"/>
+              <a:gd name="connsiteY13" fmla="*/ 0 h 6924973"/>
+              <a:gd name="connsiteX14" fmla="*/ 7020191 w 15651953"/>
+              <a:gd name="connsiteY14" fmla="*/ 0 h 6924973"/>
+              <a:gd name="connsiteX15" fmla="*/ 7912932 w 15651953"/>
+              <a:gd name="connsiteY15" fmla="*/ 0 h 6924973"/>
+              <a:gd name="connsiteX16" fmla="*/ 8179595 w 15651953"/>
+              <a:gd name="connsiteY16" fmla="*/ 0 h 6924973"/>
+              <a:gd name="connsiteX17" fmla="*/ 8446258 w 15651953"/>
+              <a:gd name="connsiteY17" fmla="*/ 0 h 6924973"/>
+              <a:gd name="connsiteX18" fmla="*/ 8712921 w 15651953"/>
+              <a:gd name="connsiteY18" fmla="*/ 0 h 6924973"/>
+              <a:gd name="connsiteX19" fmla="*/ 8979583 w 15651953"/>
+              <a:gd name="connsiteY19" fmla="*/ 0 h 6924973"/>
+              <a:gd name="connsiteX20" fmla="*/ 9559285 w 15651953"/>
+              <a:gd name="connsiteY20" fmla="*/ 0 h 6924973"/>
+              <a:gd name="connsiteX21" fmla="*/ 10452026 w 15651953"/>
+              <a:gd name="connsiteY21" fmla="*/ 0 h 6924973"/>
+              <a:gd name="connsiteX22" fmla="*/ 11344767 w 15651953"/>
+              <a:gd name="connsiteY22" fmla="*/ 0 h 6924973"/>
+              <a:gd name="connsiteX23" fmla="*/ 12080989 w 15651953"/>
+              <a:gd name="connsiteY23" fmla="*/ 0 h 6924973"/>
+              <a:gd name="connsiteX24" fmla="*/ 12191132 w 15651953"/>
+              <a:gd name="connsiteY24" fmla="*/ 0 h 6924973"/>
+              <a:gd name="connsiteX25" fmla="*/ 12301276 w 15651953"/>
+              <a:gd name="connsiteY25" fmla="*/ 0 h 6924973"/>
+              <a:gd name="connsiteX26" fmla="*/ 12411419 w 15651953"/>
+              <a:gd name="connsiteY26" fmla="*/ 0 h 6924973"/>
+              <a:gd name="connsiteX27" fmla="*/ 13147641 w 15651953"/>
+              <a:gd name="connsiteY27" fmla="*/ 0 h 6924973"/>
+              <a:gd name="connsiteX28" fmla="*/ 14040382 w 15651953"/>
+              <a:gd name="connsiteY28" fmla="*/ 0 h 6924973"/>
+              <a:gd name="connsiteX29" fmla="*/ 14933123 w 15651953"/>
+              <a:gd name="connsiteY29" fmla="*/ 0 h 6924973"/>
+              <a:gd name="connsiteX30" fmla="*/ 15651953 w 15651953"/>
+              <a:gd name="connsiteY30" fmla="*/ 0 h 6924973"/>
+              <a:gd name="connsiteX31" fmla="*/ 15651953 w 15651953"/>
+              <a:gd name="connsiteY31" fmla="*/ 577081 h 6924973"/>
+              <a:gd name="connsiteX32" fmla="*/ 15651953 w 15651953"/>
+              <a:gd name="connsiteY32" fmla="*/ 1015663 h 6924973"/>
+              <a:gd name="connsiteX33" fmla="*/ 15651953 w 15651953"/>
+              <a:gd name="connsiteY33" fmla="*/ 1592744 h 6924973"/>
+              <a:gd name="connsiteX34" fmla="*/ 15651953 w 15651953"/>
+              <a:gd name="connsiteY34" fmla="*/ 2308324 h 6924973"/>
+              <a:gd name="connsiteX35" fmla="*/ 15651953 w 15651953"/>
+              <a:gd name="connsiteY35" fmla="*/ 2677656 h 6924973"/>
+              <a:gd name="connsiteX36" fmla="*/ 15651953 w 15651953"/>
+              <a:gd name="connsiteY36" fmla="*/ 3393237 h 6924973"/>
+              <a:gd name="connsiteX37" fmla="*/ 15651953 w 15651953"/>
+              <a:gd name="connsiteY37" fmla="*/ 4108817 h 6924973"/>
+              <a:gd name="connsiteX38" fmla="*/ 15651953 w 15651953"/>
+              <a:gd name="connsiteY38" fmla="*/ 4616649 h 6924973"/>
+              <a:gd name="connsiteX39" fmla="*/ 15651953 w 15651953"/>
+              <a:gd name="connsiteY39" fmla="*/ 5332229 h 6924973"/>
+              <a:gd name="connsiteX40" fmla="*/ 15651953 w 15651953"/>
+              <a:gd name="connsiteY40" fmla="*/ 5909310 h 6924973"/>
+              <a:gd name="connsiteX41" fmla="*/ 15651953 w 15651953"/>
+              <a:gd name="connsiteY41" fmla="*/ 6278642 h 6924973"/>
+              <a:gd name="connsiteX42" fmla="*/ 15651953 w 15651953"/>
+              <a:gd name="connsiteY42" fmla="*/ 6924973 h 6924973"/>
+              <a:gd name="connsiteX43" fmla="*/ 14915732 w 15651953"/>
+              <a:gd name="connsiteY43" fmla="*/ 6924973 h 6924973"/>
+              <a:gd name="connsiteX44" fmla="*/ 14022990 w 15651953"/>
+              <a:gd name="connsiteY44" fmla="*/ 6924973 h 6924973"/>
+              <a:gd name="connsiteX45" fmla="*/ 13443289 w 15651953"/>
+              <a:gd name="connsiteY45" fmla="*/ 6924973 h 6924973"/>
+              <a:gd name="connsiteX46" fmla="*/ 13020106 w 15651953"/>
+              <a:gd name="connsiteY46" fmla="*/ 6924973 h 6924973"/>
+              <a:gd name="connsiteX47" fmla="*/ 12596924 w 15651953"/>
+              <a:gd name="connsiteY47" fmla="*/ 6924973 h 6924973"/>
+              <a:gd name="connsiteX48" fmla="*/ 11860702 w 15651953"/>
+              <a:gd name="connsiteY48" fmla="*/ 6924973 h 6924973"/>
+              <a:gd name="connsiteX49" fmla="*/ 11124481 w 15651953"/>
+              <a:gd name="connsiteY49" fmla="*/ 6924973 h 6924973"/>
+              <a:gd name="connsiteX50" fmla="*/ 10388259 w 15651953"/>
+              <a:gd name="connsiteY50" fmla="*/ 6924973 h 6924973"/>
+              <a:gd name="connsiteX51" fmla="*/ 9495518 w 15651953"/>
+              <a:gd name="connsiteY51" fmla="*/ 6924973 h 6924973"/>
+              <a:gd name="connsiteX52" fmla="*/ 9228855 w 15651953"/>
+              <a:gd name="connsiteY52" fmla="*/ 6924973 h 6924973"/>
+              <a:gd name="connsiteX53" fmla="*/ 8649153 w 15651953"/>
+              <a:gd name="connsiteY53" fmla="*/ 6924973 h 6924973"/>
+              <a:gd name="connsiteX54" fmla="*/ 8539010 w 15651953"/>
+              <a:gd name="connsiteY54" fmla="*/ 6924973 h 6924973"/>
+              <a:gd name="connsiteX55" fmla="*/ 8272347 w 15651953"/>
+              <a:gd name="connsiteY55" fmla="*/ 6924973 h 6924973"/>
+              <a:gd name="connsiteX56" fmla="*/ 7692645 w 15651953"/>
+              <a:gd name="connsiteY56" fmla="*/ 6924973 h 6924973"/>
+              <a:gd name="connsiteX57" fmla="*/ 7425982 w 15651953"/>
+              <a:gd name="connsiteY57" fmla="*/ 6924973 h 6924973"/>
+              <a:gd name="connsiteX58" fmla="*/ 7159319 w 15651953"/>
+              <a:gd name="connsiteY58" fmla="*/ 6924973 h 6924973"/>
+              <a:gd name="connsiteX59" fmla="*/ 6423098 w 15651953"/>
+              <a:gd name="connsiteY59" fmla="*/ 6924973 h 6924973"/>
+              <a:gd name="connsiteX60" fmla="*/ 6312954 w 15651953"/>
+              <a:gd name="connsiteY60" fmla="*/ 6924973 h 6924973"/>
+              <a:gd name="connsiteX61" fmla="*/ 5576733 w 15651953"/>
+              <a:gd name="connsiteY61" fmla="*/ 6924973 h 6924973"/>
+              <a:gd name="connsiteX62" fmla="*/ 4683992 w 15651953"/>
+              <a:gd name="connsiteY62" fmla="*/ 6924973 h 6924973"/>
+              <a:gd name="connsiteX63" fmla="*/ 4260809 w 15651953"/>
+              <a:gd name="connsiteY63" fmla="*/ 6924973 h 6924973"/>
+              <a:gd name="connsiteX64" fmla="*/ 3837627 w 15651953"/>
+              <a:gd name="connsiteY64" fmla="*/ 6924973 h 6924973"/>
+              <a:gd name="connsiteX65" fmla="*/ 3414445 w 15651953"/>
+              <a:gd name="connsiteY65" fmla="*/ 6924973 h 6924973"/>
+              <a:gd name="connsiteX66" fmla="*/ 2521704 w 15651953"/>
+              <a:gd name="connsiteY66" fmla="*/ 6924973 h 6924973"/>
+              <a:gd name="connsiteX67" fmla="*/ 1628963 w 15651953"/>
+              <a:gd name="connsiteY67" fmla="*/ 6924973 h 6924973"/>
+              <a:gd name="connsiteX68" fmla="*/ 1205780 w 15651953"/>
+              <a:gd name="connsiteY68" fmla="*/ 6924973 h 6924973"/>
+              <a:gd name="connsiteX69" fmla="*/ 939117 w 15651953"/>
+              <a:gd name="connsiteY69" fmla="*/ 6924973 h 6924973"/>
+              <a:gd name="connsiteX70" fmla="*/ 672454 w 15651953"/>
+              <a:gd name="connsiteY70" fmla="*/ 6924973 h 6924973"/>
+              <a:gd name="connsiteX71" fmla="*/ 0 w 15651953"/>
+              <a:gd name="connsiteY71" fmla="*/ 6924973 h 6924973"/>
+              <a:gd name="connsiteX72" fmla="*/ 0 w 15651953"/>
+              <a:gd name="connsiteY72" fmla="*/ 6278642 h 6924973"/>
+              <a:gd name="connsiteX73" fmla="*/ 0 w 15651953"/>
+              <a:gd name="connsiteY73" fmla="*/ 5909310 h 6924973"/>
+              <a:gd name="connsiteX74" fmla="*/ 0 w 15651953"/>
+              <a:gd name="connsiteY74" fmla="*/ 5401479 h 6924973"/>
+              <a:gd name="connsiteX75" fmla="*/ 0 w 15651953"/>
+              <a:gd name="connsiteY75" fmla="*/ 4962897 h 6924973"/>
+              <a:gd name="connsiteX76" fmla="*/ 0 w 15651953"/>
+              <a:gd name="connsiteY76" fmla="*/ 4593565 h 6924973"/>
+              <a:gd name="connsiteX77" fmla="*/ 0 w 15651953"/>
+              <a:gd name="connsiteY77" fmla="*/ 4085734 h 6924973"/>
+              <a:gd name="connsiteX78" fmla="*/ 0 w 15651953"/>
+              <a:gd name="connsiteY78" fmla="*/ 3716402 h 6924973"/>
+              <a:gd name="connsiteX79" fmla="*/ 0 w 15651953"/>
+              <a:gd name="connsiteY79" fmla="*/ 3208571 h 6924973"/>
+              <a:gd name="connsiteX80" fmla="*/ 0 w 15651953"/>
+              <a:gd name="connsiteY80" fmla="*/ 2769989 h 6924973"/>
+              <a:gd name="connsiteX81" fmla="*/ 0 w 15651953"/>
+              <a:gd name="connsiteY81" fmla="*/ 2192908 h 6924973"/>
+              <a:gd name="connsiteX82" fmla="*/ 0 w 15651953"/>
+              <a:gd name="connsiteY82" fmla="*/ 1823576 h 6924973"/>
+              <a:gd name="connsiteX83" fmla="*/ 0 w 15651953"/>
+              <a:gd name="connsiteY83" fmla="*/ 1107996 h 6924973"/>
+              <a:gd name="connsiteX84" fmla="*/ 0 w 15651953"/>
+              <a:gd name="connsiteY84" fmla="*/ 0 h 6924973"/>
             </a:gdLst>
             <a:ahLst/>
             <a:cxnLst>
@@ -3345,587 +3399,948 @@
               <a:cxn ang="0">
                 <a:pos x="connsiteX57" y="connsiteY57"/>
               </a:cxn>
+              <a:cxn ang="0">
+                <a:pos x="connsiteX58" y="connsiteY58"/>
+              </a:cxn>
+              <a:cxn ang="0">
+                <a:pos x="connsiteX59" y="connsiteY59"/>
+              </a:cxn>
+              <a:cxn ang="0">
+                <a:pos x="connsiteX60" y="connsiteY60"/>
+              </a:cxn>
+              <a:cxn ang="0">
+                <a:pos x="connsiteX61" y="connsiteY61"/>
+              </a:cxn>
+              <a:cxn ang="0">
+                <a:pos x="connsiteX62" y="connsiteY62"/>
+              </a:cxn>
+              <a:cxn ang="0">
+                <a:pos x="connsiteX63" y="connsiteY63"/>
+              </a:cxn>
+              <a:cxn ang="0">
+                <a:pos x="connsiteX64" y="connsiteY64"/>
+              </a:cxn>
+              <a:cxn ang="0">
+                <a:pos x="connsiteX65" y="connsiteY65"/>
+              </a:cxn>
+              <a:cxn ang="0">
+                <a:pos x="connsiteX66" y="connsiteY66"/>
+              </a:cxn>
+              <a:cxn ang="0">
+                <a:pos x="connsiteX67" y="connsiteY67"/>
+              </a:cxn>
+              <a:cxn ang="0">
+                <a:pos x="connsiteX68" y="connsiteY68"/>
+              </a:cxn>
+              <a:cxn ang="0">
+                <a:pos x="connsiteX69" y="connsiteY69"/>
+              </a:cxn>
+              <a:cxn ang="0">
+                <a:pos x="connsiteX70" y="connsiteY70"/>
+              </a:cxn>
+              <a:cxn ang="0">
+                <a:pos x="connsiteX71" y="connsiteY71"/>
+              </a:cxn>
+              <a:cxn ang="0">
+                <a:pos x="connsiteX72" y="connsiteY72"/>
+              </a:cxn>
+              <a:cxn ang="0">
+                <a:pos x="connsiteX73" y="connsiteY73"/>
+              </a:cxn>
+              <a:cxn ang="0">
+                <a:pos x="connsiteX74" y="connsiteY74"/>
+              </a:cxn>
+              <a:cxn ang="0">
+                <a:pos x="connsiteX75" y="connsiteY75"/>
+              </a:cxn>
+              <a:cxn ang="0">
+                <a:pos x="connsiteX76" y="connsiteY76"/>
+              </a:cxn>
+              <a:cxn ang="0">
+                <a:pos x="connsiteX77" y="connsiteY77"/>
+              </a:cxn>
+              <a:cxn ang="0">
+                <a:pos x="connsiteX78" y="connsiteY78"/>
+              </a:cxn>
+              <a:cxn ang="0">
+                <a:pos x="connsiteX79" y="connsiteY79"/>
+              </a:cxn>
+              <a:cxn ang="0">
+                <a:pos x="connsiteX80" y="connsiteY80"/>
+              </a:cxn>
+              <a:cxn ang="0">
+                <a:pos x="connsiteX81" y="connsiteY81"/>
+              </a:cxn>
+              <a:cxn ang="0">
+                <a:pos x="connsiteX82" y="connsiteY82"/>
+              </a:cxn>
+              <a:cxn ang="0">
+                <a:pos x="connsiteX83" y="connsiteY83"/>
+              </a:cxn>
+              <a:cxn ang="0">
+                <a:pos x="connsiteX84" y="connsiteY84"/>
+              </a:cxn>
             </a:cxnLst>
             <a:rect l="l" t="t" r="r" b="b"/>
             <a:pathLst>
-              <a:path w="11985553" h="5078313" fill="none" extrusionOk="0">
+              <a:path w="15651953" h="6924973" fill="none" extrusionOk="0">
                 <a:moveTo>
                   <a:pt x="0" y="0"/>
                 </a:moveTo>
                 <a:cubicBezTo>
-                  <a:pt x="274768" y="-72784"/>
-                  <a:pt x="458828" y="19467"/>
-                  <a:pt x="719133" y="0"/>
-                </a:cubicBezTo>
-                <a:cubicBezTo>
-                  <a:pt x="979438" y="-19467"/>
-                  <a:pt x="1153985" y="3421"/>
-                  <a:pt x="1438266" y="0"/>
-                </a:cubicBezTo>
-                <a:cubicBezTo>
-                  <a:pt x="1722547" y="-3421"/>
-                  <a:pt x="1567686" y="24762"/>
-                  <a:pt x="1677977" y="0"/>
-                </a:cubicBezTo>
-                <a:cubicBezTo>
-                  <a:pt x="1788268" y="-24762"/>
-                  <a:pt x="2057351" y="15443"/>
-                  <a:pt x="2157400" y="0"/>
-                </a:cubicBezTo>
-                <a:cubicBezTo>
-                  <a:pt x="2257449" y="-15443"/>
-                  <a:pt x="2715017" y="32085"/>
-                  <a:pt x="2876533" y="0"/>
-                </a:cubicBezTo>
-                <a:cubicBezTo>
-                  <a:pt x="3038049" y="-32085"/>
-                  <a:pt x="3288489" y="69812"/>
-                  <a:pt x="3595666" y="0"/>
-                </a:cubicBezTo>
-                <a:cubicBezTo>
-                  <a:pt x="3902843" y="-69812"/>
-                  <a:pt x="3914014" y="20504"/>
-                  <a:pt x="4075088" y="0"/>
-                </a:cubicBezTo>
-                <a:cubicBezTo>
-                  <a:pt x="4236162" y="-20504"/>
-                  <a:pt x="4264913" y="9666"/>
-                  <a:pt x="4314799" y="0"/>
-                </a:cubicBezTo>
-                <a:cubicBezTo>
-                  <a:pt x="4364685" y="-9666"/>
-                  <a:pt x="4509100" y="8992"/>
-                  <a:pt x="4674366" y="0"/>
-                </a:cubicBezTo>
-                <a:cubicBezTo>
-                  <a:pt x="4839632" y="-8992"/>
-                  <a:pt x="5178651" y="31495"/>
-                  <a:pt x="5393499" y="0"/>
-                </a:cubicBezTo>
-                <a:cubicBezTo>
-                  <a:pt x="5608347" y="-31495"/>
-                  <a:pt x="5767358" y="56372"/>
-                  <a:pt x="5992777" y="0"/>
-                </a:cubicBezTo>
-                <a:cubicBezTo>
-                  <a:pt x="6218196" y="-56372"/>
-                  <a:pt x="6360134" y="40630"/>
-                  <a:pt x="6472199" y="0"/>
-                </a:cubicBezTo>
-                <a:cubicBezTo>
-                  <a:pt x="6584264" y="-40630"/>
-                  <a:pt x="6914641" y="47279"/>
-                  <a:pt x="7311187" y="0"/>
-                </a:cubicBezTo>
-                <a:cubicBezTo>
-                  <a:pt x="7707733" y="-47279"/>
-                  <a:pt x="7676015" y="31555"/>
-                  <a:pt x="7790609" y="0"/>
-                </a:cubicBezTo>
-                <a:cubicBezTo>
-                  <a:pt x="7905203" y="-31555"/>
-                  <a:pt x="7981137" y="6875"/>
-                  <a:pt x="8030321" y="0"/>
-                </a:cubicBezTo>
-                <a:cubicBezTo>
-                  <a:pt x="8079505" y="-6875"/>
-                  <a:pt x="8650746" y="78475"/>
-                  <a:pt x="8869309" y="0"/>
-                </a:cubicBezTo>
-                <a:cubicBezTo>
-                  <a:pt x="9087872" y="-78475"/>
-                  <a:pt x="9265167" y="75457"/>
-                  <a:pt x="9588442" y="0"/>
-                </a:cubicBezTo>
-                <a:cubicBezTo>
-                  <a:pt x="9911717" y="-75457"/>
-                  <a:pt x="9997327" y="54707"/>
-                  <a:pt x="10187720" y="0"/>
-                </a:cubicBezTo>
-                <a:cubicBezTo>
-                  <a:pt x="10378113" y="-54707"/>
-                  <a:pt x="10548996" y="71082"/>
-                  <a:pt x="10906853" y="0"/>
-                </a:cubicBezTo>
-                <a:cubicBezTo>
-                  <a:pt x="11264710" y="-71082"/>
-                  <a:pt x="11460493" y="81461"/>
-                  <a:pt x="11985553" y="0"/>
-                </a:cubicBezTo>
-                <a:cubicBezTo>
-                  <a:pt x="12009508" y="247645"/>
-                  <a:pt x="11962104" y="389392"/>
-                  <a:pt x="11985553" y="615040"/>
-                </a:cubicBezTo>
-                <a:cubicBezTo>
-                  <a:pt x="12009002" y="840688"/>
-                  <a:pt x="11949880" y="930469"/>
-                  <a:pt x="11985553" y="1128514"/>
-                </a:cubicBezTo>
-                <a:cubicBezTo>
-                  <a:pt x="12021226" y="1326559"/>
-                  <a:pt x="11929074" y="1518300"/>
-                  <a:pt x="11985553" y="1794337"/>
-                </a:cubicBezTo>
-                <a:cubicBezTo>
-                  <a:pt x="12042032" y="2070374"/>
-                  <a:pt x="11944497" y="2171005"/>
-                  <a:pt x="11985553" y="2409377"/>
-                </a:cubicBezTo>
-                <a:cubicBezTo>
-                  <a:pt x="12026609" y="2647749"/>
-                  <a:pt x="11948179" y="2821862"/>
-                  <a:pt x="11985553" y="2973634"/>
-                </a:cubicBezTo>
-                <a:cubicBezTo>
-                  <a:pt x="12022927" y="3125406"/>
-                  <a:pt x="11970866" y="3209616"/>
-                  <a:pt x="11985553" y="3436325"/>
-                </a:cubicBezTo>
-                <a:cubicBezTo>
-                  <a:pt x="12000240" y="3663034"/>
-                  <a:pt x="11944333" y="3673463"/>
-                  <a:pt x="11985553" y="3899016"/>
-                </a:cubicBezTo>
-                <a:cubicBezTo>
-                  <a:pt x="12026773" y="4124569"/>
-                  <a:pt x="11940523" y="4341419"/>
-                  <a:pt x="11985553" y="4463273"/>
-                </a:cubicBezTo>
-                <a:cubicBezTo>
-                  <a:pt x="12030583" y="4585127"/>
-                  <a:pt x="11928797" y="4899178"/>
-                  <a:pt x="11985553" y="5078313"/>
-                </a:cubicBezTo>
-                <a:cubicBezTo>
-                  <a:pt x="11801721" y="5162308"/>
-                  <a:pt x="11438630" y="5046455"/>
-                  <a:pt x="11266420" y="5078313"/>
-                </a:cubicBezTo>
-                <a:cubicBezTo>
-                  <a:pt x="11094210" y="5110171"/>
-                  <a:pt x="11010581" y="5062190"/>
-                  <a:pt x="10786998" y="5078313"/>
-                </a:cubicBezTo>
-                <a:cubicBezTo>
-                  <a:pt x="10563415" y="5094436"/>
-                  <a:pt x="10153847" y="5054304"/>
-                  <a:pt x="9948009" y="5078313"/>
-                </a:cubicBezTo>
-                <a:cubicBezTo>
-                  <a:pt x="9742171" y="5102322"/>
-                  <a:pt x="9750613" y="5055563"/>
-                  <a:pt x="9588442" y="5078313"/>
-                </a:cubicBezTo>
-                <a:cubicBezTo>
-                  <a:pt x="9426271" y="5101063"/>
-                  <a:pt x="8970066" y="5043135"/>
-                  <a:pt x="8749454" y="5078313"/>
-                </a:cubicBezTo>
-                <a:cubicBezTo>
-                  <a:pt x="8528842" y="5113491"/>
-                  <a:pt x="8284707" y="5075993"/>
-                  <a:pt x="8030321" y="5078313"/>
-                </a:cubicBezTo>
-                <a:cubicBezTo>
-                  <a:pt x="7775935" y="5080633"/>
-                  <a:pt x="7810946" y="5041430"/>
-                  <a:pt x="7670754" y="5078313"/>
-                </a:cubicBezTo>
-                <a:cubicBezTo>
-                  <a:pt x="7530562" y="5115196"/>
-                  <a:pt x="7548357" y="5061187"/>
-                  <a:pt x="7431043" y="5078313"/>
-                </a:cubicBezTo>
-                <a:cubicBezTo>
-                  <a:pt x="7313729" y="5095439"/>
-                  <a:pt x="6990940" y="5026599"/>
-                  <a:pt x="6831765" y="5078313"/>
-                </a:cubicBezTo>
-                <a:cubicBezTo>
-                  <a:pt x="6672590" y="5130027"/>
-                  <a:pt x="6399802" y="5073500"/>
-                  <a:pt x="5992777" y="5078313"/>
-                </a:cubicBezTo>
-                <a:cubicBezTo>
-                  <a:pt x="5585752" y="5083126"/>
-                  <a:pt x="5775746" y="5078282"/>
-                  <a:pt x="5633210" y="5078313"/>
-                </a:cubicBezTo>
-                <a:cubicBezTo>
-                  <a:pt x="5490674" y="5078344"/>
-                  <a:pt x="5178728" y="4980969"/>
-                  <a:pt x="4794221" y="5078313"/>
-                </a:cubicBezTo>
-                <a:cubicBezTo>
-                  <a:pt x="4409714" y="5175657"/>
-                  <a:pt x="4334260" y="5043543"/>
-                  <a:pt x="3955232" y="5078313"/>
-                </a:cubicBezTo>
-                <a:cubicBezTo>
-                  <a:pt x="3576204" y="5113083"/>
-                  <a:pt x="3557328" y="5061067"/>
-                  <a:pt x="3355955" y="5078313"/>
-                </a:cubicBezTo>
-                <a:cubicBezTo>
-                  <a:pt x="3154582" y="5095559"/>
-                  <a:pt x="3172585" y="5074852"/>
-                  <a:pt x="3116244" y="5078313"/>
-                </a:cubicBezTo>
-                <a:cubicBezTo>
-                  <a:pt x="3059903" y="5081774"/>
-                  <a:pt x="2795333" y="5064483"/>
-                  <a:pt x="2516966" y="5078313"/>
-                </a:cubicBezTo>
-                <a:cubicBezTo>
-                  <a:pt x="2238599" y="5092143"/>
-                  <a:pt x="2061092" y="5017063"/>
-                  <a:pt x="1677977" y="5078313"/>
-                </a:cubicBezTo>
-                <a:cubicBezTo>
-                  <a:pt x="1294862" y="5139563"/>
-                  <a:pt x="1061040" y="4997899"/>
-                  <a:pt x="838989" y="5078313"/>
-                </a:cubicBezTo>
-                <a:cubicBezTo>
-                  <a:pt x="616938" y="5158727"/>
-                  <a:pt x="402306" y="5003247"/>
-                  <a:pt x="0" y="5078313"/>
-                </a:cubicBezTo>
-                <a:cubicBezTo>
-                  <a:pt x="-19672" y="4884814"/>
-                  <a:pt x="17114" y="4765460"/>
-                  <a:pt x="0" y="4666405"/>
-                </a:cubicBezTo>
-                <a:cubicBezTo>
-                  <a:pt x="-17114" y="4567350"/>
-                  <a:pt x="49278" y="4285248"/>
-                  <a:pt x="0" y="4051365"/>
-                </a:cubicBezTo>
-                <a:cubicBezTo>
-                  <a:pt x="-49278" y="3817482"/>
-                  <a:pt x="6298" y="3781189"/>
-                  <a:pt x="0" y="3639458"/>
-                </a:cubicBezTo>
-                <a:cubicBezTo>
-                  <a:pt x="-6298" y="3497727"/>
-                  <a:pt x="14928" y="3413627"/>
-                  <a:pt x="0" y="3227550"/>
-                </a:cubicBezTo>
-                <a:cubicBezTo>
-                  <a:pt x="-14928" y="3041473"/>
-                  <a:pt x="41411" y="2997559"/>
-                  <a:pt x="0" y="2815642"/>
-                </a:cubicBezTo>
-                <a:cubicBezTo>
-                  <a:pt x="-41411" y="2633725"/>
-                  <a:pt x="23805" y="2395980"/>
-                  <a:pt x="0" y="2200602"/>
-                </a:cubicBezTo>
-                <a:cubicBezTo>
-                  <a:pt x="-23805" y="2005224"/>
-                  <a:pt x="45339" y="1720921"/>
-                  <a:pt x="0" y="1534779"/>
-                </a:cubicBezTo>
-                <a:cubicBezTo>
-                  <a:pt x="-45339" y="1348637"/>
-                  <a:pt x="13137" y="1025025"/>
-                  <a:pt x="0" y="868956"/>
-                </a:cubicBezTo>
-                <a:cubicBezTo>
-                  <a:pt x="-13137" y="712887"/>
-                  <a:pt x="30890" y="313334"/>
+                  <a:pt x="244947" y="-30984"/>
+                  <a:pt x="416814" y="53804"/>
+                  <a:pt x="579702" y="0"/>
+                </a:cubicBezTo>
+                <a:cubicBezTo>
+                  <a:pt x="742590" y="-53804"/>
+                  <a:pt x="954936" y="36933"/>
+                  <a:pt x="1159404" y="0"/>
+                </a:cubicBezTo>
+                <a:cubicBezTo>
+                  <a:pt x="1363872" y="-36933"/>
+                  <a:pt x="1601852" y="60567"/>
+                  <a:pt x="1739106" y="0"/>
+                </a:cubicBezTo>
+                <a:cubicBezTo>
+                  <a:pt x="1876360" y="-60567"/>
+                  <a:pt x="2008402" y="4539"/>
+                  <a:pt x="2162288" y="0"/>
+                </a:cubicBezTo>
+                <a:cubicBezTo>
+                  <a:pt x="2316174" y="-4539"/>
+                  <a:pt x="2600271" y="35558"/>
+                  <a:pt x="2741990" y="0"/>
+                </a:cubicBezTo>
+                <a:cubicBezTo>
+                  <a:pt x="2883709" y="-35558"/>
+                  <a:pt x="3369172" y="74804"/>
+                  <a:pt x="3634731" y="0"/>
+                </a:cubicBezTo>
+                <a:cubicBezTo>
+                  <a:pt x="3900290" y="-74804"/>
+                  <a:pt x="4306127" y="104945"/>
+                  <a:pt x="4527472" y="0"/>
+                </a:cubicBezTo>
+                <a:cubicBezTo>
+                  <a:pt x="4748817" y="-104945"/>
+                  <a:pt x="4605605" y="10928"/>
+                  <a:pt x="4637616" y="0"/>
+                </a:cubicBezTo>
+                <a:cubicBezTo>
+                  <a:pt x="4669627" y="-10928"/>
+                  <a:pt x="4895250" y="3478"/>
+                  <a:pt x="5060798" y="0"/>
+                </a:cubicBezTo>
+                <a:cubicBezTo>
+                  <a:pt x="5226346" y="-3478"/>
+                  <a:pt x="5613603" y="81806"/>
+                  <a:pt x="5953539" y="0"/>
+                </a:cubicBezTo>
+                <a:cubicBezTo>
+                  <a:pt x="6293475" y="-81806"/>
+                  <a:pt x="6010019" y="9291"/>
+                  <a:pt x="6063683" y="0"/>
+                </a:cubicBezTo>
+                <a:cubicBezTo>
+                  <a:pt x="6117347" y="-9291"/>
+                  <a:pt x="6132069" y="13145"/>
+                  <a:pt x="6173826" y="0"/>
+                </a:cubicBezTo>
+                <a:cubicBezTo>
+                  <a:pt x="6215583" y="-13145"/>
+                  <a:pt x="6632835" y="29377"/>
+                  <a:pt x="6753528" y="0"/>
+                </a:cubicBezTo>
+                <a:cubicBezTo>
+                  <a:pt x="6874221" y="-29377"/>
+                  <a:pt x="6927133" y="15519"/>
+                  <a:pt x="7020191" y="0"/>
+                </a:cubicBezTo>
+                <a:cubicBezTo>
+                  <a:pt x="7113249" y="-15519"/>
+                  <a:pt x="7714878" y="13301"/>
+                  <a:pt x="7912932" y="0"/>
+                </a:cubicBezTo>
+                <a:cubicBezTo>
+                  <a:pt x="8110986" y="-13301"/>
+                  <a:pt x="8110254" y="21816"/>
+                  <a:pt x="8179595" y="0"/>
+                </a:cubicBezTo>
+                <a:cubicBezTo>
+                  <a:pt x="8248936" y="-21816"/>
+                  <a:pt x="8382056" y="31451"/>
+                  <a:pt x="8446258" y="0"/>
+                </a:cubicBezTo>
+                <a:cubicBezTo>
+                  <a:pt x="8510460" y="-31451"/>
+                  <a:pt x="8623877" y="12962"/>
+                  <a:pt x="8712921" y="0"/>
+                </a:cubicBezTo>
+                <a:cubicBezTo>
+                  <a:pt x="8801965" y="-12962"/>
+                  <a:pt x="8870559" y="19039"/>
+                  <a:pt x="8979583" y="0"/>
+                </a:cubicBezTo>
+                <a:cubicBezTo>
+                  <a:pt x="9088607" y="-19039"/>
+                  <a:pt x="9370590" y="18139"/>
+                  <a:pt x="9559285" y="0"/>
+                </a:cubicBezTo>
+                <a:cubicBezTo>
+                  <a:pt x="9747980" y="-18139"/>
+                  <a:pt x="10028352" y="75529"/>
+                  <a:pt x="10452026" y="0"/>
+                </a:cubicBezTo>
+                <a:cubicBezTo>
+                  <a:pt x="10875700" y="-75529"/>
+                  <a:pt x="11031240" y="9716"/>
+                  <a:pt x="11344767" y="0"/>
+                </a:cubicBezTo>
+                <a:cubicBezTo>
+                  <a:pt x="11658294" y="-9716"/>
+                  <a:pt x="11810628" y="17723"/>
+                  <a:pt x="12080989" y="0"/>
+                </a:cubicBezTo>
+                <a:cubicBezTo>
+                  <a:pt x="12351350" y="-17723"/>
+                  <a:pt x="12168107" y="13135"/>
+                  <a:pt x="12191132" y="0"/>
+                </a:cubicBezTo>
+                <a:cubicBezTo>
+                  <a:pt x="12214157" y="-13135"/>
+                  <a:pt x="12254495" y="11961"/>
+                  <a:pt x="12301276" y="0"/>
+                </a:cubicBezTo>
+                <a:cubicBezTo>
+                  <a:pt x="12348057" y="-11961"/>
+                  <a:pt x="12357655" y="11888"/>
+                  <a:pt x="12411419" y="0"/>
+                </a:cubicBezTo>
+                <a:cubicBezTo>
+                  <a:pt x="12465183" y="-11888"/>
+                  <a:pt x="12861441" y="2462"/>
+                  <a:pt x="13147641" y="0"/>
+                </a:cubicBezTo>
+                <a:cubicBezTo>
+                  <a:pt x="13433841" y="-2462"/>
+                  <a:pt x="13825895" y="80754"/>
+                  <a:pt x="14040382" y="0"/>
+                </a:cubicBezTo>
+                <a:cubicBezTo>
+                  <a:pt x="14254869" y="-80754"/>
+                  <a:pt x="14490697" y="29445"/>
+                  <a:pt x="14933123" y="0"/>
+                </a:cubicBezTo>
+                <a:cubicBezTo>
+                  <a:pt x="15375549" y="-29445"/>
+                  <a:pt x="15386424" y="76562"/>
+                  <a:pt x="15651953" y="0"/>
+                </a:cubicBezTo>
+                <a:cubicBezTo>
+                  <a:pt x="15663539" y="184050"/>
+                  <a:pt x="15647872" y="346814"/>
+                  <a:pt x="15651953" y="577081"/>
+                </a:cubicBezTo>
+                <a:cubicBezTo>
+                  <a:pt x="15656034" y="807348"/>
+                  <a:pt x="15616105" y="828192"/>
+                  <a:pt x="15651953" y="1015663"/>
+                </a:cubicBezTo>
+                <a:cubicBezTo>
+                  <a:pt x="15687801" y="1203134"/>
+                  <a:pt x="15636488" y="1448258"/>
+                  <a:pt x="15651953" y="1592744"/>
+                </a:cubicBezTo>
+                <a:cubicBezTo>
+                  <a:pt x="15667418" y="1737230"/>
+                  <a:pt x="15646103" y="1952457"/>
+                  <a:pt x="15651953" y="2308324"/>
+                </a:cubicBezTo>
+                <a:cubicBezTo>
+                  <a:pt x="15657803" y="2664191"/>
+                  <a:pt x="15620709" y="2575876"/>
+                  <a:pt x="15651953" y="2677656"/>
+                </a:cubicBezTo>
+                <a:cubicBezTo>
+                  <a:pt x="15683197" y="2779436"/>
+                  <a:pt x="15638619" y="3232040"/>
+                  <a:pt x="15651953" y="3393237"/>
+                </a:cubicBezTo>
+                <a:cubicBezTo>
+                  <a:pt x="15665287" y="3554434"/>
+                  <a:pt x="15577117" y="3764484"/>
+                  <a:pt x="15651953" y="4108817"/>
+                </a:cubicBezTo>
+                <a:cubicBezTo>
+                  <a:pt x="15726789" y="4453150"/>
+                  <a:pt x="15650516" y="4391454"/>
+                  <a:pt x="15651953" y="4616649"/>
+                </a:cubicBezTo>
+                <a:cubicBezTo>
+                  <a:pt x="15653390" y="4841844"/>
+                  <a:pt x="15600945" y="5121949"/>
+                  <a:pt x="15651953" y="5332229"/>
+                </a:cubicBezTo>
+                <a:cubicBezTo>
+                  <a:pt x="15702961" y="5542509"/>
+                  <a:pt x="15637875" y="5634215"/>
+                  <a:pt x="15651953" y="5909310"/>
+                </a:cubicBezTo>
+                <a:cubicBezTo>
+                  <a:pt x="15666031" y="6184405"/>
+                  <a:pt x="15623477" y="6136353"/>
+                  <a:pt x="15651953" y="6278642"/>
+                </a:cubicBezTo>
+                <a:cubicBezTo>
+                  <a:pt x="15680429" y="6420931"/>
+                  <a:pt x="15645585" y="6631901"/>
+                  <a:pt x="15651953" y="6924973"/>
+                </a:cubicBezTo>
+                <a:cubicBezTo>
+                  <a:pt x="15416560" y="6981752"/>
+                  <a:pt x="15211892" y="6900554"/>
+                  <a:pt x="14915732" y="6924973"/>
+                </a:cubicBezTo>
+                <a:cubicBezTo>
+                  <a:pt x="14619572" y="6949392"/>
+                  <a:pt x="14461522" y="6914955"/>
+                  <a:pt x="14022990" y="6924973"/>
+                </a:cubicBezTo>
+                <a:cubicBezTo>
+                  <a:pt x="13584458" y="6934991"/>
+                  <a:pt x="13668708" y="6869583"/>
+                  <a:pt x="13443289" y="6924973"/>
+                </a:cubicBezTo>
+                <a:cubicBezTo>
+                  <a:pt x="13217870" y="6980363"/>
+                  <a:pt x="13138658" y="6918092"/>
+                  <a:pt x="13020106" y="6924973"/>
+                </a:cubicBezTo>
+                <a:cubicBezTo>
+                  <a:pt x="12901554" y="6931854"/>
+                  <a:pt x="12808160" y="6878516"/>
+                  <a:pt x="12596924" y="6924973"/>
+                </a:cubicBezTo>
+                <a:cubicBezTo>
+                  <a:pt x="12385688" y="6971430"/>
+                  <a:pt x="12144180" y="6891560"/>
+                  <a:pt x="11860702" y="6924973"/>
+                </a:cubicBezTo>
+                <a:cubicBezTo>
+                  <a:pt x="11577224" y="6958386"/>
+                  <a:pt x="11369536" y="6861664"/>
+                  <a:pt x="11124481" y="6924973"/>
+                </a:cubicBezTo>
+                <a:cubicBezTo>
+                  <a:pt x="10879426" y="6988282"/>
+                  <a:pt x="10554380" y="6864833"/>
+                  <a:pt x="10388259" y="6924973"/>
+                </a:cubicBezTo>
+                <a:cubicBezTo>
+                  <a:pt x="10222138" y="6985113"/>
+                  <a:pt x="9922024" y="6913113"/>
+                  <a:pt x="9495518" y="6924973"/>
+                </a:cubicBezTo>
+                <a:cubicBezTo>
+                  <a:pt x="9069012" y="6936833"/>
+                  <a:pt x="9326093" y="6916237"/>
+                  <a:pt x="9228855" y="6924973"/>
+                </a:cubicBezTo>
+                <a:cubicBezTo>
+                  <a:pt x="9131617" y="6933709"/>
+                  <a:pt x="8776600" y="6885996"/>
+                  <a:pt x="8649153" y="6924973"/>
+                </a:cubicBezTo>
+                <a:cubicBezTo>
+                  <a:pt x="8521706" y="6963950"/>
+                  <a:pt x="8584682" y="6918320"/>
+                  <a:pt x="8539010" y="6924973"/>
+                </a:cubicBezTo>
+                <a:cubicBezTo>
+                  <a:pt x="8493338" y="6931626"/>
+                  <a:pt x="8326544" y="6924425"/>
+                  <a:pt x="8272347" y="6924973"/>
+                </a:cubicBezTo>
+                <a:cubicBezTo>
+                  <a:pt x="8218150" y="6925521"/>
+                  <a:pt x="7939073" y="6858507"/>
+                  <a:pt x="7692645" y="6924973"/>
+                </a:cubicBezTo>
+                <a:cubicBezTo>
+                  <a:pt x="7446217" y="6991439"/>
+                  <a:pt x="7557029" y="6917808"/>
+                  <a:pt x="7425982" y="6924973"/>
+                </a:cubicBezTo>
+                <a:cubicBezTo>
+                  <a:pt x="7294935" y="6932138"/>
+                  <a:pt x="7230819" y="6924486"/>
+                  <a:pt x="7159319" y="6924973"/>
+                </a:cubicBezTo>
+                <a:cubicBezTo>
+                  <a:pt x="7087819" y="6925460"/>
+                  <a:pt x="6761977" y="6853469"/>
+                  <a:pt x="6423098" y="6924973"/>
+                </a:cubicBezTo>
+                <a:cubicBezTo>
+                  <a:pt x="6084219" y="6996477"/>
+                  <a:pt x="6358529" y="6923379"/>
+                  <a:pt x="6312954" y="6924973"/>
+                </a:cubicBezTo>
+                <a:cubicBezTo>
+                  <a:pt x="6267379" y="6926567"/>
+                  <a:pt x="5864885" y="6892411"/>
+                  <a:pt x="5576733" y="6924973"/>
+                </a:cubicBezTo>
+                <a:cubicBezTo>
+                  <a:pt x="5288581" y="6957535"/>
+                  <a:pt x="5043856" y="6867880"/>
+                  <a:pt x="4683992" y="6924973"/>
+                </a:cubicBezTo>
+                <a:cubicBezTo>
+                  <a:pt x="4324128" y="6982066"/>
+                  <a:pt x="4391097" y="6883260"/>
+                  <a:pt x="4260809" y="6924973"/>
+                </a:cubicBezTo>
+                <a:cubicBezTo>
+                  <a:pt x="4130521" y="6966686"/>
+                  <a:pt x="3971388" y="6890095"/>
+                  <a:pt x="3837627" y="6924973"/>
+                </a:cubicBezTo>
+                <a:cubicBezTo>
+                  <a:pt x="3703866" y="6959851"/>
+                  <a:pt x="3568940" y="6916169"/>
+                  <a:pt x="3414445" y="6924973"/>
+                </a:cubicBezTo>
+                <a:cubicBezTo>
+                  <a:pt x="3259950" y="6933777"/>
+                  <a:pt x="2722408" y="6912702"/>
+                  <a:pt x="2521704" y="6924973"/>
+                </a:cubicBezTo>
+                <a:cubicBezTo>
+                  <a:pt x="2321000" y="6937244"/>
+                  <a:pt x="1915857" y="6851219"/>
+                  <a:pt x="1628963" y="6924973"/>
+                </a:cubicBezTo>
+                <a:cubicBezTo>
+                  <a:pt x="1342069" y="6998727"/>
+                  <a:pt x="1369155" y="6918229"/>
+                  <a:pt x="1205780" y="6924973"/>
+                </a:cubicBezTo>
+                <a:cubicBezTo>
+                  <a:pt x="1042405" y="6931717"/>
+                  <a:pt x="1019663" y="6895895"/>
+                  <a:pt x="939117" y="6924973"/>
+                </a:cubicBezTo>
+                <a:cubicBezTo>
+                  <a:pt x="858571" y="6954051"/>
+                  <a:pt x="783493" y="6908657"/>
+                  <a:pt x="672454" y="6924973"/>
+                </a:cubicBezTo>
+                <a:cubicBezTo>
+                  <a:pt x="561415" y="6941289"/>
+                  <a:pt x="263520" y="6870360"/>
+                  <a:pt x="0" y="6924973"/>
+                </a:cubicBezTo>
+                <a:cubicBezTo>
+                  <a:pt x="-29697" y="6750351"/>
+                  <a:pt x="41623" y="6442310"/>
+                  <a:pt x="0" y="6278642"/>
+                </a:cubicBezTo>
+                <a:cubicBezTo>
+                  <a:pt x="-41623" y="6114974"/>
+                  <a:pt x="43366" y="6090283"/>
+                  <a:pt x="0" y="5909310"/>
+                </a:cubicBezTo>
+                <a:cubicBezTo>
+                  <a:pt x="-43366" y="5728337"/>
+                  <a:pt x="40574" y="5504237"/>
+                  <a:pt x="0" y="5401479"/>
+                </a:cubicBezTo>
+                <a:cubicBezTo>
+                  <a:pt x="-40574" y="5298721"/>
+                  <a:pt x="20338" y="5100349"/>
+                  <a:pt x="0" y="4962897"/>
+                </a:cubicBezTo>
+                <a:cubicBezTo>
+                  <a:pt x="-20338" y="4825445"/>
+                  <a:pt x="9064" y="4758122"/>
+                  <a:pt x="0" y="4593565"/>
+                </a:cubicBezTo>
+                <a:cubicBezTo>
+                  <a:pt x="-9064" y="4429008"/>
+                  <a:pt x="5106" y="4238060"/>
+                  <a:pt x="0" y="4085734"/>
+                </a:cubicBezTo>
+                <a:cubicBezTo>
+                  <a:pt x="-5106" y="3933408"/>
+                  <a:pt x="6465" y="3900617"/>
+                  <a:pt x="0" y="3716402"/>
+                </a:cubicBezTo>
+                <a:cubicBezTo>
+                  <a:pt x="-6465" y="3532187"/>
+                  <a:pt x="10374" y="3352135"/>
+                  <a:pt x="0" y="3208571"/>
+                </a:cubicBezTo>
+                <a:cubicBezTo>
+                  <a:pt x="-10374" y="3065007"/>
+                  <a:pt x="5603" y="2904472"/>
+                  <a:pt x="0" y="2769989"/>
+                </a:cubicBezTo>
+                <a:cubicBezTo>
+                  <a:pt x="-5603" y="2635506"/>
+                  <a:pt x="8504" y="2403398"/>
+                  <a:pt x="0" y="2192908"/>
+                </a:cubicBezTo>
+                <a:cubicBezTo>
+                  <a:pt x="-8504" y="1982418"/>
+                  <a:pt x="35122" y="1923875"/>
+                  <a:pt x="0" y="1823576"/>
+                </a:cubicBezTo>
+                <a:cubicBezTo>
+                  <a:pt x="-35122" y="1723277"/>
+                  <a:pt x="22811" y="1362031"/>
+                  <a:pt x="0" y="1107996"/>
+                </a:cubicBezTo>
+                <a:cubicBezTo>
+                  <a:pt x="-22811" y="853961"/>
+                  <a:pt x="20330" y="300256"/>
                   <a:pt x="0" y="0"/>
                 </a:cubicBezTo>
                 <a:close/>
               </a:path>
-              <a:path w="11985553" h="5078313" stroke="0" extrusionOk="0">
+              <a:path w="15651953" h="6924973" stroke="0" extrusionOk="0">
                 <a:moveTo>
                   <a:pt x="0" y="0"/>
                 </a:moveTo>
                 <a:cubicBezTo>
-                  <a:pt x="228529" y="-14188"/>
-                  <a:pt x="412511" y="73394"/>
-                  <a:pt x="719133" y="0"/>
-                </a:cubicBezTo>
-                <a:cubicBezTo>
-                  <a:pt x="1025755" y="-73394"/>
-                  <a:pt x="1043133" y="47284"/>
-                  <a:pt x="1198555" y="0"/>
-                </a:cubicBezTo>
-                <a:cubicBezTo>
-                  <a:pt x="1353977" y="-47284"/>
-                  <a:pt x="1604822" y="79628"/>
-                  <a:pt x="1917688" y="0"/>
-                </a:cubicBezTo>
-                <a:cubicBezTo>
-                  <a:pt x="2230554" y="-79628"/>
-                  <a:pt x="2336140" y="26861"/>
-                  <a:pt x="2516966" y="0"/>
-                </a:cubicBezTo>
-                <a:cubicBezTo>
-                  <a:pt x="2697792" y="-26861"/>
-                  <a:pt x="2992820" y="35402"/>
-                  <a:pt x="3116244" y="0"/>
-                </a:cubicBezTo>
-                <a:cubicBezTo>
-                  <a:pt x="3239668" y="-35402"/>
-                  <a:pt x="3575764" y="83557"/>
-                  <a:pt x="3835377" y="0"/>
-                </a:cubicBezTo>
-                <a:cubicBezTo>
-                  <a:pt x="4094990" y="-83557"/>
-                  <a:pt x="4312459" y="30567"/>
-                  <a:pt x="4554510" y="0"/>
-                </a:cubicBezTo>
-                <a:cubicBezTo>
-                  <a:pt x="4796561" y="-30567"/>
-                  <a:pt x="5102010" y="37719"/>
-                  <a:pt x="5393499" y="0"/>
-                </a:cubicBezTo>
-                <a:cubicBezTo>
-                  <a:pt x="5684988" y="-37719"/>
-                  <a:pt x="5720204" y="29483"/>
-                  <a:pt x="5992777" y="0"/>
-                </a:cubicBezTo>
-                <a:cubicBezTo>
-                  <a:pt x="6265350" y="-29483"/>
-                  <a:pt x="6116616" y="24907"/>
-                  <a:pt x="6232488" y="0"/>
-                </a:cubicBezTo>
-                <a:cubicBezTo>
-                  <a:pt x="6348360" y="-24907"/>
-                  <a:pt x="6374726" y="28695"/>
-                  <a:pt x="6472199" y="0"/>
-                </a:cubicBezTo>
-                <a:cubicBezTo>
-                  <a:pt x="6569672" y="-28695"/>
-                  <a:pt x="6792574" y="12824"/>
-                  <a:pt x="6951621" y="0"/>
-                </a:cubicBezTo>
-                <a:cubicBezTo>
-                  <a:pt x="7110668" y="-12824"/>
-                  <a:pt x="7195213" y="25541"/>
-                  <a:pt x="7311187" y="0"/>
-                </a:cubicBezTo>
-                <a:cubicBezTo>
-                  <a:pt x="7427161" y="-25541"/>
-                  <a:pt x="7781668" y="23571"/>
-                  <a:pt x="7910465" y="0"/>
-                </a:cubicBezTo>
-                <a:cubicBezTo>
-                  <a:pt x="8039262" y="-23571"/>
-                  <a:pt x="8172749" y="26377"/>
-                  <a:pt x="8270032" y="0"/>
-                </a:cubicBezTo>
-                <a:cubicBezTo>
-                  <a:pt x="8367315" y="-26377"/>
-                  <a:pt x="8578574" y="62151"/>
-                  <a:pt x="8869309" y="0"/>
-                </a:cubicBezTo>
-                <a:cubicBezTo>
-                  <a:pt x="9160044" y="-62151"/>
-                  <a:pt x="9261544" y="12122"/>
-                  <a:pt x="9468587" y="0"/>
-                </a:cubicBezTo>
-                <a:cubicBezTo>
-                  <a:pt x="9675630" y="-12122"/>
-                  <a:pt x="9695247" y="23420"/>
-                  <a:pt x="9828153" y="0"/>
-                </a:cubicBezTo>
-                <a:cubicBezTo>
-                  <a:pt x="9961059" y="-23420"/>
-                  <a:pt x="10198333" y="1486"/>
-                  <a:pt x="10307576" y="0"/>
-                </a:cubicBezTo>
-                <a:cubicBezTo>
-                  <a:pt x="10416819" y="-1486"/>
-                  <a:pt x="10841472" y="44480"/>
-                  <a:pt x="11026709" y="0"/>
-                </a:cubicBezTo>
-                <a:cubicBezTo>
-                  <a:pt x="11211946" y="-44480"/>
-                  <a:pt x="11696231" y="86753"/>
-                  <a:pt x="11985553" y="0"/>
-                </a:cubicBezTo>
-                <a:cubicBezTo>
-                  <a:pt x="11997261" y="227022"/>
-                  <a:pt x="11983912" y="377441"/>
-                  <a:pt x="11985553" y="513474"/>
-                </a:cubicBezTo>
-                <a:cubicBezTo>
-                  <a:pt x="11987194" y="649507"/>
-                  <a:pt x="11971497" y="786530"/>
-                  <a:pt x="11985553" y="976165"/>
-                </a:cubicBezTo>
-                <a:cubicBezTo>
-                  <a:pt x="11999609" y="1165800"/>
-                  <a:pt x="11978572" y="1445855"/>
-                  <a:pt x="11985553" y="1591205"/>
-                </a:cubicBezTo>
-                <a:cubicBezTo>
-                  <a:pt x="11992534" y="1736555"/>
-                  <a:pt x="11954975" y="1989193"/>
-                  <a:pt x="11985553" y="2257028"/>
-                </a:cubicBezTo>
-                <a:cubicBezTo>
-                  <a:pt x="12016131" y="2524863"/>
-                  <a:pt x="11956006" y="2630647"/>
-                  <a:pt x="11985553" y="2872068"/>
-                </a:cubicBezTo>
-                <a:cubicBezTo>
-                  <a:pt x="12015100" y="3113489"/>
-                  <a:pt x="11951704" y="3171630"/>
-                  <a:pt x="11985553" y="3436325"/>
-                </a:cubicBezTo>
-                <a:cubicBezTo>
-                  <a:pt x="12019402" y="3701020"/>
-                  <a:pt x="11958611" y="3764887"/>
-                  <a:pt x="11985553" y="3949799"/>
-                </a:cubicBezTo>
-                <a:cubicBezTo>
-                  <a:pt x="12012495" y="4134711"/>
-                  <a:pt x="11970042" y="4313274"/>
-                  <a:pt x="11985553" y="4463273"/>
-                </a:cubicBezTo>
-                <a:cubicBezTo>
-                  <a:pt x="12001064" y="4613272"/>
-                  <a:pt x="11971710" y="4936626"/>
-                  <a:pt x="11985553" y="5078313"/>
-                </a:cubicBezTo>
-                <a:cubicBezTo>
-                  <a:pt x="11678359" y="5097768"/>
-                  <a:pt x="11486682" y="5066196"/>
-                  <a:pt x="11266420" y="5078313"/>
-                </a:cubicBezTo>
-                <a:cubicBezTo>
-                  <a:pt x="11046158" y="5090430"/>
-                  <a:pt x="10618324" y="5021677"/>
-                  <a:pt x="10427431" y="5078313"/>
-                </a:cubicBezTo>
-                <a:cubicBezTo>
-                  <a:pt x="10236538" y="5134949"/>
-                  <a:pt x="10033684" y="5058875"/>
-                  <a:pt x="9828153" y="5078313"/>
-                </a:cubicBezTo>
-                <a:cubicBezTo>
-                  <a:pt x="9622622" y="5097751"/>
-                  <a:pt x="9482233" y="5049045"/>
-                  <a:pt x="9348731" y="5078313"/>
-                </a:cubicBezTo>
-                <a:cubicBezTo>
-                  <a:pt x="9215229" y="5107581"/>
-                  <a:pt x="8960285" y="5049190"/>
-                  <a:pt x="8629598" y="5078313"/>
-                </a:cubicBezTo>
-                <a:cubicBezTo>
-                  <a:pt x="8298911" y="5107436"/>
-                  <a:pt x="7959738" y="5055274"/>
-                  <a:pt x="7790609" y="5078313"/>
-                </a:cubicBezTo>
-                <a:cubicBezTo>
-                  <a:pt x="7621480" y="5101352"/>
-                  <a:pt x="7428428" y="5014700"/>
-                  <a:pt x="7191332" y="5078313"/>
-                </a:cubicBezTo>
-                <a:cubicBezTo>
-                  <a:pt x="6954236" y="5141926"/>
-                  <a:pt x="6930716" y="5036691"/>
-                  <a:pt x="6711910" y="5078313"/>
-                </a:cubicBezTo>
-                <a:cubicBezTo>
-                  <a:pt x="6493104" y="5119935"/>
-                  <a:pt x="6267848" y="5076935"/>
-                  <a:pt x="6112632" y="5078313"/>
-                </a:cubicBezTo>
-                <a:cubicBezTo>
-                  <a:pt x="5957416" y="5079691"/>
-                  <a:pt x="5653870" y="5047456"/>
-                  <a:pt x="5273643" y="5078313"/>
-                </a:cubicBezTo>
-                <a:cubicBezTo>
-                  <a:pt x="4893416" y="5109170"/>
-                  <a:pt x="5128535" y="5051183"/>
-                  <a:pt x="5033932" y="5078313"/>
-                </a:cubicBezTo>
-                <a:cubicBezTo>
-                  <a:pt x="4939329" y="5105443"/>
-                  <a:pt x="4727301" y="5048142"/>
-                  <a:pt x="4554510" y="5078313"/>
-                </a:cubicBezTo>
-                <a:cubicBezTo>
-                  <a:pt x="4381719" y="5108484"/>
-                  <a:pt x="4102004" y="5026981"/>
-                  <a:pt x="3955232" y="5078313"/>
-                </a:cubicBezTo>
-                <a:cubicBezTo>
-                  <a:pt x="3808460" y="5129645"/>
-                  <a:pt x="3458026" y="5007379"/>
-                  <a:pt x="3116244" y="5078313"/>
-                </a:cubicBezTo>
-                <a:cubicBezTo>
-                  <a:pt x="2774462" y="5149247"/>
-                  <a:pt x="2806234" y="5042643"/>
-                  <a:pt x="2516966" y="5078313"/>
-                </a:cubicBezTo>
-                <a:cubicBezTo>
-                  <a:pt x="2227698" y="5113983"/>
-                  <a:pt x="2223625" y="5036972"/>
-                  <a:pt x="2037544" y="5078313"/>
-                </a:cubicBezTo>
-                <a:cubicBezTo>
-                  <a:pt x="1851463" y="5119654"/>
-                  <a:pt x="1743365" y="5049644"/>
-                  <a:pt x="1558122" y="5078313"/>
-                </a:cubicBezTo>
-                <a:cubicBezTo>
-                  <a:pt x="1372879" y="5106982"/>
-                  <a:pt x="1146025" y="5043782"/>
-                  <a:pt x="838989" y="5078313"/>
-                </a:cubicBezTo>
-                <a:cubicBezTo>
-                  <a:pt x="531953" y="5112844"/>
-                  <a:pt x="310834" y="4982403"/>
-                  <a:pt x="0" y="5078313"/>
-                </a:cubicBezTo>
-                <a:cubicBezTo>
-                  <a:pt x="-26767" y="4911535"/>
-                  <a:pt x="17847" y="4713257"/>
-                  <a:pt x="0" y="4514056"/>
-                </a:cubicBezTo>
-                <a:cubicBezTo>
-                  <a:pt x="-17847" y="4314855"/>
-                  <a:pt x="67376" y="4134922"/>
-                  <a:pt x="0" y="3949799"/>
-                </a:cubicBezTo>
-                <a:cubicBezTo>
-                  <a:pt x="-67376" y="3764676"/>
-                  <a:pt x="19380" y="3522154"/>
-                  <a:pt x="0" y="3385542"/>
-                </a:cubicBezTo>
-                <a:cubicBezTo>
-                  <a:pt x="-19380" y="3248930"/>
-                  <a:pt x="46797" y="2973429"/>
-                  <a:pt x="0" y="2770502"/>
-                </a:cubicBezTo>
-                <a:cubicBezTo>
-                  <a:pt x="-46797" y="2567575"/>
-                  <a:pt x="46203" y="2412869"/>
-                  <a:pt x="0" y="2104679"/>
-                </a:cubicBezTo>
-                <a:cubicBezTo>
-                  <a:pt x="-46203" y="1796489"/>
-                  <a:pt x="7569" y="1699183"/>
-                  <a:pt x="0" y="1540422"/>
-                </a:cubicBezTo>
-                <a:cubicBezTo>
-                  <a:pt x="-7569" y="1381661"/>
-                  <a:pt x="15089" y="1161151"/>
-                  <a:pt x="0" y="1026948"/>
-                </a:cubicBezTo>
-                <a:cubicBezTo>
-                  <a:pt x="-15089" y="892745"/>
-                  <a:pt x="114522" y="381681"/>
+                  <a:pt x="339675" y="-73120"/>
+                  <a:pt x="564650" y="26762"/>
+                  <a:pt x="736221" y="0"/>
+                </a:cubicBezTo>
+                <a:cubicBezTo>
+                  <a:pt x="907792" y="-26762"/>
+                  <a:pt x="987219" y="28794"/>
+                  <a:pt x="1159404" y="0"/>
+                </a:cubicBezTo>
+                <a:cubicBezTo>
+                  <a:pt x="1331589" y="-28794"/>
+                  <a:pt x="1591223" y="22935"/>
+                  <a:pt x="1895625" y="0"/>
+                </a:cubicBezTo>
+                <a:cubicBezTo>
+                  <a:pt x="2200027" y="-22935"/>
+                  <a:pt x="2205696" y="66588"/>
+                  <a:pt x="2475327" y="0"/>
+                </a:cubicBezTo>
+                <a:cubicBezTo>
+                  <a:pt x="2744958" y="-66588"/>
+                  <a:pt x="2893236" y="50729"/>
+                  <a:pt x="3055029" y="0"/>
+                </a:cubicBezTo>
+                <a:cubicBezTo>
+                  <a:pt x="3216822" y="-50729"/>
+                  <a:pt x="3513415" y="42375"/>
+                  <a:pt x="3791251" y="0"/>
+                </a:cubicBezTo>
+                <a:cubicBezTo>
+                  <a:pt x="4069087" y="-42375"/>
+                  <a:pt x="4205869" y="15485"/>
+                  <a:pt x="4527472" y="0"/>
+                </a:cubicBezTo>
+                <a:cubicBezTo>
+                  <a:pt x="4849075" y="-15485"/>
+                  <a:pt x="5057144" y="23520"/>
+                  <a:pt x="5420213" y="0"/>
+                </a:cubicBezTo>
+                <a:cubicBezTo>
+                  <a:pt x="5783282" y="-23520"/>
+                  <a:pt x="5829888" y="45870"/>
+                  <a:pt x="5999915" y="0"/>
+                </a:cubicBezTo>
+                <a:cubicBezTo>
+                  <a:pt x="6169942" y="-45870"/>
+                  <a:pt x="6056473" y="9297"/>
+                  <a:pt x="6110059" y="0"/>
+                </a:cubicBezTo>
+                <a:cubicBezTo>
+                  <a:pt x="6163645" y="-9297"/>
+                  <a:pt x="6184089" y="4110"/>
+                  <a:pt x="6220202" y="0"/>
+                </a:cubicBezTo>
+                <a:cubicBezTo>
+                  <a:pt x="6256315" y="-4110"/>
+                  <a:pt x="6482452" y="28640"/>
+                  <a:pt x="6643384" y="0"/>
+                </a:cubicBezTo>
+                <a:cubicBezTo>
+                  <a:pt x="6804316" y="-28640"/>
+                  <a:pt x="6797439" y="30297"/>
+                  <a:pt x="6910047" y="0"/>
+                </a:cubicBezTo>
+                <a:cubicBezTo>
+                  <a:pt x="7022655" y="-30297"/>
+                  <a:pt x="7328657" y="38382"/>
+                  <a:pt x="7489749" y="0"/>
+                </a:cubicBezTo>
+                <a:cubicBezTo>
+                  <a:pt x="7650841" y="-38382"/>
+                  <a:pt x="7639258" y="11305"/>
+                  <a:pt x="7756412" y="0"/>
+                </a:cubicBezTo>
+                <a:cubicBezTo>
+                  <a:pt x="7873566" y="-11305"/>
+                  <a:pt x="8111350" y="62253"/>
+                  <a:pt x="8336114" y="0"/>
+                </a:cubicBezTo>
+                <a:cubicBezTo>
+                  <a:pt x="8560878" y="-62253"/>
+                  <a:pt x="8687517" y="14131"/>
+                  <a:pt x="8915816" y="0"/>
+                </a:cubicBezTo>
+                <a:cubicBezTo>
+                  <a:pt x="9144115" y="-14131"/>
+                  <a:pt x="9108801" y="3505"/>
+                  <a:pt x="9182479" y="0"/>
+                </a:cubicBezTo>
+                <a:cubicBezTo>
+                  <a:pt x="9256157" y="-3505"/>
+                  <a:pt x="9520276" y="27464"/>
+                  <a:pt x="9605662" y="0"/>
+                </a:cubicBezTo>
+                <a:cubicBezTo>
+                  <a:pt x="9691048" y="-27464"/>
+                  <a:pt x="10075586" y="59905"/>
+                  <a:pt x="10341883" y="0"/>
+                </a:cubicBezTo>
+                <a:cubicBezTo>
+                  <a:pt x="10608180" y="-59905"/>
+                  <a:pt x="10644021" y="1734"/>
+                  <a:pt x="10921585" y="0"/>
+                </a:cubicBezTo>
+                <a:cubicBezTo>
+                  <a:pt x="11199149" y="-1734"/>
+                  <a:pt x="11247406" y="43159"/>
+                  <a:pt x="11344767" y="0"/>
+                </a:cubicBezTo>
+                <a:cubicBezTo>
+                  <a:pt x="11442128" y="-43159"/>
+                  <a:pt x="11805500" y="24044"/>
+                  <a:pt x="11924469" y="0"/>
+                </a:cubicBezTo>
+                <a:cubicBezTo>
+                  <a:pt x="12043438" y="-24044"/>
+                  <a:pt x="12481713" y="64086"/>
+                  <a:pt x="12660691" y="0"/>
+                </a:cubicBezTo>
+                <a:cubicBezTo>
+                  <a:pt x="12839669" y="-64086"/>
+                  <a:pt x="12736263" y="6952"/>
+                  <a:pt x="12770834" y="0"/>
+                </a:cubicBezTo>
+                <a:cubicBezTo>
+                  <a:pt x="12805405" y="-6952"/>
+                  <a:pt x="13240644" y="15522"/>
+                  <a:pt x="13663575" y="0"/>
+                </a:cubicBezTo>
+                <a:cubicBezTo>
+                  <a:pt x="14086506" y="-15522"/>
+                  <a:pt x="14130642" y="34705"/>
+                  <a:pt x="14556316" y="0"/>
+                </a:cubicBezTo>
+                <a:cubicBezTo>
+                  <a:pt x="14981990" y="-34705"/>
+                  <a:pt x="14759519" y="12823"/>
+                  <a:pt x="14822979" y="0"/>
+                </a:cubicBezTo>
+                <a:cubicBezTo>
+                  <a:pt x="14886439" y="-12823"/>
+                  <a:pt x="15485818" y="64814"/>
+                  <a:pt x="15651953" y="0"/>
+                </a:cubicBezTo>
+                <a:cubicBezTo>
+                  <a:pt x="15693715" y="204861"/>
+                  <a:pt x="15619503" y="447224"/>
+                  <a:pt x="15651953" y="646331"/>
+                </a:cubicBezTo>
+                <a:cubicBezTo>
+                  <a:pt x="15684403" y="845438"/>
+                  <a:pt x="15585927" y="1140913"/>
+                  <a:pt x="15651953" y="1292662"/>
+                </a:cubicBezTo>
+                <a:cubicBezTo>
+                  <a:pt x="15717979" y="1444411"/>
+                  <a:pt x="15625934" y="1624812"/>
+                  <a:pt x="15651953" y="1800493"/>
+                </a:cubicBezTo>
+                <a:cubicBezTo>
+                  <a:pt x="15677972" y="1976174"/>
+                  <a:pt x="15617955" y="2168419"/>
+                  <a:pt x="15651953" y="2377574"/>
+                </a:cubicBezTo>
+                <a:cubicBezTo>
+                  <a:pt x="15685951" y="2586729"/>
+                  <a:pt x="15648879" y="2625949"/>
+                  <a:pt x="15651953" y="2746906"/>
+                </a:cubicBezTo>
+                <a:cubicBezTo>
+                  <a:pt x="15655027" y="2867863"/>
+                  <a:pt x="15643168" y="2937800"/>
+                  <a:pt x="15651953" y="3116238"/>
+                </a:cubicBezTo>
+                <a:cubicBezTo>
+                  <a:pt x="15660738" y="3294676"/>
+                  <a:pt x="15595914" y="3458301"/>
+                  <a:pt x="15651953" y="3693319"/>
+                </a:cubicBezTo>
+                <a:cubicBezTo>
+                  <a:pt x="15707992" y="3928337"/>
+                  <a:pt x="15644561" y="3985771"/>
+                  <a:pt x="15651953" y="4131901"/>
+                </a:cubicBezTo>
+                <a:cubicBezTo>
+                  <a:pt x="15659345" y="4278031"/>
+                  <a:pt x="15634760" y="4417259"/>
+                  <a:pt x="15651953" y="4639732"/>
+                </a:cubicBezTo>
+                <a:cubicBezTo>
+                  <a:pt x="15669146" y="4862205"/>
+                  <a:pt x="15604063" y="4985649"/>
+                  <a:pt x="15651953" y="5147563"/>
+                </a:cubicBezTo>
+                <a:cubicBezTo>
+                  <a:pt x="15699843" y="5309477"/>
+                  <a:pt x="15608354" y="5574245"/>
+                  <a:pt x="15651953" y="5863144"/>
+                </a:cubicBezTo>
+                <a:cubicBezTo>
+                  <a:pt x="15695552" y="6152043"/>
+                  <a:pt x="15613118" y="6114336"/>
+                  <a:pt x="15651953" y="6232476"/>
+                </a:cubicBezTo>
+                <a:cubicBezTo>
+                  <a:pt x="15690788" y="6350616"/>
+                  <a:pt x="15607975" y="6597618"/>
+                  <a:pt x="15651953" y="6924973"/>
+                </a:cubicBezTo>
+                <a:cubicBezTo>
+                  <a:pt x="15521386" y="6940071"/>
+                  <a:pt x="15453519" y="6905225"/>
+                  <a:pt x="15385290" y="6924973"/>
+                </a:cubicBezTo>
+                <a:cubicBezTo>
+                  <a:pt x="15317061" y="6944721"/>
+                  <a:pt x="14716828" y="6895550"/>
+                  <a:pt x="14492549" y="6924973"/>
+                </a:cubicBezTo>
+                <a:cubicBezTo>
+                  <a:pt x="14268270" y="6954396"/>
+                  <a:pt x="14101162" y="6860180"/>
+                  <a:pt x="13912847" y="6924973"/>
+                </a:cubicBezTo>
+                <a:cubicBezTo>
+                  <a:pt x="13724532" y="6989766"/>
+                  <a:pt x="13586684" y="6901017"/>
+                  <a:pt x="13489665" y="6924973"/>
+                </a:cubicBezTo>
+                <a:cubicBezTo>
+                  <a:pt x="13392646" y="6948929"/>
+                  <a:pt x="13251602" y="6906067"/>
+                  <a:pt x="13066482" y="6924973"/>
+                </a:cubicBezTo>
+                <a:cubicBezTo>
+                  <a:pt x="12881362" y="6943879"/>
+                  <a:pt x="12606264" y="6853950"/>
+                  <a:pt x="12330261" y="6924973"/>
+                </a:cubicBezTo>
+                <a:cubicBezTo>
+                  <a:pt x="12054258" y="6995996"/>
+                  <a:pt x="12188164" y="6903726"/>
+                  <a:pt x="12063598" y="6924973"/>
+                </a:cubicBezTo>
+                <a:cubicBezTo>
+                  <a:pt x="11939032" y="6946220"/>
+                  <a:pt x="11737153" y="6856497"/>
+                  <a:pt x="11483896" y="6924973"/>
+                </a:cubicBezTo>
+                <a:cubicBezTo>
+                  <a:pt x="11230639" y="6993449"/>
+                  <a:pt x="11199181" y="6894420"/>
+                  <a:pt x="11060713" y="6924973"/>
+                </a:cubicBezTo>
+                <a:cubicBezTo>
+                  <a:pt x="10922245" y="6955526"/>
+                  <a:pt x="10974722" y="6922895"/>
+                  <a:pt x="10950570" y="6924973"/>
+                </a:cubicBezTo>
+                <a:cubicBezTo>
+                  <a:pt x="10926418" y="6927051"/>
+                  <a:pt x="10889747" y="6915650"/>
+                  <a:pt x="10840427" y="6924973"/>
+                </a:cubicBezTo>
+                <a:cubicBezTo>
+                  <a:pt x="10791107" y="6934296"/>
+                  <a:pt x="10377749" y="6873663"/>
+                  <a:pt x="10104205" y="6924973"/>
+                </a:cubicBezTo>
+                <a:cubicBezTo>
+                  <a:pt x="9830661" y="6976283"/>
+                  <a:pt x="9400397" y="6902809"/>
+                  <a:pt x="9211464" y="6924973"/>
+                </a:cubicBezTo>
+                <a:cubicBezTo>
+                  <a:pt x="9022531" y="6947137"/>
+                  <a:pt x="9124647" y="6922185"/>
+                  <a:pt x="9101321" y="6924973"/>
+                </a:cubicBezTo>
+                <a:cubicBezTo>
+                  <a:pt x="9077995" y="6927761"/>
+                  <a:pt x="8908890" y="6914375"/>
+                  <a:pt x="8834658" y="6924973"/>
+                </a:cubicBezTo>
+                <a:cubicBezTo>
+                  <a:pt x="8760426" y="6935571"/>
+                  <a:pt x="8466013" y="6877825"/>
+                  <a:pt x="8098436" y="6924973"/>
+                </a:cubicBezTo>
+                <a:cubicBezTo>
+                  <a:pt x="7730859" y="6972121"/>
+                  <a:pt x="8038030" y="6919915"/>
+                  <a:pt x="7988293" y="6924973"/>
+                </a:cubicBezTo>
+                <a:cubicBezTo>
+                  <a:pt x="7938556" y="6930031"/>
+                  <a:pt x="7682610" y="6889346"/>
+                  <a:pt x="7408591" y="6924973"/>
+                </a:cubicBezTo>
+                <a:cubicBezTo>
+                  <a:pt x="7134572" y="6960600"/>
+                  <a:pt x="6722505" y="6908100"/>
+                  <a:pt x="6515850" y="6924973"/>
+                </a:cubicBezTo>
+                <a:cubicBezTo>
+                  <a:pt x="6309195" y="6941846"/>
+                  <a:pt x="6200463" y="6861704"/>
+                  <a:pt x="5936148" y="6924973"/>
+                </a:cubicBezTo>
+                <a:cubicBezTo>
+                  <a:pt x="5671833" y="6988242"/>
+                  <a:pt x="5541316" y="6890566"/>
+                  <a:pt x="5199927" y="6924973"/>
+                </a:cubicBezTo>
+                <a:cubicBezTo>
+                  <a:pt x="4858538" y="6959380"/>
+                  <a:pt x="4720808" y="6904512"/>
+                  <a:pt x="4307186" y="6924973"/>
+                </a:cubicBezTo>
+                <a:cubicBezTo>
+                  <a:pt x="3893564" y="6945434"/>
+                  <a:pt x="3924368" y="6864436"/>
+                  <a:pt x="3727484" y="6924973"/>
+                </a:cubicBezTo>
+                <a:cubicBezTo>
+                  <a:pt x="3530600" y="6985510"/>
+                  <a:pt x="3519109" y="6915710"/>
+                  <a:pt x="3460821" y="6924973"/>
+                </a:cubicBezTo>
+                <a:cubicBezTo>
+                  <a:pt x="3402533" y="6934236"/>
+                  <a:pt x="3317015" y="6921975"/>
+                  <a:pt x="3194158" y="6924973"/>
+                </a:cubicBezTo>
+                <a:cubicBezTo>
+                  <a:pt x="3071301" y="6927971"/>
+                  <a:pt x="2630983" y="6844804"/>
+                  <a:pt x="2301417" y="6924973"/>
+                </a:cubicBezTo>
+                <a:cubicBezTo>
+                  <a:pt x="1971851" y="7005142"/>
+                  <a:pt x="2143453" y="6907193"/>
+                  <a:pt x="2034754" y="6924973"/>
+                </a:cubicBezTo>
+                <a:cubicBezTo>
+                  <a:pt x="1926055" y="6942753"/>
+                  <a:pt x="1737998" y="6907094"/>
+                  <a:pt x="1611571" y="6924973"/>
+                </a:cubicBezTo>
+                <a:cubicBezTo>
+                  <a:pt x="1485144" y="6942852"/>
+                  <a:pt x="1378019" y="6912662"/>
+                  <a:pt x="1188389" y="6924973"/>
+                </a:cubicBezTo>
+                <a:cubicBezTo>
+                  <a:pt x="998759" y="6937284"/>
+                  <a:pt x="879081" y="6911991"/>
+                  <a:pt x="765207" y="6924973"/>
+                </a:cubicBezTo>
+                <a:cubicBezTo>
+                  <a:pt x="651333" y="6937955"/>
+                  <a:pt x="297109" y="6840614"/>
+                  <a:pt x="0" y="6924973"/>
+                </a:cubicBezTo>
+                <a:cubicBezTo>
+                  <a:pt x="-49694" y="6781806"/>
+                  <a:pt x="3359" y="6551610"/>
+                  <a:pt x="0" y="6417142"/>
+                </a:cubicBezTo>
+                <a:cubicBezTo>
+                  <a:pt x="-3359" y="6282674"/>
+                  <a:pt x="29245" y="5917090"/>
+                  <a:pt x="0" y="5701561"/>
+                </a:cubicBezTo>
+                <a:cubicBezTo>
+                  <a:pt x="-29245" y="5486032"/>
+                  <a:pt x="9933" y="5276142"/>
+                  <a:pt x="0" y="5124480"/>
+                </a:cubicBezTo>
+                <a:cubicBezTo>
+                  <a:pt x="-9933" y="4972818"/>
+                  <a:pt x="2210" y="4846401"/>
+                  <a:pt x="0" y="4685898"/>
+                </a:cubicBezTo>
+                <a:cubicBezTo>
+                  <a:pt x="-2210" y="4525395"/>
+                  <a:pt x="39449" y="4379022"/>
+                  <a:pt x="0" y="4247317"/>
+                </a:cubicBezTo>
+                <a:cubicBezTo>
+                  <a:pt x="-39449" y="4115612"/>
+                  <a:pt x="37025" y="3895417"/>
+                  <a:pt x="0" y="3670236"/>
+                </a:cubicBezTo>
+                <a:cubicBezTo>
+                  <a:pt x="-37025" y="3445055"/>
+                  <a:pt x="1598" y="3441162"/>
+                  <a:pt x="0" y="3300904"/>
+                </a:cubicBezTo>
+                <a:cubicBezTo>
+                  <a:pt x="-1598" y="3160646"/>
+                  <a:pt x="22577" y="2987738"/>
+                  <a:pt x="0" y="2793072"/>
+                </a:cubicBezTo>
+                <a:cubicBezTo>
+                  <a:pt x="-22577" y="2598406"/>
+                  <a:pt x="39460" y="2498343"/>
+                  <a:pt x="0" y="2423741"/>
+                </a:cubicBezTo>
+                <a:cubicBezTo>
+                  <a:pt x="-39460" y="2349139"/>
+                  <a:pt x="40154" y="2020082"/>
+                  <a:pt x="0" y="1777410"/>
+                </a:cubicBezTo>
+                <a:cubicBezTo>
+                  <a:pt x="-40154" y="1534738"/>
+                  <a:pt x="75598" y="1320043"/>
+                  <a:pt x="0" y="1131079"/>
+                </a:cubicBezTo>
+                <a:cubicBezTo>
+                  <a:pt x="-75598" y="942115"/>
+                  <a:pt x="30680" y="801806"/>
+                  <a:pt x="0" y="553998"/>
+                </a:cubicBezTo>
+                <a:cubicBezTo>
+                  <a:pt x="-30680" y="306190"/>
+                  <a:pt x="53717" y="263746"/>
                   <a:pt x="0" y="0"/>
                 </a:cubicBezTo>
                 <a:close/>
@@ -3983,23 +4398,65 @@
             </a:pPr>
             <a:r>
               <a:rPr lang="en-US" sz="4000" dirty="0"/>
-              <a:t>Presentations look much better in full screen view ✨ Press the </a:t>
+              <a:t>The full </a:t>
+            </a:r>
+            <a:r>
+              <a:rPr lang="en-US" sz="4000" dirty="0" err="1"/>
+              <a:t>Github</a:t>
+            </a:r>
+            <a:r>
+              <a:rPr lang="en-US" sz="4000" dirty="0"/>
+              <a:t> repository can be found </a:t>
+            </a:r>
+            <a:r>
+              <a:rPr lang="en-US" sz="4000" dirty="0">
+                <a:hlinkClick r:id="rId2"/>
+              </a:rPr>
+              <a:t>here</a:t>
+            </a:r>
+            <a:r>
+              <a:rPr lang="en-US" sz="4000" dirty="0"/>
+              <a:t>. If you click on </a:t>
             </a:r>
             <a:r>
               <a:rPr lang="en-US" sz="4000" b="1" dirty="0"/>
-              <a:t>F</a:t>
+              <a:t>code </a:t>
             </a:r>
             <a:r>
               <a:rPr lang="en-US" sz="4000" dirty="0"/>
-              <a:t> key to go full screen and </a:t>
+              <a:t> and </a:t>
             </a:r>
             <a:r>
               <a:rPr lang="en-US" sz="4000" b="1" dirty="0"/>
-              <a:t>ESC</a:t>
+              <a:t>download as zip</a:t>
             </a:r>
             <a:r>
               <a:rPr lang="en-US" sz="4000" dirty="0"/>
-              <a:t> to exit full screen.</a:t>
+              <a:t> you can download all files and view the slides without internet (go to </a:t>
+            </a:r>
+            <a:r>
+              <a:rPr lang="en-US" sz="4000" b="1" dirty="0"/>
+              <a:t>slide files </a:t>
+            </a:r>
+            <a:r>
+              <a:rPr lang="en-US" sz="4000" dirty="0"/>
+              <a:t>and click on the </a:t>
+            </a:r>
+            <a:r>
+              <a:rPr lang="en-US" sz="4000" b="1" dirty="0"/>
+              <a:t>.html </a:t>
+            </a:r>
+            <a:r>
+              <a:rPr lang="en-US" sz="4000" dirty="0"/>
+              <a:t>file</a:t>
+            </a:r>
+            <a:r>
+              <a:rPr lang="en-US" sz="4000" b="1" dirty="0"/>
+              <a:t> </a:t>
+            </a:r>
+            <a:r>
+              <a:rPr lang="en-US" sz="4000" dirty="0"/>
+              <a:t>corresponding to the desired lab).</a:t>
             </a:r>
           </a:p>
           <a:p>
@@ -4009,6 +4466,24 @@
             </a:pPr>
             <a:r>
               <a:rPr lang="en-US" sz="4000" dirty="0"/>
+              <a:t>Raw lab code can (.</a:t>
+            </a:r>
+            <a:r>
+              <a:rPr lang="en-US" sz="4000" dirty="0" err="1"/>
+              <a:t>Rmd</a:t>
+            </a:r>
+            <a:r>
+              <a:rPr lang="en-US" sz="4000" dirty="0"/>
+              <a:t> files) be found here. Lab activities with answers can be found here. </a:t>
+            </a:r>
+          </a:p>
+          <a:p>
+            <a:pPr marL="685800" indent="-685800">
+              <a:buFont typeface="Arial" panose="020B0604020202020204" pitchFamily="34" charset="0"/>
+              <a:buChar char="•"/>
+            </a:pPr>
+            <a:r>
+              <a:rPr lang="en-US" sz="4000" dirty="0"/>
               <a:t>To download the </a:t>
             </a:r>
             <a:r>
@@ -4035,7 +4510,24 @@
               <a:rPr lang="en-US" sz="4000" dirty="0"/>
               <a:t>🖨️</a:t>
             </a:r>
-            <a:endParaRPr lang="en-US" sz="1050" dirty="0"/>
+          </a:p>
+          <a:p>
+            <a:pPr marL="685800" indent="-685800">
+              <a:buFont typeface="Arial" panose="020B0604020202020204" pitchFamily="34" charset="0"/>
+              <a:buChar char="•"/>
+            </a:pPr>
+            <a:r>
+              <a:rPr lang="en-US" sz="4000" dirty="0"/>
+              <a:t>See here to find out more about the slides and </a:t>
+            </a:r>
+            <a:r>
+              <a:rPr lang="en-US" sz="4000" dirty="0" err="1"/>
+              <a:t>RevealJS</a:t>
+            </a:r>
+            <a:r>
+              <a:rPr lang="en-US" sz="4000" dirty="0"/>
+              <a:t> </a:t>
+            </a:r>
           </a:p>
         </p:txBody>
       </p:sp>
@@ -4177,7 +4669,7 @@
       <p:sp>
         <p:nvSpPr>
           <p:cNvPr id="17" name="Oval 16">
-            <a:hlinkClick r:id="rId2"/>
+            <a:hlinkClick r:id="rId3"/>
             <a:extLst>
               <a:ext uri="{FF2B5EF4-FFF2-40B4-BE49-F238E27FC236}">
                 <a16:creationId xmlns:a16="http://schemas.microsoft.com/office/drawing/2014/main" id="{BD546B4F-AD86-8A65-9590-FAFAD96A2B44}"/>
@@ -4356,7 +4848,7 @@
                 <a:ea typeface="+mn-ea"/>
                 <a:cs typeface="+mn-cs"/>
               </a:rPr>
-              <a:t>Hypothesis testing and Bivariate Distributions</a:t>
+              <a:t>One-predictor Regression</a:t>
             </a:r>
             <a:endParaRPr lang="en-US" sz="3600" dirty="0">
               <a:solidFill>
@@ -4369,7 +4861,7 @@
       <p:sp>
         <p:nvSpPr>
           <p:cNvPr id="19" name="Oval 18">
-            <a:hlinkClick r:id="rId3"/>
+            <a:hlinkClick r:id="rId4"/>
             <a:extLst>
               <a:ext uri="{FF2B5EF4-FFF2-40B4-BE49-F238E27FC236}">
                 <a16:creationId xmlns:a16="http://schemas.microsoft.com/office/drawing/2014/main" id="{635C5EF4-037C-40F8-C8E6-D0C679A0CF28}"/>
@@ -4586,21 +5078,13 @@
               <a:defRPr/>
             </a:pPr>
             <a:r>
-              <a:rPr kumimoji="0" lang="en-US" sz="3600" b="0" i="0" u="none" strike="noStrike" kern="1200" cap="none" spc="0" normalizeH="0" baseline="0" noProof="0" dirty="0">
-                <a:ln>
-                  <a:noFill/>
-                </a:ln>
+              <a:rPr lang="en-US" sz="3600" dirty="0">
                 <a:solidFill>
                   <a:prstClr val="black"/>
                 </a:solidFill>
-                <a:effectLst/>
-                <a:uLnTx/>
-                <a:uFillTx/>
                 <a:latin typeface="Calibri" panose="020F0502020204030204"/>
-                <a:ea typeface="+mn-ea"/>
-                <a:cs typeface="+mn-cs"/>
               </a:rPr>
-              <a:t>Reporting Results</a:t>
+              <a:t>Significance Tests and Reporting Results</a:t>
             </a:r>
             <a:endParaRPr lang="en-US" dirty="0"/>
           </a:p>
@@ -4609,7 +5093,7 @@
       <p:sp>
         <p:nvSpPr>
           <p:cNvPr id="20" name="Oval 19">
-            <a:hlinkClick r:id="rId4"/>
+            <a:hlinkClick r:id="rId5"/>
             <a:extLst>
               <a:ext uri="{FF2B5EF4-FFF2-40B4-BE49-F238E27FC236}">
                 <a16:creationId xmlns:a16="http://schemas.microsoft.com/office/drawing/2014/main" id="{066A5C91-34B2-5B2A-10D2-FED081674025}"/>
@@ -4829,7 +5313,7 @@
                 <a:latin typeface="Calibri" panose="020F0502020204030204" pitchFamily="34" charset="0"/>
                 <a:ea typeface="SimSun" panose="02010600030101010101" pitchFamily="2" charset="-122"/>
               </a:rPr>
-              <a:t>Two-Predictor Regression 1</a:t>
+              <a:t>Introduction To Two-Predictor Regression</a:t>
             </a:r>
             <a:endParaRPr lang="en-US" dirty="0">
               <a:solidFill>
@@ -4842,7 +5326,7 @@
       <p:sp>
         <p:nvSpPr>
           <p:cNvPr id="23" name="Oval 22">
-            <a:hlinkClick r:id="rId5"/>
+            <a:hlinkClick r:id="rId6"/>
             <a:extLst>
               <a:ext uri="{FF2B5EF4-FFF2-40B4-BE49-F238E27FC236}">
                 <a16:creationId xmlns:a16="http://schemas.microsoft.com/office/drawing/2014/main" id="{F6DACF5E-4475-D998-F1D6-982C2FB9A981}"/>
@@ -5057,29 +5541,35 @@
               <a:defRPr/>
             </a:pPr>
             <a:r>
-              <a:rPr kumimoji="0" lang="en-US" sz="3600" b="0" i="0" u="none" strike="noStrike" kern="1200" cap="none" spc="0" normalizeH="0" baseline="0" noProof="0" dirty="0">
-                <a:ln>
-                  <a:noFill/>
-                </a:ln>
+              <a:rPr lang="en-US" sz="3600" dirty="0">
                 <a:solidFill>
                   <a:prstClr val="black"/>
                 </a:solidFill>
-                <a:effectLst/>
-                <a:uLnTx/>
-                <a:uFillTx/>
                 <a:latin typeface="Calibri" panose="020F0502020204030204"/>
-                <a:ea typeface="+mn-ea"/>
-                <a:cs typeface="+mn-cs"/>
               </a:rPr>
-              <a:t>Two-Predictor Regression 2</a:t>
-            </a:r>
+              <a:t>Added Variable Plots and Bootstrapping</a:t>
+            </a:r>
+            <a:endParaRPr kumimoji="0" lang="en-US" sz="3600" b="0" i="0" u="none" strike="noStrike" kern="1200" cap="none" spc="0" normalizeH="0" baseline="0" noProof="0" dirty="0">
+              <a:ln>
+                <a:noFill/>
+              </a:ln>
+              <a:solidFill>
+                <a:prstClr val="black"/>
+              </a:solidFill>
+              <a:effectLst/>
+              <a:uLnTx/>
+              <a:uFillTx/>
+              <a:latin typeface="Calibri" panose="020F0502020204030204"/>
+              <a:ea typeface="+mn-ea"/>
+              <a:cs typeface="+mn-cs"/>
+            </a:endParaRPr>
           </a:p>
         </p:txBody>
       </p:sp>
       <p:sp>
         <p:nvSpPr>
           <p:cNvPr id="33" name="Oval 32">
-            <a:hlinkClick r:id="rId6"/>
+            <a:hlinkClick r:id="rId7"/>
             <a:extLst>
               <a:ext uri="{FF2B5EF4-FFF2-40B4-BE49-F238E27FC236}">
                 <a16:creationId xmlns:a16="http://schemas.microsoft.com/office/drawing/2014/main" id="{2D5AD945-F863-3DE5-C34C-63C8D51AD1D6}"/>
@@ -5305,7 +5795,33 @@
                 <a:ea typeface="+mn-ea"/>
                 <a:cs typeface="+mn-cs"/>
               </a:rPr>
-              <a:t>Multicollinearity, Suppression, Dominance Analysis</a:t>
+              <a:t>Multicollinearity</a:t>
+            </a:r>
+            <a:r>
+              <a:rPr lang="en-US" sz="3600" dirty="0">
+                <a:solidFill>
+                  <a:prstClr val="black"/>
+                </a:solidFill>
+                <a:latin typeface="Calibri" panose="020F0502020204030204"/>
+              </a:rPr>
+              <a:t> And </a:t>
+            </a:r>
+            <a:r>
+              <a:rPr kumimoji="0" lang="en-US" sz="3600" b="0" i="0" u="none" strike="noStrike" kern="1200" cap="none" spc="0" normalizeH="0" baseline="0" noProof="0" dirty="0">
+                <a:ln>
+                  <a:noFill/>
+                </a:ln>
+                <a:solidFill>
+                  <a:prstClr val="black"/>
+                </a:solidFill>
+                <a:effectLst/>
+                <a:uLnTx/>
+                <a:uFillTx/>
+                <a:latin typeface="Calibri" panose="020F0502020204030204"/>
+                <a:ea typeface="+mn-ea"/>
+                <a:cs typeface="+mn-cs"/>
+              </a:rPr>
+              <a:t>Dominance Analysis</a:t>
             </a:r>
           </a:p>
         </p:txBody>
@@ -5313,7 +5829,7 @@
       <p:sp>
         <p:nvSpPr>
           <p:cNvPr id="34" name="Oval 33">
-            <a:hlinkClick r:id="rId7"/>
+            <a:hlinkClick r:id="rId8"/>
             <a:extLst>
               <a:ext uri="{FF2B5EF4-FFF2-40B4-BE49-F238E27FC236}">
                 <a16:creationId xmlns:a16="http://schemas.microsoft.com/office/drawing/2014/main" id="{9677DEA8-9A23-1D6A-8E1E-0BA639BF7255}"/>
@@ -5526,7 +6042,7 @@
                 </a:solidFill>
                 <a:latin typeface="Calibri" panose="020F0502020204030204"/>
               </a:rPr>
-              <a:t>Variance Explained, Semi-partial and Partial-correlations</a:t>
+              <a:t>Semi-Partial, Partial-Correlations, and Model Comparison</a:t>
             </a:r>
           </a:p>
         </p:txBody>
@@ -5534,7 +6050,7 @@
       <p:sp>
         <p:nvSpPr>
           <p:cNvPr id="36" name="Oval 35">
-            <a:hlinkClick r:id="rId8"/>
+            <a:hlinkClick r:id="rId9"/>
             <a:extLst>
               <a:ext uri="{FF2B5EF4-FFF2-40B4-BE49-F238E27FC236}">
                 <a16:creationId xmlns:a16="http://schemas.microsoft.com/office/drawing/2014/main" id="{E46EB02D-D71F-57F6-A05C-18E3B8DE2183}"/>
@@ -5754,7 +6270,7 @@
       <p:sp>
         <p:nvSpPr>
           <p:cNvPr id="37" name="Oval 36">
-            <a:hlinkClick r:id="rId9"/>
+            <a:hlinkClick r:id="rId10"/>
             <a:extLst>
               <a:ext uri="{FF2B5EF4-FFF2-40B4-BE49-F238E27FC236}">
                 <a16:creationId xmlns:a16="http://schemas.microsoft.com/office/drawing/2014/main" id="{2A2FD08A-55AC-8072-0913-E76B9F9B203D}"/>
@@ -6014,7 +6530,7 @@
       <p:sp>
         <p:nvSpPr>
           <p:cNvPr id="39" name="Oval 38">
-            <a:hlinkClick r:id="rId10"/>
+            <a:hlinkClick r:id="rId11"/>
             <a:extLst>
               <a:ext uri="{FF2B5EF4-FFF2-40B4-BE49-F238E27FC236}">
                 <a16:creationId xmlns:a16="http://schemas.microsoft.com/office/drawing/2014/main" id="{6BD683B4-68D0-6782-B719-2D257C703896}"/>
@@ -6343,7 +6859,7 @@
       <p:sp>
         <p:nvSpPr>
           <p:cNvPr id="43" name="Oval 42">
-            <a:hlinkClick r:id="rId11"/>
+            <a:hlinkClick r:id="rId12"/>
             <a:extLst>
               <a:ext uri="{FF2B5EF4-FFF2-40B4-BE49-F238E27FC236}">
                 <a16:creationId xmlns:a16="http://schemas.microsoft.com/office/drawing/2014/main" id="{4BB43E75-5B08-FDB4-03C8-4977549DD2CE}"/>
@@ -6586,7 +7102,7 @@
       <p:sp>
         <p:nvSpPr>
           <p:cNvPr id="46" name="Oval 45">
-            <a:hlinkClick r:id="rId12"/>
+            <a:hlinkClick r:id="rId13"/>
             <a:extLst>
               <a:ext uri="{FF2B5EF4-FFF2-40B4-BE49-F238E27FC236}">
                 <a16:creationId xmlns:a16="http://schemas.microsoft.com/office/drawing/2014/main" id="{5A70C63C-A76F-CA9B-4802-63CF5C53D08B}"/>
@@ -6823,7 +7339,7 @@
       <p:sp>
         <p:nvSpPr>
           <p:cNvPr id="56" name="Oval 55">
-            <a:hlinkClick r:id="rId13"/>
+            <a:hlinkClick r:id="rId14"/>
             <a:extLst>
               <a:ext uri="{FF2B5EF4-FFF2-40B4-BE49-F238E27FC236}">
                 <a16:creationId xmlns:a16="http://schemas.microsoft.com/office/drawing/2014/main" id="{898A07D2-6C18-151E-B6F8-00A269D65E5C}"/>
@@ -7043,7 +7559,7 @@
       <p:sp>
         <p:nvSpPr>
           <p:cNvPr id="58" name="Oval 57">
-            <a:hlinkClick r:id="rId14"/>
+            <a:hlinkClick r:id="rId15"/>
             <a:extLst>
               <a:ext uri="{FF2B5EF4-FFF2-40B4-BE49-F238E27FC236}">
                 <a16:creationId xmlns:a16="http://schemas.microsoft.com/office/drawing/2014/main" id="{D6CA818E-008A-9A28-B222-CE0C6D161B99}"/>
@@ -7861,7 +8377,7 @@
       <p:sp>
         <p:nvSpPr>
           <p:cNvPr id="79" name="Oval 78">
-            <a:hlinkClick r:id="rId15"/>
+            <a:hlinkClick r:id="rId16"/>
             <a:extLst>
               <a:ext uri="{FF2B5EF4-FFF2-40B4-BE49-F238E27FC236}">
                 <a16:creationId xmlns:a16="http://schemas.microsoft.com/office/drawing/2014/main" id="{BB9E296B-4FCF-EE98-E468-5DD20A44D561}"/>
@@ -8028,7 +8544,7 @@
                   <a:schemeClr val="tx1"/>
                 </a:solidFill>
               </a:rPr>
-              <a:t>Introduction to Regression </a:t>
+              <a:t>Descriptive Statistics and Plots</a:t>
             </a:r>
           </a:p>
         </p:txBody>
@@ -8910,29 +9426,29 @@
             </a:r>
             <a:r>
               <a:rPr lang="en-US" sz="4000" b="1" dirty="0" err="1">
-                <a:hlinkClick r:id="rId16"/>
+                <a:hlinkClick r:id="rId17"/>
               </a:rPr>
               <a:t>Zihuan</a:t>
-            </a:r>
-            <a:r>
-              <a:rPr lang="en-US" sz="4000" b="1" dirty="0">
-                <a:hlinkClick r:id="rId16"/>
-              </a:rPr>
-              <a:t> Cao </a:t>
-            </a:r>
-            <a:r>
-              <a:rPr lang="en-US" sz="4000" dirty="0"/>
-              <a:t>and </a:t>
             </a:r>
             <a:r>
               <a:rPr lang="en-US" sz="4000" b="1" dirty="0">
                 <a:hlinkClick r:id="rId17"/>
               </a:rPr>
+              <a:t> Cao </a:t>
+            </a:r>
+            <a:r>
+              <a:rPr lang="en-US" sz="4000" dirty="0"/>
+              <a:t>and </a:t>
+            </a:r>
+            <a:r>
+              <a:rPr lang="en-US" sz="4000" b="1" dirty="0">
+                <a:hlinkClick r:id="rId18"/>
+              </a:rPr>
               <a:t>Jay Plourde</a:t>
             </a:r>
             <a:r>
               <a:rPr lang="en-US" sz="4000" dirty="0">
-                <a:hlinkClick r:id="rId17"/>
+                <a:hlinkClick r:id="rId18"/>
               </a:rPr>
               <a:t> </a:t>
             </a:r>

</xml_diff>

<commit_message>
Added some animations and started Lab 2 activity
</commit_message>
<xml_diff>
--- a/Poster/Regression Lab Poster.pptx
+++ b/Poster/Regression Lab Poster.pptx
@@ -3046,182 +3046,182 @@
         </p:nvSpPr>
         <p:spPr>
           <a:xfrm>
-            <a:off x="3113209" y="6689391"/>
-            <a:ext cx="15651953" cy="6924973"/>
+            <a:off x="3076302" y="6221692"/>
+            <a:ext cx="15987554" cy="7694414"/>
           </a:xfrm>
           <a:custGeom>
             <a:avLst/>
             <a:gdLst>
-              <a:gd name="connsiteX0" fmla="*/ 0 w 15651953"/>
-              <a:gd name="connsiteY0" fmla="*/ 0 h 6924973"/>
-              <a:gd name="connsiteX1" fmla="*/ 579702 w 15651953"/>
-              <a:gd name="connsiteY1" fmla="*/ 0 h 6924973"/>
-              <a:gd name="connsiteX2" fmla="*/ 1159404 w 15651953"/>
-              <a:gd name="connsiteY2" fmla="*/ 0 h 6924973"/>
-              <a:gd name="connsiteX3" fmla="*/ 1739106 w 15651953"/>
-              <a:gd name="connsiteY3" fmla="*/ 0 h 6924973"/>
-              <a:gd name="connsiteX4" fmla="*/ 2162288 w 15651953"/>
-              <a:gd name="connsiteY4" fmla="*/ 0 h 6924973"/>
-              <a:gd name="connsiteX5" fmla="*/ 2741990 w 15651953"/>
-              <a:gd name="connsiteY5" fmla="*/ 0 h 6924973"/>
-              <a:gd name="connsiteX6" fmla="*/ 3634731 w 15651953"/>
-              <a:gd name="connsiteY6" fmla="*/ 0 h 6924973"/>
-              <a:gd name="connsiteX7" fmla="*/ 4527472 w 15651953"/>
-              <a:gd name="connsiteY7" fmla="*/ 0 h 6924973"/>
-              <a:gd name="connsiteX8" fmla="*/ 4637616 w 15651953"/>
-              <a:gd name="connsiteY8" fmla="*/ 0 h 6924973"/>
-              <a:gd name="connsiteX9" fmla="*/ 5060798 w 15651953"/>
-              <a:gd name="connsiteY9" fmla="*/ 0 h 6924973"/>
-              <a:gd name="connsiteX10" fmla="*/ 5953539 w 15651953"/>
-              <a:gd name="connsiteY10" fmla="*/ 0 h 6924973"/>
-              <a:gd name="connsiteX11" fmla="*/ 6063683 w 15651953"/>
-              <a:gd name="connsiteY11" fmla="*/ 0 h 6924973"/>
-              <a:gd name="connsiteX12" fmla="*/ 6173826 w 15651953"/>
-              <a:gd name="connsiteY12" fmla="*/ 0 h 6924973"/>
-              <a:gd name="connsiteX13" fmla="*/ 6753528 w 15651953"/>
-              <a:gd name="connsiteY13" fmla="*/ 0 h 6924973"/>
-              <a:gd name="connsiteX14" fmla="*/ 7020191 w 15651953"/>
-              <a:gd name="connsiteY14" fmla="*/ 0 h 6924973"/>
-              <a:gd name="connsiteX15" fmla="*/ 7912932 w 15651953"/>
-              <a:gd name="connsiteY15" fmla="*/ 0 h 6924973"/>
-              <a:gd name="connsiteX16" fmla="*/ 8179595 w 15651953"/>
-              <a:gd name="connsiteY16" fmla="*/ 0 h 6924973"/>
-              <a:gd name="connsiteX17" fmla="*/ 8446258 w 15651953"/>
-              <a:gd name="connsiteY17" fmla="*/ 0 h 6924973"/>
-              <a:gd name="connsiteX18" fmla="*/ 8712921 w 15651953"/>
-              <a:gd name="connsiteY18" fmla="*/ 0 h 6924973"/>
-              <a:gd name="connsiteX19" fmla="*/ 8979583 w 15651953"/>
-              <a:gd name="connsiteY19" fmla="*/ 0 h 6924973"/>
-              <a:gd name="connsiteX20" fmla="*/ 9559285 w 15651953"/>
-              <a:gd name="connsiteY20" fmla="*/ 0 h 6924973"/>
-              <a:gd name="connsiteX21" fmla="*/ 10452026 w 15651953"/>
-              <a:gd name="connsiteY21" fmla="*/ 0 h 6924973"/>
-              <a:gd name="connsiteX22" fmla="*/ 11344767 w 15651953"/>
-              <a:gd name="connsiteY22" fmla="*/ 0 h 6924973"/>
-              <a:gd name="connsiteX23" fmla="*/ 12080989 w 15651953"/>
-              <a:gd name="connsiteY23" fmla="*/ 0 h 6924973"/>
-              <a:gd name="connsiteX24" fmla="*/ 12191132 w 15651953"/>
-              <a:gd name="connsiteY24" fmla="*/ 0 h 6924973"/>
-              <a:gd name="connsiteX25" fmla="*/ 12301276 w 15651953"/>
-              <a:gd name="connsiteY25" fmla="*/ 0 h 6924973"/>
-              <a:gd name="connsiteX26" fmla="*/ 12411419 w 15651953"/>
-              <a:gd name="connsiteY26" fmla="*/ 0 h 6924973"/>
-              <a:gd name="connsiteX27" fmla="*/ 13147641 w 15651953"/>
-              <a:gd name="connsiteY27" fmla="*/ 0 h 6924973"/>
-              <a:gd name="connsiteX28" fmla="*/ 14040382 w 15651953"/>
-              <a:gd name="connsiteY28" fmla="*/ 0 h 6924973"/>
-              <a:gd name="connsiteX29" fmla="*/ 14933123 w 15651953"/>
-              <a:gd name="connsiteY29" fmla="*/ 0 h 6924973"/>
-              <a:gd name="connsiteX30" fmla="*/ 15651953 w 15651953"/>
-              <a:gd name="connsiteY30" fmla="*/ 0 h 6924973"/>
-              <a:gd name="connsiteX31" fmla="*/ 15651953 w 15651953"/>
-              <a:gd name="connsiteY31" fmla="*/ 577081 h 6924973"/>
-              <a:gd name="connsiteX32" fmla="*/ 15651953 w 15651953"/>
-              <a:gd name="connsiteY32" fmla="*/ 1015663 h 6924973"/>
-              <a:gd name="connsiteX33" fmla="*/ 15651953 w 15651953"/>
-              <a:gd name="connsiteY33" fmla="*/ 1592744 h 6924973"/>
-              <a:gd name="connsiteX34" fmla="*/ 15651953 w 15651953"/>
-              <a:gd name="connsiteY34" fmla="*/ 2308324 h 6924973"/>
-              <a:gd name="connsiteX35" fmla="*/ 15651953 w 15651953"/>
-              <a:gd name="connsiteY35" fmla="*/ 2677656 h 6924973"/>
-              <a:gd name="connsiteX36" fmla="*/ 15651953 w 15651953"/>
-              <a:gd name="connsiteY36" fmla="*/ 3393237 h 6924973"/>
-              <a:gd name="connsiteX37" fmla="*/ 15651953 w 15651953"/>
-              <a:gd name="connsiteY37" fmla="*/ 4108817 h 6924973"/>
-              <a:gd name="connsiteX38" fmla="*/ 15651953 w 15651953"/>
-              <a:gd name="connsiteY38" fmla="*/ 4616649 h 6924973"/>
-              <a:gd name="connsiteX39" fmla="*/ 15651953 w 15651953"/>
-              <a:gd name="connsiteY39" fmla="*/ 5332229 h 6924973"/>
-              <a:gd name="connsiteX40" fmla="*/ 15651953 w 15651953"/>
-              <a:gd name="connsiteY40" fmla="*/ 5909310 h 6924973"/>
-              <a:gd name="connsiteX41" fmla="*/ 15651953 w 15651953"/>
-              <a:gd name="connsiteY41" fmla="*/ 6278642 h 6924973"/>
-              <a:gd name="connsiteX42" fmla="*/ 15651953 w 15651953"/>
-              <a:gd name="connsiteY42" fmla="*/ 6924973 h 6924973"/>
-              <a:gd name="connsiteX43" fmla="*/ 14915732 w 15651953"/>
-              <a:gd name="connsiteY43" fmla="*/ 6924973 h 6924973"/>
-              <a:gd name="connsiteX44" fmla="*/ 14022990 w 15651953"/>
-              <a:gd name="connsiteY44" fmla="*/ 6924973 h 6924973"/>
-              <a:gd name="connsiteX45" fmla="*/ 13443289 w 15651953"/>
-              <a:gd name="connsiteY45" fmla="*/ 6924973 h 6924973"/>
-              <a:gd name="connsiteX46" fmla="*/ 13020106 w 15651953"/>
-              <a:gd name="connsiteY46" fmla="*/ 6924973 h 6924973"/>
-              <a:gd name="connsiteX47" fmla="*/ 12596924 w 15651953"/>
-              <a:gd name="connsiteY47" fmla="*/ 6924973 h 6924973"/>
-              <a:gd name="connsiteX48" fmla="*/ 11860702 w 15651953"/>
-              <a:gd name="connsiteY48" fmla="*/ 6924973 h 6924973"/>
-              <a:gd name="connsiteX49" fmla="*/ 11124481 w 15651953"/>
-              <a:gd name="connsiteY49" fmla="*/ 6924973 h 6924973"/>
-              <a:gd name="connsiteX50" fmla="*/ 10388259 w 15651953"/>
-              <a:gd name="connsiteY50" fmla="*/ 6924973 h 6924973"/>
-              <a:gd name="connsiteX51" fmla="*/ 9495518 w 15651953"/>
-              <a:gd name="connsiteY51" fmla="*/ 6924973 h 6924973"/>
-              <a:gd name="connsiteX52" fmla="*/ 9228855 w 15651953"/>
-              <a:gd name="connsiteY52" fmla="*/ 6924973 h 6924973"/>
-              <a:gd name="connsiteX53" fmla="*/ 8649153 w 15651953"/>
-              <a:gd name="connsiteY53" fmla="*/ 6924973 h 6924973"/>
-              <a:gd name="connsiteX54" fmla="*/ 8539010 w 15651953"/>
-              <a:gd name="connsiteY54" fmla="*/ 6924973 h 6924973"/>
-              <a:gd name="connsiteX55" fmla="*/ 8272347 w 15651953"/>
-              <a:gd name="connsiteY55" fmla="*/ 6924973 h 6924973"/>
-              <a:gd name="connsiteX56" fmla="*/ 7692645 w 15651953"/>
-              <a:gd name="connsiteY56" fmla="*/ 6924973 h 6924973"/>
-              <a:gd name="connsiteX57" fmla="*/ 7425982 w 15651953"/>
-              <a:gd name="connsiteY57" fmla="*/ 6924973 h 6924973"/>
-              <a:gd name="connsiteX58" fmla="*/ 7159319 w 15651953"/>
-              <a:gd name="connsiteY58" fmla="*/ 6924973 h 6924973"/>
-              <a:gd name="connsiteX59" fmla="*/ 6423098 w 15651953"/>
-              <a:gd name="connsiteY59" fmla="*/ 6924973 h 6924973"/>
-              <a:gd name="connsiteX60" fmla="*/ 6312954 w 15651953"/>
-              <a:gd name="connsiteY60" fmla="*/ 6924973 h 6924973"/>
-              <a:gd name="connsiteX61" fmla="*/ 5576733 w 15651953"/>
-              <a:gd name="connsiteY61" fmla="*/ 6924973 h 6924973"/>
-              <a:gd name="connsiteX62" fmla="*/ 4683992 w 15651953"/>
-              <a:gd name="connsiteY62" fmla="*/ 6924973 h 6924973"/>
-              <a:gd name="connsiteX63" fmla="*/ 4260809 w 15651953"/>
-              <a:gd name="connsiteY63" fmla="*/ 6924973 h 6924973"/>
-              <a:gd name="connsiteX64" fmla="*/ 3837627 w 15651953"/>
-              <a:gd name="connsiteY64" fmla="*/ 6924973 h 6924973"/>
-              <a:gd name="connsiteX65" fmla="*/ 3414445 w 15651953"/>
-              <a:gd name="connsiteY65" fmla="*/ 6924973 h 6924973"/>
-              <a:gd name="connsiteX66" fmla="*/ 2521704 w 15651953"/>
-              <a:gd name="connsiteY66" fmla="*/ 6924973 h 6924973"/>
-              <a:gd name="connsiteX67" fmla="*/ 1628963 w 15651953"/>
-              <a:gd name="connsiteY67" fmla="*/ 6924973 h 6924973"/>
-              <a:gd name="connsiteX68" fmla="*/ 1205780 w 15651953"/>
-              <a:gd name="connsiteY68" fmla="*/ 6924973 h 6924973"/>
-              <a:gd name="connsiteX69" fmla="*/ 939117 w 15651953"/>
-              <a:gd name="connsiteY69" fmla="*/ 6924973 h 6924973"/>
-              <a:gd name="connsiteX70" fmla="*/ 672454 w 15651953"/>
-              <a:gd name="connsiteY70" fmla="*/ 6924973 h 6924973"/>
-              <a:gd name="connsiteX71" fmla="*/ 0 w 15651953"/>
-              <a:gd name="connsiteY71" fmla="*/ 6924973 h 6924973"/>
-              <a:gd name="connsiteX72" fmla="*/ 0 w 15651953"/>
-              <a:gd name="connsiteY72" fmla="*/ 6278642 h 6924973"/>
-              <a:gd name="connsiteX73" fmla="*/ 0 w 15651953"/>
-              <a:gd name="connsiteY73" fmla="*/ 5909310 h 6924973"/>
-              <a:gd name="connsiteX74" fmla="*/ 0 w 15651953"/>
-              <a:gd name="connsiteY74" fmla="*/ 5401479 h 6924973"/>
-              <a:gd name="connsiteX75" fmla="*/ 0 w 15651953"/>
-              <a:gd name="connsiteY75" fmla="*/ 4962897 h 6924973"/>
-              <a:gd name="connsiteX76" fmla="*/ 0 w 15651953"/>
-              <a:gd name="connsiteY76" fmla="*/ 4593565 h 6924973"/>
-              <a:gd name="connsiteX77" fmla="*/ 0 w 15651953"/>
-              <a:gd name="connsiteY77" fmla="*/ 4085734 h 6924973"/>
-              <a:gd name="connsiteX78" fmla="*/ 0 w 15651953"/>
-              <a:gd name="connsiteY78" fmla="*/ 3716402 h 6924973"/>
-              <a:gd name="connsiteX79" fmla="*/ 0 w 15651953"/>
-              <a:gd name="connsiteY79" fmla="*/ 3208571 h 6924973"/>
-              <a:gd name="connsiteX80" fmla="*/ 0 w 15651953"/>
-              <a:gd name="connsiteY80" fmla="*/ 2769989 h 6924973"/>
-              <a:gd name="connsiteX81" fmla="*/ 0 w 15651953"/>
-              <a:gd name="connsiteY81" fmla="*/ 2192908 h 6924973"/>
-              <a:gd name="connsiteX82" fmla="*/ 0 w 15651953"/>
-              <a:gd name="connsiteY82" fmla="*/ 1823576 h 6924973"/>
-              <a:gd name="connsiteX83" fmla="*/ 0 w 15651953"/>
-              <a:gd name="connsiteY83" fmla="*/ 1107996 h 6924973"/>
-              <a:gd name="connsiteX84" fmla="*/ 0 w 15651953"/>
-              <a:gd name="connsiteY84" fmla="*/ 0 h 6924973"/>
+              <a:gd name="connsiteX0" fmla="*/ 0 w 15987554"/>
+              <a:gd name="connsiteY0" fmla="*/ 0 h 7694414"/>
+              <a:gd name="connsiteX1" fmla="*/ 911883 w 15987554"/>
+              <a:gd name="connsiteY1" fmla="*/ 0 h 7694414"/>
+              <a:gd name="connsiteX2" fmla="*/ 1823765 w 15987554"/>
+              <a:gd name="connsiteY2" fmla="*/ 0 h 7694414"/>
+              <a:gd name="connsiteX3" fmla="*/ 2735648 w 15987554"/>
+              <a:gd name="connsiteY3" fmla="*/ 0 h 7694414"/>
+              <a:gd name="connsiteX4" fmla="*/ 2848153 w 15987554"/>
+              <a:gd name="connsiteY4" fmla="*/ 0 h 7694414"/>
+              <a:gd name="connsiteX5" fmla="*/ 3280409 w 15987554"/>
+              <a:gd name="connsiteY5" fmla="*/ 0 h 7694414"/>
+              <a:gd name="connsiteX6" fmla="*/ 4192292 w 15987554"/>
+              <a:gd name="connsiteY6" fmla="*/ 0 h 7694414"/>
+              <a:gd name="connsiteX7" fmla="*/ 4304797 w 15987554"/>
+              <a:gd name="connsiteY7" fmla="*/ 0 h 7694414"/>
+              <a:gd name="connsiteX8" fmla="*/ 4417302 w 15987554"/>
+              <a:gd name="connsiteY8" fmla="*/ 0 h 7694414"/>
+              <a:gd name="connsiteX9" fmla="*/ 5009434 w 15987554"/>
+              <a:gd name="connsiteY9" fmla="*/ 0 h 7694414"/>
+              <a:gd name="connsiteX10" fmla="*/ 5281814 w 15987554"/>
+              <a:gd name="connsiteY10" fmla="*/ 0 h 7694414"/>
+              <a:gd name="connsiteX11" fmla="*/ 6193697 w 15987554"/>
+              <a:gd name="connsiteY11" fmla="*/ 0 h 7694414"/>
+              <a:gd name="connsiteX12" fmla="*/ 6466077 w 15987554"/>
+              <a:gd name="connsiteY12" fmla="*/ 0 h 7694414"/>
+              <a:gd name="connsiteX13" fmla="*/ 6738458 w 15987554"/>
+              <a:gd name="connsiteY13" fmla="*/ 0 h 7694414"/>
+              <a:gd name="connsiteX14" fmla="*/ 7010838 w 15987554"/>
+              <a:gd name="connsiteY14" fmla="*/ 0 h 7694414"/>
+              <a:gd name="connsiteX15" fmla="*/ 7283219 w 15987554"/>
+              <a:gd name="connsiteY15" fmla="*/ 0 h 7694414"/>
+              <a:gd name="connsiteX16" fmla="*/ 7875351 w 15987554"/>
+              <a:gd name="connsiteY16" fmla="*/ 0 h 7694414"/>
+              <a:gd name="connsiteX17" fmla="*/ 8787233 w 15987554"/>
+              <a:gd name="connsiteY17" fmla="*/ 0 h 7694414"/>
+              <a:gd name="connsiteX18" fmla="*/ 9699116 w 15987554"/>
+              <a:gd name="connsiteY18" fmla="*/ 0 h 7694414"/>
+              <a:gd name="connsiteX19" fmla="*/ 10451123 w 15987554"/>
+              <a:gd name="connsiteY19" fmla="*/ 0 h 7694414"/>
+              <a:gd name="connsiteX20" fmla="*/ 10563628 w 15987554"/>
+              <a:gd name="connsiteY20" fmla="*/ 0 h 7694414"/>
+              <a:gd name="connsiteX21" fmla="*/ 10676133 w 15987554"/>
+              <a:gd name="connsiteY21" fmla="*/ 0 h 7694414"/>
+              <a:gd name="connsiteX22" fmla="*/ 10788638 w 15987554"/>
+              <a:gd name="connsiteY22" fmla="*/ 0 h 7694414"/>
+              <a:gd name="connsiteX23" fmla="*/ 11540645 w 15987554"/>
+              <a:gd name="connsiteY23" fmla="*/ 0 h 7694414"/>
+              <a:gd name="connsiteX24" fmla="*/ 12452528 w 15987554"/>
+              <a:gd name="connsiteY24" fmla="*/ 0 h 7694414"/>
+              <a:gd name="connsiteX25" fmla="*/ 13364411 w 15987554"/>
+              <a:gd name="connsiteY25" fmla="*/ 0 h 7694414"/>
+              <a:gd name="connsiteX26" fmla="*/ 14276294 w 15987554"/>
+              <a:gd name="connsiteY26" fmla="*/ 0 h 7694414"/>
+              <a:gd name="connsiteX27" fmla="*/ 14868425 w 15987554"/>
+              <a:gd name="connsiteY27" fmla="*/ 0 h 7694414"/>
+              <a:gd name="connsiteX28" fmla="*/ 15300681 w 15987554"/>
+              <a:gd name="connsiteY28" fmla="*/ 0 h 7694414"/>
+              <a:gd name="connsiteX29" fmla="*/ 15987554 w 15987554"/>
+              <a:gd name="connsiteY29" fmla="*/ 0 h 7694414"/>
+              <a:gd name="connsiteX30" fmla="*/ 15987554 w 15987554"/>
+              <a:gd name="connsiteY30" fmla="*/ 514934 h 7694414"/>
+              <a:gd name="connsiteX31" fmla="*/ 15987554 w 15987554"/>
+              <a:gd name="connsiteY31" fmla="*/ 875979 h 7694414"/>
+              <a:gd name="connsiteX32" fmla="*/ 15987554 w 15987554"/>
+              <a:gd name="connsiteY32" fmla="*/ 1621746 h 7694414"/>
+              <a:gd name="connsiteX33" fmla="*/ 15987554 w 15987554"/>
+              <a:gd name="connsiteY33" fmla="*/ 2367512 h 7694414"/>
+              <a:gd name="connsiteX34" fmla="*/ 15987554 w 15987554"/>
+              <a:gd name="connsiteY34" fmla="*/ 2882446 h 7694414"/>
+              <a:gd name="connsiteX35" fmla="*/ 15987554 w 15987554"/>
+              <a:gd name="connsiteY35" fmla="*/ 3628212 h 7694414"/>
+              <a:gd name="connsiteX36" fmla="*/ 15987554 w 15987554"/>
+              <a:gd name="connsiteY36" fmla="*/ 4220090 h 7694414"/>
+              <a:gd name="connsiteX37" fmla="*/ 15987554 w 15987554"/>
+              <a:gd name="connsiteY37" fmla="*/ 4581136 h 7694414"/>
+              <a:gd name="connsiteX38" fmla="*/ 15987554 w 15987554"/>
+              <a:gd name="connsiteY38" fmla="*/ 5326902 h 7694414"/>
+              <a:gd name="connsiteX39" fmla="*/ 15987554 w 15987554"/>
+              <a:gd name="connsiteY39" fmla="*/ 5995724 h 7694414"/>
+              <a:gd name="connsiteX40" fmla="*/ 15987554 w 15987554"/>
+              <a:gd name="connsiteY40" fmla="*/ 6356770 h 7694414"/>
+              <a:gd name="connsiteX41" fmla="*/ 15987554 w 15987554"/>
+              <a:gd name="connsiteY41" fmla="*/ 7025592 h 7694414"/>
+              <a:gd name="connsiteX42" fmla="*/ 15987554 w 15987554"/>
+              <a:gd name="connsiteY42" fmla="*/ 7694414 h 7694414"/>
+              <a:gd name="connsiteX43" fmla="*/ 15075671 w 15987554"/>
+              <a:gd name="connsiteY43" fmla="*/ 7694414 h 7694414"/>
+              <a:gd name="connsiteX44" fmla="*/ 14323664 w 15987554"/>
+              <a:gd name="connsiteY44" fmla="*/ 7694414 h 7694414"/>
+              <a:gd name="connsiteX45" fmla="*/ 13571657 w 15987554"/>
+              <a:gd name="connsiteY45" fmla="*/ 7694414 h 7694414"/>
+              <a:gd name="connsiteX46" fmla="*/ 12819650 w 15987554"/>
+              <a:gd name="connsiteY46" fmla="*/ 7694414 h 7694414"/>
+              <a:gd name="connsiteX47" fmla="*/ 11907767 w 15987554"/>
+              <a:gd name="connsiteY47" fmla="*/ 7694414 h 7694414"/>
+              <a:gd name="connsiteX48" fmla="*/ 11635387 w 15987554"/>
+              <a:gd name="connsiteY48" fmla="*/ 7694414 h 7694414"/>
+              <a:gd name="connsiteX49" fmla="*/ 11043255 w 15987554"/>
+              <a:gd name="connsiteY49" fmla="*/ 7694414 h 7694414"/>
+              <a:gd name="connsiteX50" fmla="*/ 10930750 w 15987554"/>
+              <a:gd name="connsiteY50" fmla="*/ 7694414 h 7694414"/>
+              <a:gd name="connsiteX51" fmla="*/ 10658369 w 15987554"/>
+              <a:gd name="connsiteY51" fmla="*/ 7694414 h 7694414"/>
+              <a:gd name="connsiteX52" fmla="*/ 10066238 w 15987554"/>
+              <a:gd name="connsiteY52" fmla="*/ 7694414 h 7694414"/>
+              <a:gd name="connsiteX53" fmla="*/ 9793857 w 15987554"/>
+              <a:gd name="connsiteY53" fmla="*/ 7694414 h 7694414"/>
+              <a:gd name="connsiteX54" fmla="*/ 9521477 w 15987554"/>
+              <a:gd name="connsiteY54" fmla="*/ 7694414 h 7694414"/>
+              <a:gd name="connsiteX55" fmla="*/ 8769469 w 15987554"/>
+              <a:gd name="connsiteY55" fmla="*/ 7694414 h 7694414"/>
+              <a:gd name="connsiteX56" fmla="*/ 8656964 w 15987554"/>
+              <a:gd name="connsiteY56" fmla="*/ 7694414 h 7694414"/>
+              <a:gd name="connsiteX57" fmla="*/ 7904957 w 15987554"/>
+              <a:gd name="connsiteY57" fmla="*/ 7694414 h 7694414"/>
+              <a:gd name="connsiteX58" fmla="*/ 6993075 w 15987554"/>
+              <a:gd name="connsiteY58" fmla="*/ 7694414 h 7694414"/>
+              <a:gd name="connsiteX59" fmla="*/ 6560818 w 15987554"/>
+              <a:gd name="connsiteY59" fmla="*/ 7694414 h 7694414"/>
+              <a:gd name="connsiteX60" fmla="*/ 6128562 w 15987554"/>
+              <a:gd name="connsiteY60" fmla="*/ 7694414 h 7694414"/>
+              <a:gd name="connsiteX61" fmla="*/ 5696306 w 15987554"/>
+              <a:gd name="connsiteY61" fmla="*/ 7694414 h 7694414"/>
+              <a:gd name="connsiteX62" fmla="*/ 4784424 w 15987554"/>
+              <a:gd name="connsiteY62" fmla="*/ 7694414 h 7694414"/>
+              <a:gd name="connsiteX63" fmla="*/ 3872541 w 15987554"/>
+              <a:gd name="connsiteY63" fmla="*/ 7694414 h 7694414"/>
+              <a:gd name="connsiteX64" fmla="*/ 3440285 w 15987554"/>
+              <a:gd name="connsiteY64" fmla="*/ 7694414 h 7694414"/>
+              <a:gd name="connsiteX65" fmla="*/ 3167904 w 15987554"/>
+              <a:gd name="connsiteY65" fmla="*/ 7694414 h 7694414"/>
+              <a:gd name="connsiteX66" fmla="*/ 2895524 w 15987554"/>
+              <a:gd name="connsiteY66" fmla="*/ 7694414 h 7694414"/>
+              <a:gd name="connsiteX67" fmla="*/ 2623143 w 15987554"/>
+              <a:gd name="connsiteY67" fmla="*/ 7694414 h 7694414"/>
+              <a:gd name="connsiteX68" fmla="*/ 1871136 w 15987554"/>
+              <a:gd name="connsiteY68" fmla="*/ 7694414 h 7694414"/>
+              <a:gd name="connsiteX69" fmla="*/ 959253 w 15987554"/>
+              <a:gd name="connsiteY69" fmla="*/ 7694414 h 7694414"/>
+              <a:gd name="connsiteX70" fmla="*/ 0 w 15987554"/>
+              <a:gd name="connsiteY70" fmla="*/ 7694414 h 7694414"/>
+              <a:gd name="connsiteX71" fmla="*/ 0 w 15987554"/>
+              <a:gd name="connsiteY71" fmla="*/ 7102536 h 7694414"/>
+              <a:gd name="connsiteX72" fmla="*/ 0 w 15987554"/>
+              <a:gd name="connsiteY72" fmla="*/ 6741490 h 7694414"/>
+              <a:gd name="connsiteX73" fmla="*/ 0 w 15987554"/>
+              <a:gd name="connsiteY73" fmla="*/ 6226557 h 7694414"/>
+              <a:gd name="connsiteX74" fmla="*/ 0 w 15987554"/>
+              <a:gd name="connsiteY74" fmla="*/ 5865511 h 7694414"/>
+              <a:gd name="connsiteX75" fmla="*/ 0 w 15987554"/>
+              <a:gd name="connsiteY75" fmla="*/ 5350577 h 7694414"/>
+              <a:gd name="connsiteX76" fmla="*/ 0 w 15987554"/>
+              <a:gd name="connsiteY76" fmla="*/ 4912587 h 7694414"/>
+              <a:gd name="connsiteX77" fmla="*/ 0 w 15987554"/>
+              <a:gd name="connsiteY77" fmla="*/ 4320709 h 7694414"/>
+              <a:gd name="connsiteX78" fmla="*/ 0 w 15987554"/>
+              <a:gd name="connsiteY78" fmla="*/ 3959664 h 7694414"/>
+              <a:gd name="connsiteX79" fmla="*/ 0 w 15987554"/>
+              <a:gd name="connsiteY79" fmla="*/ 3213898 h 7694414"/>
+              <a:gd name="connsiteX80" fmla="*/ 0 w 15987554"/>
+              <a:gd name="connsiteY80" fmla="*/ 2545075 h 7694414"/>
+              <a:gd name="connsiteX81" fmla="*/ 0 w 15987554"/>
+              <a:gd name="connsiteY81" fmla="*/ 1953197 h 7694414"/>
+              <a:gd name="connsiteX82" fmla="*/ 0 w 15987554"/>
+              <a:gd name="connsiteY82" fmla="*/ 1361319 h 7694414"/>
+              <a:gd name="connsiteX83" fmla="*/ 0 w 15987554"/>
+              <a:gd name="connsiteY83" fmla="*/ 1000274 h 7694414"/>
+              <a:gd name="connsiteX84" fmla="*/ 0 w 15987554"/>
+              <a:gd name="connsiteY84" fmla="*/ 0 h 7694414"/>
             </a:gdLst>
             <a:ahLst/>
             <a:cxnLst>
@@ -3483,864 +3483,884 @@
             </a:cxnLst>
             <a:rect l="l" t="t" r="r" b="b"/>
             <a:pathLst>
-              <a:path w="15651953" h="6924973" fill="none" extrusionOk="0">
+              <a:path w="15987554" h="7694414" fill="none" extrusionOk="0">
                 <a:moveTo>
                   <a:pt x="0" y="0"/>
                 </a:moveTo>
                 <a:cubicBezTo>
-                  <a:pt x="244947" y="-30984"/>
-                  <a:pt x="416814" y="53804"/>
-                  <a:pt x="579702" y="0"/>
-                </a:cubicBezTo>
-                <a:cubicBezTo>
-                  <a:pt x="742590" y="-53804"/>
-                  <a:pt x="954936" y="36933"/>
-                  <a:pt x="1159404" y="0"/>
-                </a:cubicBezTo>
-                <a:cubicBezTo>
-                  <a:pt x="1363872" y="-36933"/>
-                  <a:pt x="1601852" y="60567"/>
-                  <a:pt x="1739106" y="0"/>
-                </a:cubicBezTo>
-                <a:cubicBezTo>
-                  <a:pt x="1876360" y="-60567"/>
-                  <a:pt x="2008402" y="4539"/>
-                  <a:pt x="2162288" y="0"/>
-                </a:cubicBezTo>
-                <a:cubicBezTo>
-                  <a:pt x="2316174" y="-4539"/>
-                  <a:pt x="2600271" y="35558"/>
-                  <a:pt x="2741990" y="0"/>
-                </a:cubicBezTo>
-                <a:cubicBezTo>
-                  <a:pt x="2883709" y="-35558"/>
-                  <a:pt x="3369172" y="74804"/>
-                  <a:pt x="3634731" y="0"/>
-                </a:cubicBezTo>
-                <a:cubicBezTo>
-                  <a:pt x="3900290" y="-74804"/>
-                  <a:pt x="4306127" y="104945"/>
-                  <a:pt x="4527472" y="0"/>
-                </a:cubicBezTo>
-                <a:cubicBezTo>
-                  <a:pt x="4748817" y="-104945"/>
-                  <a:pt x="4605605" y="10928"/>
-                  <a:pt x="4637616" y="0"/>
-                </a:cubicBezTo>
-                <a:cubicBezTo>
-                  <a:pt x="4669627" y="-10928"/>
-                  <a:pt x="4895250" y="3478"/>
-                  <a:pt x="5060798" y="0"/>
-                </a:cubicBezTo>
-                <a:cubicBezTo>
-                  <a:pt x="5226346" y="-3478"/>
-                  <a:pt x="5613603" y="81806"/>
-                  <a:pt x="5953539" y="0"/>
-                </a:cubicBezTo>
-                <a:cubicBezTo>
-                  <a:pt x="6293475" y="-81806"/>
-                  <a:pt x="6010019" y="9291"/>
-                  <a:pt x="6063683" y="0"/>
-                </a:cubicBezTo>
-                <a:cubicBezTo>
-                  <a:pt x="6117347" y="-9291"/>
-                  <a:pt x="6132069" y="13145"/>
-                  <a:pt x="6173826" y="0"/>
-                </a:cubicBezTo>
-                <a:cubicBezTo>
-                  <a:pt x="6215583" y="-13145"/>
-                  <a:pt x="6632835" y="29377"/>
-                  <a:pt x="6753528" y="0"/>
-                </a:cubicBezTo>
-                <a:cubicBezTo>
-                  <a:pt x="6874221" y="-29377"/>
-                  <a:pt x="6927133" y="15519"/>
-                  <a:pt x="7020191" y="0"/>
-                </a:cubicBezTo>
-                <a:cubicBezTo>
-                  <a:pt x="7113249" y="-15519"/>
-                  <a:pt x="7714878" y="13301"/>
-                  <a:pt x="7912932" y="0"/>
-                </a:cubicBezTo>
-                <a:cubicBezTo>
-                  <a:pt x="8110986" y="-13301"/>
-                  <a:pt x="8110254" y="21816"/>
-                  <a:pt x="8179595" y="0"/>
-                </a:cubicBezTo>
-                <a:cubicBezTo>
-                  <a:pt x="8248936" y="-21816"/>
-                  <a:pt x="8382056" y="31451"/>
-                  <a:pt x="8446258" y="0"/>
-                </a:cubicBezTo>
-                <a:cubicBezTo>
-                  <a:pt x="8510460" y="-31451"/>
-                  <a:pt x="8623877" y="12962"/>
-                  <a:pt x="8712921" y="0"/>
-                </a:cubicBezTo>
-                <a:cubicBezTo>
-                  <a:pt x="8801965" y="-12962"/>
-                  <a:pt x="8870559" y="19039"/>
-                  <a:pt x="8979583" y="0"/>
-                </a:cubicBezTo>
-                <a:cubicBezTo>
-                  <a:pt x="9088607" y="-19039"/>
-                  <a:pt x="9370590" y="18139"/>
-                  <a:pt x="9559285" y="0"/>
-                </a:cubicBezTo>
-                <a:cubicBezTo>
-                  <a:pt x="9747980" y="-18139"/>
-                  <a:pt x="10028352" y="75529"/>
-                  <a:pt x="10452026" y="0"/>
-                </a:cubicBezTo>
-                <a:cubicBezTo>
-                  <a:pt x="10875700" y="-75529"/>
-                  <a:pt x="11031240" y="9716"/>
-                  <a:pt x="11344767" y="0"/>
-                </a:cubicBezTo>
-                <a:cubicBezTo>
-                  <a:pt x="11658294" y="-9716"/>
-                  <a:pt x="11810628" y="17723"/>
-                  <a:pt x="12080989" y="0"/>
-                </a:cubicBezTo>
-                <a:cubicBezTo>
-                  <a:pt x="12351350" y="-17723"/>
-                  <a:pt x="12168107" y="13135"/>
-                  <a:pt x="12191132" y="0"/>
-                </a:cubicBezTo>
-                <a:cubicBezTo>
-                  <a:pt x="12214157" y="-13135"/>
-                  <a:pt x="12254495" y="11961"/>
-                  <a:pt x="12301276" y="0"/>
-                </a:cubicBezTo>
-                <a:cubicBezTo>
-                  <a:pt x="12348057" y="-11961"/>
-                  <a:pt x="12357655" y="11888"/>
-                  <a:pt x="12411419" y="0"/>
-                </a:cubicBezTo>
-                <a:cubicBezTo>
-                  <a:pt x="12465183" y="-11888"/>
-                  <a:pt x="12861441" y="2462"/>
-                  <a:pt x="13147641" y="0"/>
-                </a:cubicBezTo>
-                <a:cubicBezTo>
-                  <a:pt x="13433841" y="-2462"/>
-                  <a:pt x="13825895" y="80754"/>
-                  <a:pt x="14040382" y="0"/>
-                </a:cubicBezTo>
-                <a:cubicBezTo>
-                  <a:pt x="14254869" y="-80754"/>
-                  <a:pt x="14490697" y="29445"/>
-                  <a:pt x="14933123" y="0"/>
-                </a:cubicBezTo>
-                <a:cubicBezTo>
-                  <a:pt x="15375549" y="-29445"/>
-                  <a:pt x="15386424" y="76562"/>
-                  <a:pt x="15651953" y="0"/>
-                </a:cubicBezTo>
-                <a:cubicBezTo>
-                  <a:pt x="15663539" y="184050"/>
-                  <a:pt x="15647872" y="346814"/>
-                  <a:pt x="15651953" y="577081"/>
-                </a:cubicBezTo>
-                <a:cubicBezTo>
-                  <a:pt x="15656034" y="807348"/>
-                  <a:pt x="15616105" y="828192"/>
-                  <a:pt x="15651953" y="1015663"/>
-                </a:cubicBezTo>
-                <a:cubicBezTo>
-                  <a:pt x="15687801" y="1203134"/>
-                  <a:pt x="15636488" y="1448258"/>
-                  <a:pt x="15651953" y="1592744"/>
-                </a:cubicBezTo>
-                <a:cubicBezTo>
-                  <a:pt x="15667418" y="1737230"/>
-                  <a:pt x="15646103" y="1952457"/>
-                  <a:pt x="15651953" y="2308324"/>
-                </a:cubicBezTo>
-                <a:cubicBezTo>
-                  <a:pt x="15657803" y="2664191"/>
-                  <a:pt x="15620709" y="2575876"/>
-                  <a:pt x="15651953" y="2677656"/>
-                </a:cubicBezTo>
-                <a:cubicBezTo>
-                  <a:pt x="15683197" y="2779436"/>
-                  <a:pt x="15638619" y="3232040"/>
-                  <a:pt x="15651953" y="3393237"/>
-                </a:cubicBezTo>
-                <a:cubicBezTo>
-                  <a:pt x="15665287" y="3554434"/>
-                  <a:pt x="15577117" y="3764484"/>
-                  <a:pt x="15651953" y="4108817"/>
-                </a:cubicBezTo>
-                <a:cubicBezTo>
-                  <a:pt x="15726789" y="4453150"/>
-                  <a:pt x="15650516" y="4391454"/>
-                  <a:pt x="15651953" y="4616649"/>
-                </a:cubicBezTo>
-                <a:cubicBezTo>
-                  <a:pt x="15653390" y="4841844"/>
-                  <a:pt x="15600945" y="5121949"/>
-                  <a:pt x="15651953" y="5332229"/>
-                </a:cubicBezTo>
-                <a:cubicBezTo>
-                  <a:pt x="15702961" y="5542509"/>
-                  <a:pt x="15637875" y="5634215"/>
-                  <a:pt x="15651953" y="5909310"/>
-                </a:cubicBezTo>
-                <a:cubicBezTo>
-                  <a:pt x="15666031" y="6184405"/>
-                  <a:pt x="15623477" y="6136353"/>
-                  <a:pt x="15651953" y="6278642"/>
-                </a:cubicBezTo>
-                <a:cubicBezTo>
-                  <a:pt x="15680429" y="6420931"/>
-                  <a:pt x="15645585" y="6631901"/>
-                  <a:pt x="15651953" y="6924973"/>
-                </a:cubicBezTo>
-                <a:cubicBezTo>
-                  <a:pt x="15416560" y="6981752"/>
-                  <a:pt x="15211892" y="6900554"/>
-                  <a:pt x="14915732" y="6924973"/>
-                </a:cubicBezTo>
-                <a:cubicBezTo>
-                  <a:pt x="14619572" y="6949392"/>
-                  <a:pt x="14461522" y="6914955"/>
-                  <a:pt x="14022990" y="6924973"/>
-                </a:cubicBezTo>
-                <a:cubicBezTo>
-                  <a:pt x="13584458" y="6934991"/>
-                  <a:pt x="13668708" y="6869583"/>
-                  <a:pt x="13443289" y="6924973"/>
-                </a:cubicBezTo>
-                <a:cubicBezTo>
-                  <a:pt x="13217870" y="6980363"/>
-                  <a:pt x="13138658" y="6918092"/>
-                  <a:pt x="13020106" y="6924973"/>
-                </a:cubicBezTo>
-                <a:cubicBezTo>
-                  <a:pt x="12901554" y="6931854"/>
-                  <a:pt x="12808160" y="6878516"/>
-                  <a:pt x="12596924" y="6924973"/>
-                </a:cubicBezTo>
-                <a:cubicBezTo>
-                  <a:pt x="12385688" y="6971430"/>
-                  <a:pt x="12144180" y="6891560"/>
-                  <a:pt x="11860702" y="6924973"/>
-                </a:cubicBezTo>
-                <a:cubicBezTo>
-                  <a:pt x="11577224" y="6958386"/>
-                  <a:pt x="11369536" y="6861664"/>
-                  <a:pt x="11124481" y="6924973"/>
-                </a:cubicBezTo>
-                <a:cubicBezTo>
-                  <a:pt x="10879426" y="6988282"/>
-                  <a:pt x="10554380" y="6864833"/>
-                  <a:pt x="10388259" y="6924973"/>
-                </a:cubicBezTo>
-                <a:cubicBezTo>
-                  <a:pt x="10222138" y="6985113"/>
-                  <a:pt x="9922024" y="6913113"/>
-                  <a:pt x="9495518" y="6924973"/>
-                </a:cubicBezTo>
-                <a:cubicBezTo>
-                  <a:pt x="9069012" y="6936833"/>
-                  <a:pt x="9326093" y="6916237"/>
-                  <a:pt x="9228855" y="6924973"/>
-                </a:cubicBezTo>
-                <a:cubicBezTo>
-                  <a:pt x="9131617" y="6933709"/>
-                  <a:pt x="8776600" y="6885996"/>
-                  <a:pt x="8649153" y="6924973"/>
-                </a:cubicBezTo>
-                <a:cubicBezTo>
-                  <a:pt x="8521706" y="6963950"/>
-                  <a:pt x="8584682" y="6918320"/>
-                  <a:pt x="8539010" y="6924973"/>
-                </a:cubicBezTo>
-                <a:cubicBezTo>
-                  <a:pt x="8493338" y="6931626"/>
-                  <a:pt x="8326544" y="6924425"/>
-                  <a:pt x="8272347" y="6924973"/>
-                </a:cubicBezTo>
-                <a:cubicBezTo>
-                  <a:pt x="8218150" y="6925521"/>
-                  <a:pt x="7939073" y="6858507"/>
-                  <a:pt x="7692645" y="6924973"/>
-                </a:cubicBezTo>
-                <a:cubicBezTo>
-                  <a:pt x="7446217" y="6991439"/>
-                  <a:pt x="7557029" y="6917808"/>
-                  <a:pt x="7425982" y="6924973"/>
-                </a:cubicBezTo>
-                <a:cubicBezTo>
-                  <a:pt x="7294935" y="6932138"/>
-                  <a:pt x="7230819" y="6924486"/>
-                  <a:pt x="7159319" y="6924973"/>
-                </a:cubicBezTo>
-                <a:cubicBezTo>
-                  <a:pt x="7087819" y="6925460"/>
-                  <a:pt x="6761977" y="6853469"/>
-                  <a:pt x="6423098" y="6924973"/>
-                </a:cubicBezTo>
-                <a:cubicBezTo>
-                  <a:pt x="6084219" y="6996477"/>
-                  <a:pt x="6358529" y="6923379"/>
-                  <a:pt x="6312954" y="6924973"/>
-                </a:cubicBezTo>
-                <a:cubicBezTo>
-                  <a:pt x="6267379" y="6926567"/>
-                  <a:pt x="5864885" y="6892411"/>
-                  <a:pt x="5576733" y="6924973"/>
-                </a:cubicBezTo>
-                <a:cubicBezTo>
-                  <a:pt x="5288581" y="6957535"/>
-                  <a:pt x="5043856" y="6867880"/>
-                  <a:pt x="4683992" y="6924973"/>
-                </a:cubicBezTo>
-                <a:cubicBezTo>
-                  <a:pt x="4324128" y="6982066"/>
-                  <a:pt x="4391097" y="6883260"/>
-                  <a:pt x="4260809" y="6924973"/>
-                </a:cubicBezTo>
-                <a:cubicBezTo>
-                  <a:pt x="4130521" y="6966686"/>
-                  <a:pt x="3971388" y="6890095"/>
-                  <a:pt x="3837627" y="6924973"/>
-                </a:cubicBezTo>
-                <a:cubicBezTo>
-                  <a:pt x="3703866" y="6959851"/>
-                  <a:pt x="3568940" y="6916169"/>
-                  <a:pt x="3414445" y="6924973"/>
-                </a:cubicBezTo>
-                <a:cubicBezTo>
-                  <a:pt x="3259950" y="6933777"/>
-                  <a:pt x="2722408" y="6912702"/>
-                  <a:pt x="2521704" y="6924973"/>
-                </a:cubicBezTo>
-                <a:cubicBezTo>
-                  <a:pt x="2321000" y="6937244"/>
-                  <a:pt x="1915857" y="6851219"/>
-                  <a:pt x="1628963" y="6924973"/>
-                </a:cubicBezTo>
-                <a:cubicBezTo>
-                  <a:pt x="1342069" y="6998727"/>
-                  <a:pt x="1369155" y="6918229"/>
-                  <a:pt x="1205780" y="6924973"/>
-                </a:cubicBezTo>
-                <a:cubicBezTo>
-                  <a:pt x="1042405" y="6931717"/>
-                  <a:pt x="1019663" y="6895895"/>
-                  <a:pt x="939117" y="6924973"/>
-                </a:cubicBezTo>
-                <a:cubicBezTo>
-                  <a:pt x="858571" y="6954051"/>
-                  <a:pt x="783493" y="6908657"/>
-                  <a:pt x="672454" y="6924973"/>
-                </a:cubicBezTo>
-                <a:cubicBezTo>
-                  <a:pt x="561415" y="6941289"/>
-                  <a:pt x="263520" y="6870360"/>
-                  <a:pt x="0" y="6924973"/>
-                </a:cubicBezTo>
-                <a:cubicBezTo>
-                  <a:pt x="-29697" y="6750351"/>
-                  <a:pt x="41623" y="6442310"/>
-                  <a:pt x="0" y="6278642"/>
-                </a:cubicBezTo>
-                <a:cubicBezTo>
-                  <a:pt x="-41623" y="6114974"/>
-                  <a:pt x="43366" y="6090283"/>
-                  <a:pt x="0" y="5909310"/>
-                </a:cubicBezTo>
-                <a:cubicBezTo>
-                  <a:pt x="-43366" y="5728337"/>
-                  <a:pt x="40574" y="5504237"/>
-                  <a:pt x="0" y="5401479"/>
-                </a:cubicBezTo>
-                <a:cubicBezTo>
-                  <a:pt x="-40574" y="5298721"/>
-                  <a:pt x="20338" y="5100349"/>
-                  <a:pt x="0" y="4962897"/>
-                </a:cubicBezTo>
-                <a:cubicBezTo>
-                  <a:pt x="-20338" y="4825445"/>
-                  <a:pt x="9064" y="4758122"/>
-                  <a:pt x="0" y="4593565"/>
-                </a:cubicBezTo>
-                <a:cubicBezTo>
-                  <a:pt x="-9064" y="4429008"/>
-                  <a:pt x="5106" y="4238060"/>
-                  <a:pt x="0" y="4085734"/>
-                </a:cubicBezTo>
-                <a:cubicBezTo>
-                  <a:pt x="-5106" y="3933408"/>
-                  <a:pt x="6465" y="3900617"/>
-                  <a:pt x="0" y="3716402"/>
-                </a:cubicBezTo>
-                <a:cubicBezTo>
-                  <a:pt x="-6465" y="3532187"/>
-                  <a:pt x="10374" y="3352135"/>
-                  <a:pt x="0" y="3208571"/>
-                </a:cubicBezTo>
-                <a:cubicBezTo>
-                  <a:pt x="-10374" y="3065007"/>
-                  <a:pt x="5603" y="2904472"/>
-                  <a:pt x="0" y="2769989"/>
-                </a:cubicBezTo>
-                <a:cubicBezTo>
-                  <a:pt x="-5603" y="2635506"/>
-                  <a:pt x="8504" y="2403398"/>
-                  <a:pt x="0" y="2192908"/>
-                </a:cubicBezTo>
-                <a:cubicBezTo>
-                  <a:pt x="-8504" y="1982418"/>
-                  <a:pt x="35122" y="1923875"/>
-                  <a:pt x="0" y="1823576"/>
-                </a:cubicBezTo>
-                <a:cubicBezTo>
-                  <a:pt x="-35122" y="1723277"/>
-                  <a:pt x="22811" y="1362031"/>
-                  <a:pt x="0" y="1107996"/>
-                </a:cubicBezTo>
-                <a:cubicBezTo>
-                  <a:pt x="-22811" y="853961"/>
-                  <a:pt x="20330" y="300256"/>
+                  <a:pt x="421764" y="-27531"/>
+                  <a:pt x="523933" y="28159"/>
+                  <a:pt x="911883" y="0"/>
+                </a:cubicBezTo>
+                <a:cubicBezTo>
+                  <a:pt x="1299833" y="-28159"/>
+                  <a:pt x="1408263" y="11365"/>
+                  <a:pt x="1823765" y="0"/>
+                </a:cubicBezTo>
+                <a:cubicBezTo>
+                  <a:pt x="2239267" y="-11365"/>
+                  <a:pt x="2359396" y="5240"/>
+                  <a:pt x="2735648" y="0"/>
+                </a:cubicBezTo>
+                <a:cubicBezTo>
+                  <a:pt x="3111900" y="-5240"/>
+                  <a:pt x="2824157" y="5916"/>
+                  <a:pt x="2848153" y="0"/>
+                </a:cubicBezTo>
+                <a:cubicBezTo>
+                  <a:pt x="2872150" y="-5916"/>
+                  <a:pt x="3166654" y="39361"/>
+                  <a:pt x="3280409" y="0"/>
+                </a:cubicBezTo>
+                <a:cubicBezTo>
+                  <a:pt x="3394164" y="-39361"/>
+                  <a:pt x="4009599" y="69827"/>
+                  <a:pt x="4192292" y="0"/>
+                </a:cubicBezTo>
+                <a:cubicBezTo>
+                  <a:pt x="4374985" y="-69827"/>
+                  <a:pt x="4261540" y="5300"/>
+                  <a:pt x="4304797" y="0"/>
+                </a:cubicBezTo>
+                <a:cubicBezTo>
+                  <a:pt x="4348055" y="-5300"/>
+                  <a:pt x="4380818" y="13313"/>
+                  <a:pt x="4417302" y="0"/>
+                </a:cubicBezTo>
+                <a:cubicBezTo>
+                  <a:pt x="4453786" y="-13313"/>
+                  <a:pt x="4780217" y="55343"/>
+                  <a:pt x="5009434" y="0"/>
+                </a:cubicBezTo>
+                <a:cubicBezTo>
+                  <a:pt x="5238651" y="-55343"/>
+                  <a:pt x="5167079" y="26919"/>
+                  <a:pt x="5281814" y="0"/>
+                </a:cubicBezTo>
+                <a:cubicBezTo>
+                  <a:pt x="5396549" y="-26919"/>
+                  <a:pt x="5845816" y="31865"/>
+                  <a:pt x="6193697" y="0"/>
+                </a:cubicBezTo>
+                <a:cubicBezTo>
+                  <a:pt x="6541578" y="-31865"/>
+                  <a:pt x="6343877" y="22462"/>
+                  <a:pt x="6466077" y="0"/>
+                </a:cubicBezTo>
+                <a:cubicBezTo>
+                  <a:pt x="6588277" y="-22462"/>
+                  <a:pt x="6615043" y="3212"/>
+                  <a:pt x="6738458" y="0"/>
+                </a:cubicBezTo>
+                <a:cubicBezTo>
+                  <a:pt x="6861873" y="-3212"/>
+                  <a:pt x="6912385" y="17976"/>
+                  <a:pt x="7010838" y="0"/>
+                </a:cubicBezTo>
+                <a:cubicBezTo>
+                  <a:pt x="7109291" y="-17976"/>
+                  <a:pt x="7177417" y="3246"/>
+                  <a:pt x="7283219" y="0"/>
+                </a:cubicBezTo>
+                <a:cubicBezTo>
+                  <a:pt x="7389021" y="-3246"/>
+                  <a:pt x="7644293" y="8931"/>
+                  <a:pt x="7875351" y="0"/>
+                </a:cubicBezTo>
+                <a:cubicBezTo>
+                  <a:pt x="8106409" y="-8931"/>
+                  <a:pt x="8470447" y="80664"/>
+                  <a:pt x="8787233" y="0"/>
+                </a:cubicBezTo>
+                <a:cubicBezTo>
+                  <a:pt x="9104019" y="-80664"/>
+                  <a:pt x="9259907" y="8156"/>
+                  <a:pt x="9699116" y="0"/>
+                </a:cubicBezTo>
+                <a:cubicBezTo>
+                  <a:pt x="10138325" y="-8156"/>
+                  <a:pt x="10205211" y="40852"/>
+                  <a:pt x="10451123" y="0"/>
+                </a:cubicBezTo>
+                <a:cubicBezTo>
+                  <a:pt x="10697035" y="-40852"/>
+                  <a:pt x="10522489" y="1109"/>
+                  <a:pt x="10563628" y="0"/>
+                </a:cubicBezTo>
+                <a:cubicBezTo>
+                  <a:pt x="10604767" y="-1109"/>
+                  <a:pt x="10639869" y="10876"/>
+                  <a:pt x="10676133" y="0"/>
+                </a:cubicBezTo>
+                <a:cubicBezTo>
+                  <a:pt x="10712398" y="-10876"/>
+                  <a:pt x="10756634" y="9652"/>
+                  <a:pt x="10788638" y="0"/>
+                </a:cubicBezTo>
+                <a:cubicBezTo>
+                  <a:pt x="10820643" y="-9652"/>
+                  <a:pt x="11186889" y="72512"/>
+                  <a:pt x="11540645" y="0"/>
+                </a:cubicBezTo>
+                <a:cubicBezTo>
+                  <a:pt x="11894401" y="-72512"/>
+                  <a:pt x="12095896" y="49484"/>
+                  <a:pt x="12452528" y="0"/>
+                </a:cubicBezTo>
+                <a:cubicBezTo>
+                  <a:pt x="12809160" y="-49484"/>
+                  <a:pt x="13160734" y="99543"/>
+                  <a:pt x="13364411" y="0"/>
+                </a:cubicBezTo>
+                <a:cubicBezTo>
+                  <a:pt x="13568088" y="-99543"/>
+                  <a:pt x="13969755" y="28685"/>
+                  <a:pt x="14276294" y="0"/>
+                </a:cubicBezTo>
+                <a:cubicBezTo>
+                  <a:pt x="14582833" y="-28685"/>
+                  <a:pt x="14736540" y="69813"/>
+                  <a:pt x="14868425" y="0"/>
+                </a:cubicBezTo>
+                <a:cubicBezTo>
+                  <a:pt x="15000310" y="-69813"/>
+                  <a:pt x="15109474" y="6660"/>
+                  <a:pt x="15300681" y="0"/>
+                </a:cubicBezTo>
+                <a:cubicBezTo>
+                  <a:pt x="15491888" y="-6660"/>
+                  <a:pt x="15735314" y="19402"/>
+                  <a:pt x="15987554" y="0"/>
+                </a:cubicBezTo>
+                <a:cubicBezTo>
+                  <a:pt x="16031447" y="194434"/>
+                  <a:pt x="15929350" y="394904"/>
+                  <a:pt x="15987554" y="514934"/>
+                </a:cubicBezTo>
+                <a:cubicBezTo>
+                  <a:pt x="16045758" y="634964"/>
+                  <a:pt x="15950174" y="762368"/>
+                  <a:pt x="15987554" y="875979"/>
+                </a:cubicBezTo>
+                <a:cubicBezTo>
+                  <a:pt x="16024934" y="989591"/>
+                  <a:pt x="15966480" y="1292506"/>
+                  <a:pt x="15987554" y="1621746"/>
+                </a:cubicBezTo>
+                <a:cubicBezTo>
+                  <a:pt x="16008628" y="1950986"/>
+                  <a:pt x="15975084" y="1998981"/>
+                  <a:pt x="15987554" y="2367512"/>
+                </a:cubicBezTo>
+                <a:cubicBezTo>
+                  <a:pt x="16000024" y="2736043"/>
+                  <a:pt x="15982530" y="2740970"/>
+                  <a:pt x="15987554" y="2882446"/>
+                </a:cubicBezTo>
+                <a:cubicBezTo>
+                  <a:pt x="15992578" y="3023922"/>
+                  <a:pt x="15967898" y="3397478"/>
+                  <a:pt x="15987554" y="3628212"/>
+                </a:cubicBezTo>
+                <a:cubicBezTo>
+                  <a:pt x="16007210" y="3858946"/>
+                  <a:pt x="15977052" y="3955481"/>
+                  <a:pt x="15987554" y="4220090"/>
+                </a:cubicBezTo>
+                <a:cubicBezTo>
+                  <a:pt x="15998056" y="4484699"/>
+                  <a:pt x="15962634" y="4453252"/>
+                  <a:pt x="15987554" y="4581136"/>
+                </a:cubicBezTo>
+                <a:cubicBezTo>
+                  <a:pt x="16012474" y="4709020"/>
+                  <a:pt x="15973591" y="5090080"/>
+                  <a:pt x="15987554" y="5326902"/>
+                </a:cubicBezTo>
+                <a:cubicBezTo>
+                  <a:pt x="16001517" y="5563724"/>
+                  <a:pt x="15961998" y="5665715"/>
+                  <a:pt x="15987554" y="5995724"/>
+                </a:cubicBezTo>
+                <a:cubicBezTo>
+                  <a:pt x="16013110" y="6325733"/>
+                  <a:pt x="15952183" y="6264602"/>
+                  <a:pt x="15987554" y="6356770"/>
+                </a:cubicBezTo>
+                <a:cubicBezTo>
+                  <a:pt x="16022925" y="6448938"/>
+                  <a:pt x="15947520" y="6752321"/>
+                  <a:pt x="15987554" y="7025592"/>
+                </a:cubicBezTo>
+                <a:cubicBezTo>
+                  <a:pt x="16027588" y="7298863"/>
+                  <a:pt x="15923373" y="7499443"/>
+                  <a:pt x="15987554" y="7694414"/>
+                </a:cubicBezTo>
+                <a:cubicBezTo>
+                  <a:pt x="15782067" y="7794733"/>
+                  <a:pt x="15348115" y="7616947"/>
+                  <a:pt x="15075671" y="7694414"/>
+                </a:cubicBezTo>
+                <a:cubicBezTo>
+                  <a:pt x="14803227" y="7771881"/>
+                  <a:pt x="14563581" y="7623179"/>
+                  <a:pt x="14323664" y="7694414"/>
+                </a:cubicBezTo>
+                <a:cubicBezTo>
+                  <a:pt x="14083747" y="7765649"/>
+                  <a:pt x="13740962" y="7612160"/>
+                  <a:pt x="13571657" y="7694414"/>
+                </a:cubicBezTo>
+                <a:cubicBezTo>
+                  <a:pt x="13402352" y="7776668"/>
+                  <a:pt x="12988866" y="7684294"/>
+                  <a:pt x="12819650" y="7694414"/>
+                </a:cubicBezTo>
+                <a:cubicBezTo>
+                  <a:pt x="12650434" y="7704534"/>
+                  <a:pt x="12357997" y="7612356"/>
+                  <a:pt x="11907767" y="7694414"/>
+                </a:cubicBezTo>
+                <a:cubicBezTo>
+                  <a:pt x="11457537" y="7776472"/>
+                  <a:pt x="11755182" y="7683653"/>
+                  <a:pt x="11635387" y="7694414"/>
+                </a:cubicBezTo>
+                <a:cubicBezTo>
+                  <a:pt x="11515592" y="7705175"/>
+                  <a:pt x="11321394" y="7639446"/>
+                  <a:pt x="11043255" y="7694414"/>
+                </a:cubicBezTo>
+                <a:cubicBezTo>
+                  <a:pt x="10765116" y="7749382"/>
+                  <a:pt x="10983431" y="7686352"/>
+                  <a:pt x="10930750" y="7694414"/>
+                </a:cubicBezTo>
+                <a:cubicBezTo>
+                  <a:pt x="10878070" y="7702476"/>
+                  <a:pt x="10765570" y="7663034"/>
+                  <a:pt x="10658369" y="7694414"/>
+                </a:cubicBezTo>
+                <a:cubicBezTo>
+                  <a:pt x="10551168" y="7725794"/>
+                  <a:pt x="10222989" y="7674124"/>
+                  <a:pt x="10066238" y="7694414"/>
+                </a:cubicBezTo>
+                <a:cubicBezTo>
+                  <a:pt x="9909487" y="7714704"/>
+                  <a:pt x="9866545" y="7676834"/>
+                  <a:pt x="9793857" y="7694414"/>
+                </a:cubicBezTo>
+                <a:cubicBezTo>
+                  <a:pt x="9721169" y="7711994"/>
+                  <a:pt x="9656660" y="7668696"/>
+                  <a:pt x="9521477" y="7694414"/>
+                </a:cubicBezTo>
+                <a:cubicBezTo>
+                  <a:pt x="9386294" y="7720132"/>
+                  <a:pt x="8987779" y="7658260"/>
+                  <a:pt x="8769469" y="7694414"/>
+                </a:cubicBezTo>
+                <a:cubicBezTo>
+                  <a:pt x="8551159" y="7730568"/>
+                  <a:pt x="8695792" y="7683029"/>
+                  <a:pt x="8656964" y="7694414"/>
+                </a:cubicBezTo>
+                <a:cubicBezTo>
+                  <a:pt x="8618136" y="7705799"/>
+                  <a:pt x="8220269" y="7620666"/>
+                  <a:pt x="7904957" y="7694414"/>
+                </a:cubicBezTo>
+                <a:cubicBezTo>
+                  <a:pt x="7589645" y="7768162"/>
+                  <a:pt x="7322023" y="7618834"/>
+                  <a:pt x="6993075" y="7694414"/>
+                </a:cubicBezTo>
+                <a:cubicBezTo>
+                  <a:pt x="6664127" y="7769994"/>
+                  <a:pt x="6703813" y="7684052"/>
+                  <a:pt x="6560818" y="7694414"/>
+                </a:cubicBezTo>
+                <a:cubicBezTo>
+                  <a:pt x="6417823" y="7704776"/>
+                  <a:pt x="6245381" y="7656282"/>
+                  <a:pt x="6128562" y="7694414"/>
+                </a:cubicBezTo>
+                <a:cubicBezTo>
+                  <a:pt x="6011743" y="7732546"/>
+                  <a:pt x="5900236" y="7650341"/>
+                  <a:pt x="5696306" y="7694414"/>
+                </a:cubicBezTo>
+                <a:cubicBezTo>
+                  <a:pt x="5492376" y="7738487"/>
+                  <a:pt x="4967357" y="7652725"/>
+                  <a:pt x="4784424" y="7694414"/>
+                </a:cubicBezTo>
+                <a:cubicBezTo>
+                  <a:pt x="4601491" y="7736103"/>
+                  <a:pt x="4152880" y="7668606"/>
+                  <a:pt x="3872541" y="7694414"/>
+                </a:cubicBezTo>
+                <a:cubicBezTo>
+                  <a:pt x="3592202" y="7720222"/>
+                  <a:pt x="3590550" y="7658432"/>
+                  <a:pt x="3440285" y="7694414"/>
+                </a:cubicBezTo>
+                <a:cubicBezTo>
+                  <a:pt x="3290020" y="7730396"/>
+                  <a:pt x="3267537" y="7666836"/>
+                  <a:pt x="3167904" y="7694414"/>
+                </a:cubicBezTo>
+                <a:cubicBezTo>
+                  <a:pt x="3068271" y="7721992"/>
+                  <a:pt x="2973401" y="7678057"/>
+                  <a:pt x="2895524" y="7694414"/>
+                </a:cubicBezTo>
+                <a:cubicBezTo>
+                  <a:pt x="2817647" y="7710771"/>
+                  <a:pt x="2705607" y="7672404"/>
+                  <a:pt x="2623143" y="7694414"/>
+                </a:cubicBezTo>
+                <a:cubicBezTo>
+                  <a:pt x="2540679" y="7716424"/>
+                  <a:pt x="2200221" y="7607576"/>
+                  <a:pt x="1871136" y="7694414"/>
+                </a:cubicBezTo>
+                <a:cubicBezTo>
+                  <a:pt x="1542051" y="7781252"/>
+                  <a:pt x="1226071" y="7644998"/>
+                  <a:pt x="959253" y="7694414"/>
+                </a:cubicBezTo>
+                <a:cubicBezTo>
+                  <a:pt x="692435" y="7743830"/>
+                  <a:pt x="260784" y="7590216"/>
+                  <a:pt x="0" y="7694414"/>
+                </a:cubicBezTo>
+                <a:cubicBezTo>
+                  <a:pt x="-22166" y="7435026"/>
+                  <a:pt x="38300" y="7396378"/>
+                  <a:pt x="0" y="7102536"/>
+                </a:cubicBezTo>
+                <a:cubicBezTo>
+                  <a:pt x="-38300" y="6808694"/>
+                  <a:pt x="3570" y="6836322"/>
+                  <a:pt x="0" y="6741490"/>
+                </a:cubicBezTo>
+                <a:cubicBezTo>
+                  <a:pt x="-3570" y="6646658"/>
+                  <a:pt x="48285" y="6354351"/>
+                  <a:pt x="0" y="6226557"/>
+                </a:cubicBezTo>
+                <a:cubicBezTo>
+                  <a:pt x="-48285" y="6098763"/>
+                  <a:pt x="26826" y="6002553"/>
+                  <a:pt x="0" y="5865511"/>
+                </a:cubicBezTo>
+                <a:cubicBezTo>
+                  <a:pt x="-26826" y="5728469"/>
+                  <a:pt x="22862" y="5488957"/>
+                  <a:pt x="0" y="5350577"/>
+                </a:cubicBezTo>
+                <a:cubicBezTo>
+                  <a:pt x="-22862" y="5212197"/>
+                  <a:pt x="5779" y="5049373"/>
+                  <a:pt x="0" y="4912587"/>
+                </a:cubicBezTo>
+                <a:cubicBezTo>
+                  <a:pt x="-5779" y="4775801"/>
+                  <a:pt x="6382" y="4560596"/>
+                  <a:pt x="0" y="4320709"/>
+                </a:cubicBezTo>
+                <a:cubicBezTo>
+                  <a:pt x="-6382" y="4080822"/>
+                  <a:pt x="26600" y="4034248"/>
+                  <a:pt x="0" y="3959664"/>
+                </a:cubicBezTo>
+                <a:cubicBezTo>
+                  <a:pt x="-26600" y="3885081"/>
+                  <a:pt x="61137" y="3502887"/>
+                  <a:pt x="0" y="3213898"/>
+                </a:cubicBezTo>
+                <a:cubicBezTo>
+                  <a:pt x="-61137" y="2924909"/>
+                  <a:pt x="34639" y="2770281"/>
+                  <a:pt x="0" y="2545075"/>
+                </a:cubicBezTo>
+                <a:cubicBezTo>
+                  <a:pt x="-34639" y="2319869"/>
+                  <a:pt x="62024" y="2196586"/>
+                  <a:pt x="0" y="1953197"/>
+                </a:cubicBezTo>
+                <a:cubicBezTo>
+                  <a:pt x="-62024" y="1709808"/>
+                  <a:pt x="53695" y="1621816"/>
+                  <a:pt x="0" y="1361319"/>
+                </a:cubicBezTo>
+                <a:cubicBezTo>
+                  <a:pt x="-53695" y="1100822"/>
+                  <a:pt x="24643" y="1144567"/>
+                  <a:pt x="0" y="1000274"/>
+                </a:cubicBezTo>
+                <a:cubicBezTo>
+                  <a:pt x="-24643" y="855982"/>
+                  <a:pt x="91853" y="226159"/>
                   <a:pt x="0" y="0"/>
                 </a:cubicBezTo>
                 <a:close/>
               </a:path>
-              <a:path w="15651953" h="6924973" stroke="0" extrusionOk="0">
+              <a:path w="15987554" h="7694414" stroke="0" extrusionOk="0">
                 <a:moveTo>
                   <a:pt x="0" y="0"/>
                 </a:moveTo>
                 <a:cubicBezTo>
-                  <a:pt x="339675" y="-73120"/>
-                  <a:pt x="564650" y="26762"/>
-                  <a:pt x="736221" y="0"/>
-                </a:cubicBezTo>
-                <a:cubicBezTo>
-                  <a:pt x="907792" y="-26762"/>
-                  <a:pt x="987219" y="28794"/>
-                  <a:pt x="1159404" y="0"/>
-                </a:cubicBezTo>
-                <a:cubicBezTo>
-                  <a:pt x="1331589" y="-28794"/>
-                  <a:pt x="1591223" y="22935"/>
-                  <a:pt x="1895625" y="0"/>
-                </a:cubicBezTo>
-                <a:cubicBezTo>
-                  <a:pt x="2200027" y="-22935"/>
-                  <a:pt x="2205696" y="66588"/>
-                  <a:pt x="2475327" y="0"/>
-                </a:cubicBezTo>
-                <a:cubicBezTo>
-                  <a:pt x="2744958" y="-66588"/>
-                  <a:pt x="2893236" y="50729"/>
-                  <a:pt x="3055029" y="0"/>
-                </a:cubicBezTo>
-                <a:cubicBezTo>
-                  <a:pt x="3216822" y="-50729"/>
-                  <a:pt x="3513415" y="42375"/>
-                  <a:pt x="3791251" y="0"/>
-                </a:cubicBezTo>
-                <a:cubicBezTo>
-                  <a:pt x="4069087" y="-42375"/>
-                  <a:pt x="4205869" y="15485"/>
-                  <a:pt x="4527472" y="0"/>
-                </a:cubicBezTo>
-                <a:cubicBezTo>
-                  <a:pt x="4849075" y="-15485"/>
-                  <a:pt x="5057144" y="23520"/>
-                  <a:pt x="5420213" y="0"/>
-                </a:cubicBezTo>
-                <a:cubicBezTo>
-                  <a:pt x="5783282" y="-23520"/>
-                  <a:pt x="5829888" y="45870"/>
-                  <a:pt x="5999915" y="0"/>
-                </a:cubicBezTo>
-                <a:cubicBezTo>
-                  <a:pt x="6169942" y="-45870"/>
-                  <a:pt x="6056473" y="9297"/>
-                  <a:pt x="6110059" y="0"/>
-                </a:cubicBezTo>
-                <a:cubicBezTo>
-                  <a:pt x="6163645" y="-9297"/>
-                  <a:pt x="6184089" y="4110"/>
-                  <a:pt x="6220202" y="0"/>
-                </a:cubicBezTo>
-                <a:cubicBezTo>
-                  <a:pt x="6256315" y="-4110"/>
-                  <a:pt x="6482452" y="28640"/>
-                  <a:pt x="6643384" y="0"/>
-                </a:cubicBezTo>
-                <a:cubicBezTo>
-                  <a:pt x="6804316" y="-28640"/>
-                  <a:pt x="6797439" y="30297"/>
-                  <a:pt x="6910047" y="0"/>
-                </a:cubicBezTo>
-                <a:cubicBezTo>
-                  <a:pt x="7022655" y="-30297"/>
-                  <a:pt x="7328657" y="38382"/>
-                  <a:pt x="7489749" y="0"/>
-                </a:cubicBezTo>
-                <a:cubicBezTo>
-                  <a:pt x="7650841" y="-38382"/>
-                  <a:pt x="7639258" y="11305"/>
-                  <a:pt x="7756412" y="0"/>
-                </a:cubicBezTo>
-                <a:cubicBezTo>
-                  <a:pt x="7873566" y="-11305"/>
-                  <a:pt x="8111350" y="62253"/>
-                  <a:pt x="8336114" y="0"/>
-                </a:cubicBezTo>
-                <a:cubicBezTo>
-                  <a:pt x="8560878" y="-62253"/>
-                  <a:pt x="8687517" y="14131"/>
-                  <a:pt x="8915816" y="0"/>
-                </a:cubicBezTo>
-                <a:cubicBezTo>
-                  <a:pt x="9144115" y="-14131"/>
-                  <a:pt x="9108801" y="3505"/>
-                  <a:pt x="9182479" y="0"/>
-                </a:cubicBezTo>
-                <a:cubicBezTo>
-                  <a:pt x="9256157" y="-3505"/>
-                  <a:pt x="9520276" y="27464"/>
-                  <a:pt x="9605662" y="0"/>
-                </a:cubicBezTo>
-                <a:cubicBezTo>
-                  <a:pt x="9691048" y="-27464"/>
-                  <a:pt x="10075586" y="59905"/>
-                  <a:pt x="10341883" y="0"/>
-                </a:cubicBezTo>
-                <a:cubicBezTo>
-                  <a:pt x="10608180" y="-59905"/>
-                  <a:pt x="10644021" y="1734"/>
-                  <a:pt x="10921585" y="0"/>
-                </a:cubicBezTo>
-                <a:cubicBezTo>
-                  <a:pt x="11199149" y="-1734"/>
-                  <a:pt x="11247406" y="43159"/>
-                  <a:pt x="11344767" y="0"/>
-                </a:cubicBezTo>
-                <a:cubicBezTo>
-                  <a:pt x="11442128" y="-43159"/>
-                  <a:pt x="11805500" y="24044"/>
-                  <a:pt x="11924469" y="0"/>
-                </a:cubicBezTo>
-                <a:cubicBezTo>
-                  <a:pt x="12043438" y="-24044"/>
-                  <a:pt x="12481713" y="64086"/>
-                  <a:pt x="12660691" y="0"/>
-                </a:cubicBezTo>
-                <a:cubicBezTo>
-                  <a:pt x="12839669" y="-64086"/>
-                  <a:pt x="12736263" y="6952"/>
-                  <a:pt x="12770834" y="0"/>
-                </a:cubicBezTo>
-                <a:cubicBezTo>
-                  <a:pt x="12805405" y="-6952"/>
-                  <a:pt x="13240644" y="15522"/>
-                  <a:pt x="13663575" y="0"/>
-                </a:cubicBezTo>
-                <a:cubicBezTo>
-                  <a:pt x="14086506" y="-15522"/>
-                  <a:pt x="14130642" y="34705"/>
-                  <a:pt x="14556316" y="0"/>
-                </a:cubicBezTo>
-                <a:cubicBezTo>
-                  <a:pt x="14981990" y="-34705"/>
-                  <a:pt x="14759519" y="12823"/>
-                  <a:pt x="14822979" y="0"/>
-                </a:cubicBezTo>
-                <a:cubicBezTo>
-                  <a:pt x="14886439" y="-12823"/>
-                  <a:pt x="15485818" y="64814"/>
-                  <a:pt x="15651953" y="0"/>
-                </a:cubicBezTo>
-                <a:cubicBezTo>
-                  <a:pt x="15693715" y="204861"/>
-                  <a:pt x="15619503" y="447224"/>
-                  <a:pt x="15651953" y="646331"/>
-                </a:cubicBezTo>
-                <a:cubicBezTo>
-                  <a:pt x="15684403" y="845438"/>
-                  <a:pt x="15585927" y="1140913"/>
-                  <a:pt x="15651953" y="1292662"/>
-                </a:cubicBezTo>
-                <a:cubicBezTo>
-                  <a:pt x="15717979" y="1444411"/>
-                  <a:pt x="15625934" y="1624812"/>
-                  <a:pt x="15651953" y="1800493"/>
-                </a:cubicBezTo>
-                <a:cubicBezTo>
-                  <a:pt x="15677972" y="1976174"/>
-                  <a:pt x="15617955" y="2168419"/>
-                  <a:pt x="15651953" y="2377574"/>
-                </a:cubicBezTo>
-                <a:cubicBezTo>
-                  <a:pt x="15685951" y="2586729"/>
-                  <a:pt x="15648879" y="2625949"/>
-                  <a:pt x="15651953" y="2746906"/>
-                </a:cubicBezTo>
-                <a:cubicBezTo>
-                  <a:pt x="15655027" y="2867863"/>
-                  <a:pt x="15643168" y="2937800"/>
-                  <a:pt x="15651953" y="3116238"/>
-                </a:cubicBezTo>
-                <a:cubicBezTo>
-                  <a:pt x="15660738" y="3294676"/>
-                  <a:pt x="15595914" y="3458301"/>
-                  <a:pt x="15651953" y="3693319"/>
-                </a:cubicBezTo>
-                <a:cubicBezTo>
-                  <a:pt x="15707992" y="3928337"/>
-                  <a:pt x="15644561" y="3985771"/>
-                  <a:pt x="15651953" y="4131901"/>
-                </a:cubicBezTo>
-                <a:cubicBezTo>
-                  <a:pt x="15659345" y="4278031"/>
-                  <a:pt x="15634760" y="4417259"/>
-                  <a:pt x="15651953" y="4639732"/>
-                </a:cubicBezTo>
-                <a:cubicBezTo>
-                  <a:pt x="15669146" y="4862205"/>
-                  <a:pt x="15604063" y="4985649"/>
-                  <a:pt x="15651953" y="5147563"/>
-                </a:cubicBezTo>
-                <a:cubicBezTo>
-                  <a:pt x="15699843" y="5309477"/>
-                  <a:pt x="15608354" y="5574245"/>
-                  <a:pt x="15651953" y="5863144"/>
-                </a:cubicBezTo>
-                <a:cubicBezTo>
-                  <a:pt x="15695552" y="6152043"/>
-                  <a:pt x="15613118" y="6114336"/>
-                  <a:pt x="15651953" y="6232476"/>
-                </a:cubicBezTo>
-                <a:cubicBezTo>
-                  <a:pt x="15690788" y="6350616"/>
-                  <a:pt x="15607975" y="6597618"/>
-                  <a:pt x="15651953" y="6924973"/>
-                </a:cubicBezTo>
-                <a:cubicBezTo>
-                  <a:pt x="15521386" y="6940071"/>
-                  <a:pt x="15453519" y="6905225"/>
-                  <a:pt x="15385290" y="6924973"/>
-                </a:cubicBezTo>
-                <a:cubicBezTo>
-                  <a:pt x="15317061" y="6944721"/>
-                  <a:pt x="14716828" y="6895550"/>
-                  <a:pt x="14492549" y="6924973"/>
-                </a:cubicBezTo>
-                <a:cubicBezTo>
-                  <a:pt x="14268270" y="6954396"/>
-                  <a:pt x="14101162" y="6860180"/>
-                  <a:pt x="13912847" y="6924973"/>
-                </a:cubicBezTo>
-                <a:cubicBezTo>
-                  <a:pt x="13724532" y="6989766"/>
-                  <a:pt x="13586684" y="6901017"/>
-                  <a:pt x="13489665" y="6924973"/>
-                </a:cubicBezTo>
-                <a:cubicBezTo>
-                  <a:pt x="13392646" y="6948929"/>
-                  <a:pt x="13251602" y="6906067"/>
-                  <a:pt x="13066482" y="6924973"/>
-                </a:cubicBezTo>
-                <a:cubicBezTo>
-                  <a:pt x="12881362" y="6943879"/>
-                  <a:pt x="12606264" y="6853950"/>
-                  <a:pt x="12330261" y="6924973"/>
-                </a:cubicBezTo>
-                <a:cubicBezTo>
-                  <a:pt x="12054258" y="6995996"/>
-                  <a:pt x="12188164" y="6903726"/>
-                  <a:pt x="12063598" y="6924973"/>
-                </a:cubicBezTo>
-                <a:cubicBezTo>
-                  <a:pt x="11939032" y="6946220"/>
-                  <a:pt x="11737153" y="6856497"/>
-                  <a:pt x="11483896" y="6924973"/>
-                </a:cubicBezTo>
-                <a:cubicBezTo>
-                  <a:pt x="11230639" y="6993449"/>
-                  <a:pt x="11199181" y="6894420"/>
-                  <a:pt x="11060713" y="6924973"/>
-                </a:cubicBezTo>
-                <a:cubicBezTo>
-                  <a:pt x="10922245" y="6955526"/>
-                  <a:pt x="10974722" y="6922895"/>
-                  <a:pt x="10950570" y="6924973"/>
-                </a:cubicBezTo>
-                <a:cubicBezTo>
-                  <a:pt x="10926418" y="6927051"/>
-                  <a:pt x="10889747" y="6915650"/>
-                  <a:pt x="10840427" y="6924973"/>
-                </a:cubicBezTo>
-                <a:cubicBezTo>
-                  <a:pt x="10791107" y="6934296"/>
-                  <a:pt x="10377749" y="6873663"/>
-                  <a:pt x="10104205" y="6924973"/>
-                </a:cubicBezTo>
-                <a:cubicBezTo>
-                  <a:pt x="9830661" y="6976283"/>
-                  <a:pt x="9400397" y="6902809"/>
-                  <a:pt x="9211464" y="6924973"/>
-                </a:cubicBezTo>
-                <a:cubicBezTo>
-                  <a:pt x="9022531" y="6947137"/>
-                  <a:pt x="9124647" y="6922185"/>
-                  <a:pt x="9101321" y="6924973"/>
-                </a:cubicBezTo>
-                <a:cubicBezTo>
-                  <a:pt x="9077995" y="6927761"/>
-                  <a:pt x="8908890" y="6914375"/>
-                  <a:pt x="8834658" y="6924973"/>
-                </a:cubicBezTo>
-                <a:cubicBezTo>
-                  <a:pt x="8760426" y="6935571"/>
-                  <a:pt x="8466013" y="6877825"/>
-                  <a:pt x="8098436" y="6924973"/>
-                </a:cubicBezTo>
-                <a:cubicBezTo>
-                  <a:pt x="7730859" y="6972121"/>
-                  <a:pt x="8038030" y="6919915"/>
-                  <a:pt x="7988293" y="6924973"/>
-                </a:cubicBezTo>
-                <a:cubicBezTo>
-                  <a:pt x="7938556" y="6930031"/>
-                  <a:pt x="7682610" y="6889346"/>
-                  <a:pt x="7408591" y="6924973"/>
-                </a:cubicBezTo>
-                <a:cubicBezTo>
-                  <a:pt x="7134572" y="6960600"/>
-                  <a:pt x="6722505" y="6908100"/>
-                  <a:pt x="6515850" y="6924973"/>
-                </a:cubicBezTo>
-                <a:cubicBezTo>
-                  <a:pt x="6309195" y="6941846"/>
-                  <a:pt x="6200463" y="6861704"/>
-                  <a:pt x="5936148" y="6924973"/>
-                </a:cubicBezTo>
-                <a:cubicBezTo>
-                  <a:pt x="5671833" y="6988242"/>
-                  <a:pt x="5541316" y="6890566"/>
-                  <a:pt x="5199927" y="6924973"/>
-                </a:cubicBezTo>
-                <a:cubicBezTo>
-                  <a:pt x="4858538" y="6959380"/>
-                  <a:pt x="4720808" y="6904512"/>
-                  <a:pt x="4307186" y="6924973"/>
-                </a:cubicBezTo>
-                <a:cubicBezTo>
-                  <a:pt x="3893564" y="6945434"/>
-                  <a:pt x="3924368" y="6864436"/>
-                  <a:pt x="3727484" y="6924973"/>
-                </a:cubicBezTo>
-                <a:cubicBezTo>
-                  <a:pt x="3530600" y="6985510"/>
-                  <a:pt x="3519109" y="6915710"/>
-                  <a:pt x="3460821" y="6924973"/>
-                </a:cubicBezTo>
-                <a:cubicBezTo>
-                  <a:pt x="3402533" y="6934236"/>
-                  <a:pt x="3317015" y="6921975"/>
-                  <a:pt x="3194158" y="6924973"/>
-                </a:cubicBezTo>
-                <a:cubicBezTo>
-                  <a:pt x="3071301" y="6927971"/>
-                  <a:pt x="2630983" y="6844804"/>
-                  <a:pt x="2301417" y="6924973"/>
-                </a:cubicBezTo>
-                <a:cubicBezTo>
-                  <a:pt x="1971851" y="7005142"/>
-                  <a:pt x="2143453" y="6907193"/>
-                  <a:pt x="2034754" y="6924973"/>
-                </a:cubicBezTo>
-                <a:cubicBezTo>
-                  <a:pt x="1926055" y="6942753"/>
-                  <a:pt x="1737998" y="6907094"/>
-                  <a:pt x="1611571" y="6924973"/>
-                </a:cubicBezTo>
-                <a:cubicBezTo>
-                  <a:pt x="1485144" y="6942852"/>
-                  <a:pt x="1378019" y="6912662"/>
-                  <a:pt x="1188389" y="6924973"/>
-                </a:cubicBezTo>
-                <a:cubicBezTo>
-                  <a:pt x="998759" y="6937284"/>
-                  <a:pt x="879081" y="6911991"/>
-                  <a:pt x="765207" y="6924973"/>
-                </a:cubicBezTo>
-                <a:cubicBezTo>
-                  <a:pt x="651333" y="6937955"/>
-                  <a:pt x="297109" y="6840614"/>
-                  <a:pt x="0" y="6924973"/>
-                </a:cubicBezTo>
-                <a:cubicBezTo>
-                  <a:pt x="-49694" y="6781806"/>
-                  <a:pt x="3359" y="6551610"/>
-                  <a:pt x="0" y="6417142"/>
-                </a:cubicBezTo>
-                <a:cubicBezTo>
-                  <a:pt x="-3359" y="6282674"/>
-                  <a:pt x="29245" y="5917090"/>
-                  <a:pt x="0" y="5701561"/>
-                </a:cubicBezTo>
-                <a:cubicBezTo>
-                  <a:pt x="-29245" y="5486032"/>
-                  <a:pt x="9933" y="5276142"/>
-                  <a:pt x="0" y="5124480"/>
-                </a:cubicBezTo>
-                <a:cubicBezTo>
-                  <a:pt x="-9933" y="4972818"/>
-                  <a:pt x="2210" y="4846401"/>
-                  <a:pt x="0" y="4685898"/>
-                </a:cubicBezTo>
-                <a:cubicBezTo>
-                  <a:pt x="-2210" y="4525395"/>
-                  <a:pt x="39449" y="4379022"/>
-                  <a:pt x="0" y="4247317"/>
-                </a:cubicBezTo>
-                <a:cubicBezTo>
-                  <a:pt x="-39449" y="4115612"/>
-                  <a:pt x="37025" y="3895417"/>
-                  <a:pt x="0" y="3670236"/>
-                </a:cubicBezTo>
-                <a:cubicBezTo>
-                  <a:pt x="-37025" y="3445055"/>
-                  <a:pt x="1598" y="3441162"/>
-                  <a:pt x="0" y="3300904"/>
-                </a:cubicBezTo>
-                <a:cubicBezTo>
-                  <a:pt x="-1598" y="3160646"/>
-                  <a:pt x="22577" y="2987738"/>
-                  <a:pt x="0" y="2793072"/>
-                </a:cubicBezTo>
-                <a:cubicBezTo>
-                  <a:pt x="-22577" y="2598406"/>
-                  <a:pt x="39460" y="2498343"/>
-                  <a:pt x="0" y="2423741"/>
-                </a:cubicBezTo>
-                <a:cubicBezTo>
-                  <a:pt x="-39460" y="2349139"/>
-                  <a:pt x="40154" y="2020082"/>
-                  <a:pt x="0" y="1777410"/>
-                </a:cubicBezTo>
-                <a:cubicBezTo>
-                  <a:pt x="-40154" y="1534738"/>
-                  <a:pt x="75598" y="1320043"/>
-                  <a:pt x="0" y="1131079"/>
-                </a:cubicBezTo>
-                <a:cubicBezTo>
-                  <a:pt x="-75598" y="942115"/>
-                  <a:pt x="30680" y="801806"/>
-                  <a:pt x="0" y="553998"/>
-                </a:cubicBezTo>
-                <a:cubicBezTo>
-                  <a:pt x="-30680" y="306190"/>
-                  <a:pt x="53717" y="263746"/>
+                  <a:pt x="346833" y="-11600"/>
+                  <a:pt x="440283" y="73085"/>
+                  <a:pt x="752007" y="0"/>
+                </a:cubicBezTo>
+                <a:cubicBezTo>
+                  <a:pt x="1063731" y="-73085"/>
+                  <a:pt x="1074936" y="34527"/>
+                  <a:pt x="1184263" y="0"/>
+                </a:cubicBezTo>
+                <a:cubicBezTo>
+                  <a:pt x="1293590" y="-34527"/>
+                  <a:pt x="1734282" y="16242"/>
+                  <a:pt x="1936270" y="0"/>
+                </a:cubicBezTo>
+                <a:cubicBezTo>
+                  <a:pt x="2138258" y="-16242"/>
+                  <a:pt x="2271968" y="65758"/>
+                  <a:pt x="2528402" y="0"/>
+                </a:cubicBezTo>
+                <a:cubicBezTo>
+                  <a:pt x="2784836" y="-65758"/>
+                  <a:pt x="2946290" y="39998"/>
+                  <a:pt x="3120534" y="0"/>
+                </a:cubicBezTo>
+                <a:cubicBezTo>
+                  <a:pt x="3294778" y="-39998"/>
+                  <a:pt x="3564396" y="35171"/>
+                  <a:pt x="3872541" y="0"/>
+                </a:cubicBezTo>
+                <a:cubicBezTo>
+                  <a:pt x="4180686" y="-35171"/>
+                  <a:pt x="4367740" y="47032"/>
+                  <a:pt x="4624548" y="0"/>
+                </a:cubicBezTo>
+                <a:cubicBezTo>
+                  <a:pt x="4881356" y="-47032"/>
+                  <a:pt x="5164750" y="41414"/>
+                  <a:pt x="5536431" y="0"/>
+                </a:cubicBezTo>
+                <a:cubicBezTo>
+                  <a:pt x="5908112" y="-41414"/>
+                  <a:pt x="6008848" y="1323"/>
+                  <a:pt x="6128562" y="0"/>
+                </a:cubicBezTo>
+                <a:cubicBezTo>
+                  <a:pt x="6248276" y="-1323"/>
+                  <a:pt x="6204564" y="8088"/>
+                  <a:pt x="6241067" y="0"/>
+                </a:cubicBezTo>
+                <a:cubicBezTo>
+                  <a:pt x="6277570" y="-8088"/>
+                  <a:pt x="6316020" y="11868"/>
+                  <a:pt x="6353572" y="0"/>
+                </a:cubicBezTo>
+                <a:cubicBezTo>
+                  <a:pt x="6391124" y="-11868"/>
+                  <a:pt x="6650500" y="26534"/>
+                  <a:pt x="6785828" y="0"/>
+                </a:cubicBezTo>
+                <a:cubicBezTo>
+                  <a:pt x="6921156" y="-26534"/>
+                  <a:pt x="6933984" y="30508"/>
+                  <a:pt x="7058209" y="0"/>
+                </a:cubicBezTo>
+                <a:cubicBezTo>
+                  <a:pt x="7182434" y="-30508"/>
+                  <a:pt x="7510915" y="48432"/>
+                  <a:pt x="7650341" y="0"/>
+                </a:cubicBezTo>
+                <a:cubicBezTo>
+                  <a:pt x="7789767" y="-48432"/>
+                  <a:pt x="7798834" y="15217"/>
+                  <a:pt x="7922721" y="0"/>
+                </a:cubicBezTo>
+                <a:cubicBezTo>
+                  <a:pt x="8046608" y="-15217"/>
+                  <a:pt x="8222556" y="33437"/>
+                  <a:pt x="8514853" y="0"/>
+                </a:cubicBezTo>
+                <a:cubicBezTo>
+                  <a:pt x="8807150" y="-33437"/>
+                  <a:pt x="8812182" y="25615"/>
+                  <a:pt x="9106984" y="0"/>
+                </a:cubicBezTo>
+                <a:cubicBezTo>
+                  <a:pt x="9401786" y="-25615"/>
+                  <a:pt x="9262061" y="4620"/>
+                  <a:pt x="9379365" y="0"/>
+                </a:cubicBezTo>
+                <a:cubicBezTo>
+                  <a:pt x="9496669" y="-4620"/>
+                  <a:pt x="9704968" y="21040"/>
+                  <a:pt x="9811621" y="0"/>
+                </a:cubicBezTo>
+                <a:cubicBezTo>
+                  <a:pt x="9918274" y="-21040"/>
+                  <a:pt x="10349847" y="7875"/>
+                  <a:pt x="10563628" y="0"/>
+                </a:cubicBezTo>
+                <a:cubicBezTo>
+                  <a:pt x="10777409" y="-7875"/>
+                  <a:pt x="10939168" y="39807"/>
+                  <a:pt x="11155760" y="0"/>
+                </a:cubicBezTo>
+                <a:cubicBezTo>
+                  <a:pt x="11372352" y="-39807"/>
+                  <a:pt x="11420120" y="47154"/>
+                  <a:pt x="11588016" y="0"/>
+                </a:cubicBezTo>
+                <a:cubicBezTo>
+                  <a:pt x="11755912" y="-47154"/>
+                  <a:pt x="11931807" y="52812"/>
+                  <a:pt x="12180148" y="0"/>
+                </a:cubicBezTo>
+                <a:cubicBezTo>
+                  <a:pt x="12428489" y="-52812"/>
+                  <a:pt x="12563731" y="11294"/>
+                  <a:pt x="12932155" y="0"/>
+                </a:cubicBezTo>
+                <a:cubicBezTo>
+                  <a:pt x="13300579" y="-11294"/>
+                  <a:pt x="13006223" y="9364"/>
+                  <a:pt x="13044660" y="0"/>
+                </a:cubicBezTo>
+                <a:cubicBezTo>
+                  <a:pt x="13083098" y="-9364"/>
+                  <a:pt x="13509097" y="29869"/>
+                  <a:pt x="13956543" y="0"/>
+                </a:cubicBezTo>
+                <a:cubicBezTo>
+                  <a:pt x="14403989" y="-29869"/>
+                  <a:pt x="14679215" y="65588"/>
+                  <a:pt x="14868425" y="0"/>
+                </a:cubicBezTo>
+                <a:cubicBezTo>
+                  <a:pt x="15057635" y="-65588"/>
+                  <a:pt x="15010266" y="20845"/>
+                  <a:pt x="15140806" y="0"/>
+                </a:cubicBezTo>
+                <a:cubicBezTo>
+                  <a:pt x="15271346" y="-20845"/>
+                  <a:pt x="15688852" y="59584"/>
+                  <a:pt x="15987554" y="0"/>
+                </a:cubicBezTo>
+                <a:cubicBezTo>
+                  <a:pt x="16019755" y="204007"/>
+                  <a:pt x="15972062" y="427585"/>
+                  <a:pt x="15987554" y="668822"/>
+                </a:cubicBezTo>
+                <a:cubicBezTo>
+                  <a:pt x="16003046" y="910059"/>
+                  <a:pt x="15909145" y="1040391"/>
+                  <a:pt x="15987554" y="1337644"/>
+                </a:cubicBezTo>
+                <a:cubicBezTo>
+                  <a:pt x="16065963" y="1634897"/>
+                  <a:pt x="15948725" y="1738614"/>
+                  <a:pt x="15987554" y="1852578"/>
+                </a:cubicBezTo>
+                <a:cubicBezTo>
+                  <a:pt x="16026383" y="1966542"/>
+                  <a:pt x="15985845" y="2325711"/>
+                  <a:pt x="15987554" y="2444456"/>
+                </a:cubicBezTo>
+                <a:cubicBezTo>
+                  <a:pt x="15989263" y="2563201"/>
+                  <a:pt x="15959318" y="2634894"/>
+                  <a:pt x="15987554" y="2805502"/>
+                </a:cubicBezTo>
+                <a:cubicBezTo>
+                  <a:pt x="16015790" y="2976110"/>
+                  <a:pt x="15978408" y="3089895"/>
+                  <a:pt x="15987554" y="3166547"/>
+                </a:cubicBezTo>
+                <a:cubicBezTo>
+                  <a:pt x="15996700" y="3243199"/>
+                  <a:pt x="15967113" y="3493822"/>
+                  <a:pt x="15987554" y="3758425"/>
+                </a:cubicBezTo>
+                <a:cubicBezTo>
+                  <a:pt x="16007995" y="4023028"/>
+                  <a:pt x="15966127" y="4037118"/>
+                  <a:pt x="15987554" y="4196415"/>
+                </a:cubicBezTo>
+                <a:cubicBezTo>
+                  <a:pt x="16008981" y="4355712"/>
+                  <a:pt x="15927650" y="4466775"/>
+                  <a:pt x="15987554" y="4711349"/>
+                </a:cubicBezTo>
+                <a:cubicBezTo>
+                  <a:pt x="16047458" y="4955923"/>
+                  <a:pt x="15957620" y="5013793"/>
+                  <a:pt x="15987554" y="5226283"/>
+                </a:cubicBezTo>
+                <a:cubicBezTo>
+                  <a:pt x="16017488" y="5438773"/>
+                  <a:pt x="15982067" y="5774199"/>
+                  <a:pt x="15987554" y="5972049"/>
+                </a:cubicBezTo>
+                <a:cubicBezTo>
+                  <a:pt x="15993041" y="6169899"/>
+                  <a:pt x="15984760" y="6205800"/>
+                  <a:pt x="15987554" y="6333095"/>
+                </a:cubicBezTo>
+                <a:cubicBezTo>
+                  <a:pt x="15990348" y="6460390"/>
+                  <a:pt x="15982651" y="6568143"/>
+                  <a:pt x="15987554" y="6771084"/>
+                </a:cubicBezTo>
+                <a:cubicBezTo>
+                  <a:pt x="15992457" y="6974025"/>
+                  <a:pt x="15880955" y="7281421"/>
+                  <a:pt x="15987554" y="7694414"/>
+                </a:cubicBezTo>
+                <a:cubicBezTo>
+                  <a:pt x="15871041" y="7708081"/>
+                  <a:pt x="15746008" y="7668848"/>
+                  <a:pt x="15555298" y="7694414"/>
+                </a:cubicBezTo>
+                <a:cubicBezTo>
+                  <a:pt x="15364588" y="7719980"/>
+                  <a:pt x="15226133" y="7651455"/>
+                  <a:pt x="14963166" y="7694414"/>
+                </a:cubicBezTo>
+                <a:cubicBezTo>
+                  <a:pt x="14700199" y="7737373"/>
+                  <a:pt x="14697064" y="7642943"/>
+                  <a:pt x="14530910" y="7694414"/>
+                </a:cubicBezTo>
+                <a:cubicBezTo>
+                  <a:pt x="14364756" y="7745885"/>
+                  <a:pt x="14237028" y="7692913"/>
+                  <a:pt x="14098654" y="7694414"/>
+                </a:cubicBezTo>
+                <a:cubicBezTo>
+                  <a:pt x="13960280" y="7695915"/>
+                  <a:pt x="13700386" y="7658839"/>
+                  <a:pt x="13346647" y="7694414"/>
+                </a:cubicBezTo>
+                <a:cubicBezTo>
+                  <a:pt x="12992908" y="7729989"/>
+                  <a:pt x="13188926" y="7688274"/>
+                  <a:pt x="13074266" y="7694414"/>
+                </a:cubicBezTo>
+                <a:cubicBezTo>
+                  <a:pt x="12959606" y="7700554"/>
+                  <a:pt x="12694188" y="7641163"/>
+                  <a:pt x="12482135" y="7694414"/>
+                </a:cubicBezTo>
+                <a:cubicBezTo>
+                  <a:pt x="12270082" y="7747665"/>
+                  <a:pt x="12191586" y="7675548"/>
+                  <a:pt x="12049879" y="7694414"/>
+                </a:cubicBezTo>
+                <a:cubicBezTo>
+                  <a:pt x="11908172" y="7713280"/>
+                  <a:pt x="11979000" y="7685730"/>
+                  <a:pt x="11937374" y="7694414"/>
+                </a:cubicBezTo>
+                <a:cubicBezTo>
+                  <a:pt x="11895749" y="7703098"/>
+                  <a:pt x="11870709" y="7690271"/>
+                  <a:pt x="11824869" y="7694414"/>
+                </a:cubicBezTo>
+                <a:cubicBezTo>
+                  <a:pt x="11779029" y="7698557"/>
+                  <a:pt x="11429758" y="7678720"/>
+                  <a:pt x="11072861" y="7694414"/>
+                </a:cubicBezTo>
+                <a:cubicBezTo>
+                  <a:pt x="10715964" y="7710108"/>
+                  <a:pt x="10381183" y="7601642"/>
+                  <a:pt x="10160979" y="7694414"/>
+                </a:cubicBezTo>
+                <a:cubicBezTo>
+                  <a:pt x="9940775" y="7787186"/>
+                  <a:pt x="10072908" y="7689545"/>
+                  <a:pt x="10048474" y="7694414"/>
+                </a:cubicBezTo>
+                <a:cubicBezTo>
+                  <a:pt x="10024041" y="7699283"/>
+                  <a:pt x="9871135" y="7686667"/>
+                  <a:pt x="9776093" y="7694414"/>
+                </a:cubicBezTo>
+                <a:cubicBezTo>
+                  <a:pt x="9681051" y="7702161"/>
+                  <a:pt x="9362423" y="7654405"/>
+                  <a:pt x="9024086" y="7694414"/>
+                </a:cubicBezTo>
+                <a:cubicBezTo>
+                  <a:pt x="8685749" y="7734423"/>
+                  <a:pt x="8961282" y="7683311"/>
+                  <a:pt x="8911581" y="7694414"/>
+                </a:cubicBezTo>
+                <a:cubicBezTo>
+                  <a:pt x="8861881" y="7705517"/>
+                  <a:pt x="8476583" y="7652347"/>
+                  <a:pt x="8319449" y="7694414"/>
+                </a:cubicBezTo>
+                <a:cubicBezTo>
+                  <a:pt x="8162315" y="7736481"/>
+                  <a:pt x="7699300" y="7659235"/>
+                  <a:pt x="7407567" y="7694414"/>
+                </a:cubicBezTo>
+                <a:cubicBezTo>
+                  <a:pt x="7115834" y="7729593"/>
+                  <a:pt x="7023728" y="7640009"/>
+                  <a:pt x="6815435" y="7694414"/>
+                </a:cubicBezTo>
+                <a:cubicBezTo>
+                  <a:pt x="6607142" y="7748819"/>
+                  <a:pt x="6342632" y="7623591"/>
+                  <a:pt x="6063428" y="7694414"/>
+                </a:cubicBezTo>
+                <a:cubicBezTo>
+                  <a:pt x="5784224" y="7765237"/>
+                  <a:pt x="5461369" y="7614833"/>
+                  <a:pt x="5151545" y="7694414"/>
+                </a:cubicBezTo>
+                <a:cubicBezTo>
+                  <a:pt x="4841721" y="7773995"/>
+                  <a:pt x="4814998" y="7665183"/>
+                  <a:pt x="4559414" y="7694414"/>
+                </a:cubicBezTo>
+                <a:cubicBezTo>
+                  <a:pt x="4303830" y="7723645"/>
+                  <a:pt x="4375750" y="7686255"/>
+                  <a:pt x="4287033" y="7694414"/>
+                </a:cubicBezTo>
+                <a:cubicBezTo>
+                  <a:pt x="4198316" y="7702573"/>
+                  <a:pt x="4149881" y="7673180"/>
+                  <a:pt x="4014652" y="7694414"/>
+                </a:cubicBezTo>
+                <a:cubicBezTo>
+                  <a:pt x="3879423" y="7715648"/>
+                  <a:pt x="3494458" y="7658802"/>
+                  <a:pt x="3102770" y="7694414"/>
+                </a:cubicBezTo>
+                <a:cubicBezTo>
+                  <a:pt x="2711082" y="7730026"/>
+                  <a:pt x="2927156" y="7672081"/>
+                  <a:pt x="2830389" y="7694414"/>
+                </a:cubicBezTo>
+                <a:cubicBezTo>
+                  <a:pt x="2733622" y="7716747"/>
+                  <a:pt x="2514767" y="7667245"/>
+                  <a:pt x="2398133" y="7694414"/>
+                </a:cubicBezTo>
+                <a:cubicBezTo>
+                  <a:pt x="2281499" y="7721583"/>
+                  <a:pt x="2058874" y="7690102"/>
+                  <a:pt x="1965877" y="7694414"/>
+                </a:cubicBezTo>
+                <a:cubicBezTo>
+                  <a:pt x="1872880" y="7698726"/>
+                  <a:pt x="1743644" y="7665434"/>
+                  <a:pt x="1533621" y="7694414"/>
+                </a:cubicBezTo>
+                <a:cubicBezTo>
+                  <a:pt x="1323598" y="7723394"/>
+                  <a:pt x="1260342" y="7643006"/>
+                  <a:pt x="1101365" y="7694414"/>
+                </a:cubicBezTo>
+                <a:cubicBezTo>
+                  <a:pt x="942388" y="7745822"/>
+                  <a:pt x="833538" y="7690879"/>
+                  <a:pt x="669109" y="7694414"/>
+                </a:cubicBezTo>
+                <a:cubicBezTo>
+                  <a:pt x="504680" y="7697949"/>
+                  <a:pt x="605302" y="7688633"/>
+                  <a:pt x="556604" y="7694414"/>
+                </a:cubicBezTo>
+                <a:cubicBezTo>
+                  <a:pt x="507906" y="7700195"/>
+                  <a:pt x="139643" y="7670996"/>
+                  <a:pt x="0" y="7694414"/>
+                </a:cubicBezTo>
+                <a:cubicBezTo>
+                  <a:pt x="-54301" y="7586036"/>
+                  <a:pt x="48711" y="7335131"/>
+                  <a:pt x="0" y="7179480"/>
+                </a:cubicBezTo>
+                <a:cubicBezTo>
+                  <a:pt x="-48711" y="7023829"/>
+                  <a:pt x="1932" y="6938520"/>
+                  <a:pt x="0" y="6741490"/>
+                </a:cubicBezTo>
+                <a:cubicBezTo>
+                  <a:pt x="-1932" y="6544460"/>
+                  <a:pt x="20835" y="6302262"/>
+                  <a:pt x="0" y="6149612"/>
+                </a:cubicBezTo>
+                <a:cubicBezTo>
+                  <a:pt x="-20835" y="5996962"/>
+                  <a:pt x="42317" y="5871251"/>
+                  <a:pt x="0" y="5788567"/>
+                </a:cubicBezTo>
+                <a:cubicBezTo>
+                  <a:pt x="-42317" y="5705883"/>
+                  <a:pt x="33682" y="5420690"/>
+                  <a:pt x="0" y="5273633"/>
+                </a:cubicBezTo>
+                <a:cubicBezTo>
+                  <a:pt x="-33682" y="5126576"/>
+                  <a:pt x="33598" y="5042704"/>
+                  <a:pt x="0" y="4912587"/>
+                </a:cubicBezTo>
+                <a:cubicBezTo>
+                  <a:pt x="-33598" y="4782470"/>
+                  <a:pt x="51145" y="4520170"/>
+                  <a:pt x="0" y="4243765"/>
+                </a:cubicBezTo>
+                <a:cubicBezTo>
+                  <a:pt x="-51145" y="3967360"/>
+                  <a:pt x="44946" y="3782947"/>
+                  <a:pt x="0" y="3574943"/>
+                </a:cubicBezTo>
+                <a:cubicBezTo>
+                  <a:pt x="-44946" y="3366939"/>
+                  <a:pt x="66186" y="3207190"/>
+                  <a:pt x="0" y="2983065"/>
+                </a:cubicBezTo>
+                <a:cubicBezTo>
+                  <a:pt x="-66186" y="2758940"/>
+                  <a:pt x="38616" y="2632654"/>
+                  <a:pt x="0" y="2468131"/>
+                </a:cubicBezTo>
+                <a:cubicBezTo>
+                  <a:pt x="-38616" y="2303608"/>
+                  <a:pt x="35859" y="2063953"/>
+                  <a:pt x="0" y="1876253"/>
+                </a:cubicBezTo>
+                <a:cubicBezTo>
+                  <a:pt x="-35859" y="1688553"/>
+                  <a:pt x="41646" y="1453199"/>
+                  <a:pt x="0" y="1207431"/>
+                </a:cubicBezTo>
+                <a:cubicBezTo>
+                  <a:pt x="-41646" y="961663"/>
+                  <a:pt x="50801" y="941071"/>
+                  <a:pt x="0" y="769441"/>
+                </a:cubicBezTo>
+                <a:cubicBezTo>
+                  <a:pt x="-50801" y="597811"/>
+                  <a:pt x="17570" y="156498"/>
                   <a:pt x="0" y="0"/>
                 </a:cubicBezTo>
                 <a:close/>
@@ -4376,10 +4396,10 @@
           <a:p>
             <a:pPr algn="ctr"/>
             <a:r>
-              <a:rPr lang="en-US" sz="4400" b="1" dirty="0"/>
+              <a:rPr lang="en-US" sz="5400" b="1" dirty="0"/>
               <a:t>Instructions</a:t>
             </a:r>
-            <a:endParaRPr lang="en-US" sz="4400" dirty="0"/>
+            <a:endParaRPr lang="en-US" sz="5400" dirty="0"/>
           </a:p>
           <a:p>
             <a:pPr marL="685800" indent="-685800">
@@ -4387,7 +4407,7 @@
               <a:buChar char="•"/>
             </a:pPr>
             <a:r>
-              <a:rPr lang="en-US" sz="4000" dirty="0"/>
+              <a:rPr lang="en-US" sz="4400" dirty="0"/>
               <a:t>To view the desired lab  presentation, simply click on the ellipses! </a:t>
             </a:r>
           </a:p>
@@ -4397,65 +4417,65 @@
               <a:buChar char="•"/>
             </a:pPr>
             <a:r>
-              <a:rPr lang="en-US" sz="4000" dirty="0"/>
+              <a:rPr lang="en-US" sz="4400" dirty="0"/>
               <a:t>The full </a:t>
             </a:r>
             <a:r>
-              <a:rPr lang="en-US" sz="4000" dirty="0" err="1"/>
+              <a:rPr lang="en-US" sz="4400" dirty="0" err="1"/>
               <a:t>Github</a:t>
             </a:r>
             <a:r>
-              <a:rPr lang="en-US" sz="4000" dirty="0"/>
+              <a:rPr lang="en-US" sz="4400" dirty="0"/>
               <a:t> repository can be found </a:t>
             </a:r>
             <a:r>
-              <a:rPr lang="en-US" sz="4000" dirty="0">
+              <a:rPr lang="en-US" sz="4400" dirty="0">
                 <a:hlinkClick r:id="rId2"/>
               </a:rPr>
               <a:t>here</a:t>
             </a:r>
             <a:r>
-              <a:rPr lang="en-US" sz="4000" dirty="0"/>
+              <a:rPr lang="en-US" sz="4400" dirty="0"/>
               <a:t>. If you click on </a:t>
             </a:r>
             <a:r>
-              <a:rPr lang="en-US" sz="4000" b="1" dirty="0"/>
+              <a:rPr lang="en-US" sz="4400" b="1" dirty="0"/>
               <a:t>code </a:t>
             </a:r>
             <a:r>
-              <a:rPr lang="en-US" sz="4000" dirty="0"/>
+              <a:rPr lang="en-US" sz="4400" dirty="0"/>
               <a:t> and </a:t>
             </a:r>
             <a:r>
-              <a:rPr lang="en-US" sz="4000" b="1" dirty="0"/>
+              <a:rPr lang="en-US" sz="4400" b="1" dirty="0"/>
               <a:t>download as zip</a:t>
             </a:r>
             <a:r>
-              <a:rPr lang="en-US" sz="4000" dirty="0"/>
-              <a:t> you can download all files and view the slides without internet (go to </a:t>
-            </a:r>
-            <a:r>
-              <a:rPr lang="en-US" sz="4000" b="1" dirty="0"/>
+              <a:rPr lang="en-US" sz="4400" dirty="0"/>
+              <a:t> you can download all files and view the slides without internet (extract all files, go to </a:t>
+            </a:r>
+            <a:r>
+              <a:rPr lang="en-US" sz="4400" b="1" dirty="0"/>
               <a:t>slide files </a:t>
             </a:r>
             <a:r>
-              <a:rPr lang="en-US" sz="4000" dirty="0"/>
+              <a:rPr lang="en-US" sz="4400" dirty="0"/>
               <a:t>and click on the </a:t>
             </a:r>
             <a:r>
-              <a:rPr lang="en-US" sz="4000" b="1" dirty="0"/>
+              <a:rPr lang="en-US" sz="4400" b="1" dirty="0"/>
               <a:t>.html </a:t>
             </a:r>
             <a:r>
-              <a:rPr lang="en-US" sz="4000" dirty="0"/>
+              <a:rPr lang="en-US" sz="4400" dirty="0"/>
               <a:t>file</a:t>
             </a:r>
             <a:r>
-              <a:rPr lang="en-US" sz="4000" b="1" dirty="0"/>
+              <a:rPr lang="en-US" sz="4400" b="1" dirty="0"/>
               <a:t> </a:t>
             </a:r>
             <a:r>
-              <a:rPr lang="en-US" sz="4000" dirty="0"/>
+              <a:rPr lang="en-US" sz="4400" dirty="0"/>
               <a:t>corresponding to the desired lab).</a:t>
             </a:r>
           </a:p>
@@ -4465,16 +4485,36 @@
               <a:buChar char="•"/>
             </a:pPr>
             <a:r>
-              <a:rPr lang="en-US" sz="4000" dirty="0"/>
+              <a:rPr lang="en-US" sz="4400" dirty="0"/>
               <a:t>Raw lab code can (.</a:t>
             </a:r>
             <a:r>
-              <a:rPr lang="en-US" sz="4000" dirty="0" err="1"/>
+              <a:rPr lang="en-US" sz="4400" dirty="0" err="1"/>
               <a:t>Rmd</a:t>
             </a:r>
             <a:r>
-              <a:rPr lang="en-US" sz="4000" dirty="0"/>
-              <a:t> files) be found here. Lab activities with answers can be found here. </a:t>
+              <a:rPr lang="en-US" sz="4400" dirty="0"/>
+              <a:t> files) be found </a:t>
+            </a:r>
+            <a:r>
+              <a:rPr lang="en-US" sz="4400" dirty="0">
+                <a:hlinkClick r:id="rId3"/>
+              </a:rPr>
+              <a:t>here</a:t>
+            </a:r>
+            <a:r>
+              <a:rPr lang="en-US" sz="4400" dirty="0"/>
+              <a:t>. Lab activities with answers can be found </a:t>
+            </a:r>
+            <a:r>
+              <a:rPr lang="en-US" sz="4400" dirty="0">
+                <a:hlinkClick r:id="rId4"/>
+              </a:rPr>
+              <a:t>here</a:t>
+            </a:r>
+            <a:r>
+              <a:rPr lang="en-US" sz="4400" dirty="0"/>
+              <a:t>. </a:t>
             </a:r>
           </a:p>
           <a:p>
@@ -4483,31 +4523,31 @@
               <a:buChar char="•"/>
             </a:pPr>
             <a:r>
-              <a:rPr lang="en-US" sz="4000" dirty="0"/>
+              <a:rPr lang="en-US" sz="4400" dirty="0"/>
               <a:t>To download the </a:t>
             </a:r>
             <a:r>
-              <a:rPr lang="en-US" sz="4000" b="1" dirty="0"/>
+              <a:rPr lang="en-US" sz="4400" b="1" dirty="0"/>
               <a:t>PDF</a:t>
             </a:r>
             <a:r>
-              <a:rPr lang="en-US" sz="4000" dirty="0"/>
+              <a:rPr lang="en-US" sz="4400" dirty="0"/>
               <a:t> version of a presentation, Press the </a:t>
             </a:r>
             <a:r>
-              <a:rPr lang="en-US" sz="4000" b="1" dirty="0"/>
+              <a:rPr lang="en-US" sz="4400" b="1" dirty="0"/>
               <a:t>E</a:t>
             </a:r>
             <a:r>
-              <a:rPr lang="en-US" sz="4000" dirty="0"/>
+              <a:rPr lang="en-US" sz="4400" dirty="0"/>
               <a:t> key and then press </a:t>
             </a:r>
             <a:r>
-              <a:rPr lang="en-US" sz="4000" b="1" dirty="0"/>
+              <a:rPr lang="en-US" sz="4400" b="1" dirty="0"/>
               <a:t>CTRL/CMD + P </a:t>
             </a:r>
             <a:r>
-              <a:rPr lang="en-US" sz="4000" dirty="0"/>
+              <a:rPr lang="en-US" sz="4400" dirty="0"/>
               <a:t>🖨️</a:t>
             </a:r>
           </a:p>
@@ -4517,15 +4557,25 @@
               <a:buChar char="•"/>
             </a:pPr>
             <a:r>
-              <a:rPr lang="en-US" sz="4000" dirty="0"/>
-              <a:t>See here to find out more about the slides and </a:t>
-            </a:r>
-            <a:r>
-              <a:rPr lang="en-US" sz="4000" dirty="0" err="1"/>
-              <a:t>RevealJS</a:t>
-            </a:r>
-            <a:r>
-              <a:rPr lang="en-US" sz="4000" dirty="0"/>
+              <a:rPr lang="en-US" sz="4400" dirty="0"/>
+              <a:t>See </a:t>
+            </a:r>
+            <a:r>
+              <a:rPr lang="en-US" sz="4400" dirty="0">
+                <a:hlinkClick r:id="rId5"/>
+              </a:rPr>
+              <a:t>here</a:t>
+            </a:r>
+            <a:r>
+              <a:rPr lang="en-US" sz="4400" dirty="0"/>
+              <a:t> to find out more about slides in Quarto using </a:t>
+            </a:r>
+            <a:r>
+              <a:rPr lang="en-US" sz="4400" dirty="0" err="1"/>
+              <a:t>Revealjs</a:t>
+            </a:r>
+            <a:r>
+              <a:rPr lang="en-US" sz="4400" dirty="0"/>
               <a:t> </a:t>
             </a:r>
           </a:p>
@@ -4548,7 +4598,7 @@
         <p:spPr>
           <a:xfrm>
             <a:off x="2466109" y="31172728"/>
-            <a:ext cx="37407273" cy="0"/>
+            <a:ext cx="40557911" cy="0"/>
           </a:xfrm>
           <a:prstGeom prst="straightConnector1">
             <a:avLst/>
@@ -4591,9 +4641,9 @@
           <p:nvPr/>
         </p:nvCxnSpPr>
         <p:spPr>
-          <a:xfrm flipV="1">
-            <a:off x="2466109" y="5874327"/>
-            <a:ext cx="0" cy="25298401"/>
+          <a:xfrm flipH="1" flipV="1">
+            <a:off x="2466108" y="2798618"/>
+            <a:ext cx="1" cy="28374110"/>
           </a:xfrm>
           <a:prstGeom prst="straightConnector1">
             <a:avLst/>
@@ -4669,7 +4719,7 @@
       <p:sp>
         <p:nvSpPr>
           <p:cNvPr id="17" name="Oval 16">
-            <a:hlinkClick r:id="rId3"/>
+            <a:hlinkClick r:id="rId6"/>
             <a:extLst>
               <a:ext uri="{FF2B5EF4-FFF2-40B4-BE49-F238E27FC236}">
                 <a16:creationId xmlns:a16="http://schemas.microsoft.com/office/drawing/2014/main" id="{BD546B4F-AD86-8A65-9590-FAFAD96A2B44}"/>
@@ -4861,7 +4911,7 @@
       <p:sp>
         <p:nvSpPr>
           <p:cNvPr id="19" name="Oval 18">
-            <a:hlinkClick r:id="rId4"/>
+            <a:hlinkClick r:id="rId7"/>
             <a:extLst>
               <a:ext uri="{FF2B5EF4-FFF2-40B4-BE49-F238E27FC236}">
                 <a16:creationId xmlns:a16="http://schemas.microsoft.com/office/drawing/2014/main" id="{635C5EF4-037C-40F8-C8E6-D0C679A0CF28}"/>
@@ -5093,7 +5143,7 @@
       <p:sp>
         <p:nvSpPr>
           <p:cNvPr id="20" name="Oval 19">
-            <a:hlinkClick r:id="rId5"/>
+            <a:hlinkClick r:id="rId8"/>
             <a:extLst>
               <a:ext uri="{FF2B5EF4-FFF2-40B4-BE49-F238E27FC236}">
                 <a16:creationId xmlns:a16="http://schemas.microsoft.com/office/drawing/2014/main" id="{066A5C91-34B2-5B2A-10D2-FED081674025}"/>
@@ -5326,7 +5376,7 @@
       <p:sp>
         <p:nvSpPr>
           <p:cNvPr id="23" name="Oval 22">
-            <a:hlinkClick r:id="rId6"/>
+            <a:hlinkClick r:id="rId9"/>
             <a:extLst>
               <a:ext uri="{FF2B5EF4-FFF2-40B4-BE49-F238E27FC236}">
                 <a16:creationId xmlns:a16="http://schemas.microsoft.com/office/drawing/2014/main" id="{F6DACF5E-4475-D998-F1D6-982C2FB9A981}"/>
@@ -5569,7 +5619,7 @@
       <p:sp>
         <p:nvSpPr>
           <p:cNvPr id="33" name="Oval 32">
-            <a:hlinkClick r:id="rId7"/>
+            <a:hlinkClick r:id="rId10"/>
             <a:extLst>
               <a:ext uri="{FF2B5EF4-FFF2-40B4-BE49-F238E27FC236}">
                 <a16:creationId xmlns:a16="http://schemas.microsoft.com/office/drawing/2014/main" id="{2D5AD945-F863-3DE5-C34C-63C8D51AD1D6}"/>
@@ -5829,7 +5879,7 @@
       <p:sp>
         <p:nvSpPr>
           <p:cNvPr id="34" name="Oval 33">
-            <a:hlinkClick r:id="rId8"/>
+            <a:hlinkClick r:id="rId11"/>
             <a:extLst>
               <a:ext uri="{FF2B5EF4-FFF2-40B4-BE49-F238E27FC236}">
                 <a16:creationId xmlns:a16="http://schemas.microsoft.com/office/drawing/2014/main" id="{9677DEA8-9A23-1D6A-8E1E-0BA639BF7255}"/>
@@ -6050,7 +6100,7 @@
       <p:sp>
         <p:nvSpPr>
           <p:cNvPr id="36" name="Oval 35">
-            <a:hlinkClick r:id="rId9"/>
+            <a:hlinkClick r:id="rId12"/>
             <a:extLst>
               <a:ext uri="{FF2B5EF4-FFF2-40B4-BE49-F238E27FC236}">
                 <a16:creationId xmlns:a16="http://schemas.microsoft.com/office/drawing/2014/main" id="{E46EB02D-D71F-57F6-A05C-18E3B8DE2183}"/>
@@ -6270,7 +6320,7 @@
       <p:sp>
         <p:nvSpPr>
           <p:cNvPr id="37" name="Oval 36">
-            <a:hlinkClick r:id="rId10"/>
+            <a:hlinkClick r:id="rId13"/>
             <a:extLst>
               <a:ext uri="{FF2B5EF4-FFF2-40B4-BE49-F238E27FC236}">
                 <a16:creationId xmlns:a16="http://schemas.microsoft.com/office/drawing/2014/main" id="{2A2FD08A-55AC-8072-0913-E76B9F9B203D}"/>
@@ -6530,7 +6580,7 @@
       <p:sp>
         <p:nvSpPr>
           <p:cNvPr id="39" name="Oval 38">
-            <a:hlinkClick r:id="rId11"/>
+            <a:hlinkClick r:id="rId14"/>
             <a:extLst>
               <a:ext uri="{FF2B5EF4-FFF2-40B4-BE49-F238E27FC236}">
                 <a16:creationId xmlns:a16="http://schemas.microsoft.com/office/drawing/2014/main" id="{6BD683B4-68D0-6782-B719-2D257C703896}"/>
@@ -6859,7 +6909,7 @@
       <p:sp>
         <p:nvSpPr>
           <p:cNvPr id="43" name="Oval 42">
-            <a:hlinkClick r:id="rId12"/>
+            <a:hlinkClick r:id="rId15"/>
             <a:extLst>
               <a:ext uri="{FF2B5EF4-FFF2-40B4-BE49-F238E27FC236}">
                 <a16:creationId xmlns:a16="http://schemas.microsoft.com/office/drawing/2014/main" id="{4BB43E75-5B08-FDB4-03C8-4977549DD2CE}"/>
@@ -7102,7 +7152,7 @@
       <p:sp>
         <p:nvSpPr>
           <p:cNvPr id="46" name="Oval 45">
-            <a:hlinkClick r:id="rId13"/>
+            <a:hlinkClick r:id="rId16"/>
             <a:extLst>
               <a:ext uri="{FF2B5EF4-FFF2-40B4-BE49-F238E27FC236}">
                 <a16:creationId xmlns:a16="http://schemas.microsoft.com/office/drawing/2014/main" id="{5A70C63C-A76F-CA9B-4802-63CF5C53D08B}"/>
@@ -7339,7 +7389,7 @@
       <p:sp>
         <p:nvSpPr>
           <p:cNvPr id="56" name="Oval 55">
-            <a:hlinkClick r:id="rId14"/>
+            <a:hlinkClick r:id="rId17"/>
             <a:extLst>
               <a:ext uri="{FF2B5EF4-FFF2-40B4-BE49-F238E27FC236}">
                 <a16:creationId xmlns:a16="http://schemas.microsoft.com/office/drawing/2014/main" id="{898A07D2-6C18-151E-B6F8-00A269D65E5C}"/>
@@ -7559,7 +7609,7 @@
       <p:sp>
         <p:nvSpPr>
           <p:cNvPr id="58" name="Oval 57">
-            <a:hlinkClick r:id="rId15"/>
+            <a:hlinkClick r:id="rId18"/>
             <a:extLst>
               <a:ext uri="{FF2B5EF4-FFF2-40B4-BE49-F238E27FC236}">
                 <a16:creationId xmlns:a16="http://schemas.microsoft.com/office/drawing/2014/main" id="{D6CA818E-008A-9A28-B222-CE0C6D161B99}"/>
@@ -8377,7 +8427,7 @@
       <p:sp>
         <p:nvSpPr>
           <p:cNvPr id="79" name="Oval 78">
-            <a:hlinkClick r:id="rId16"/>
+            <a:hlinkClick r:id="rId19"/>
             <a:extLst>
               <a:ext uri="{FF2B5EF4-FFF2-40B4-BE49-F238E27FC236}">
                 <a16:creationId xmlns:a16="http://schemas.microsoft.com/office/drawing/2014/main" id="{BB9E296B-4FCF-EE98-E468-5DD20A44D561}"/>
@@ -8609,116 +8659,116 @@
         </p:nvSpPr>
         <p:spPr>
           <a:xfrm>
-            <a:off x="16462361" y="3571777"/>
-            <a:ext cx="10369127" cy="2616101"/>
+            <a:off x="16462361" y="3100724"/>
+            <a:ext cx="10369127" cy="2677656"/>
           </a:xfrm>
           <a:custGeom>
             <a:avLst/>
             <a:gdLst>
               <a:gd name="connsiteX0" fmla="*/ 0 w 10369127"/>
-              <a:gd name="connsiteY0" fmla="*/ 0 h 2616101"/>
+              <a:gd name="connsiteY0" fmla="*/ 0 h 2677656"/>
               <a:gd name="connsiteX1" fmla="*/ 576063 w 10369127"/>
-              <a:gd name="connsiteY1" fmla="*/ 0 h 2616101"/>
+              <a:gd name="connsiteY1" fmla="*/ 0 h 2677656"/>
               <a:gd name="connsiteX2" fmla="*/ 944743 w 10369127"/>
-              <a:gd name="connsiteY2" fmla="*/ 0 h 2616101"/>
+              <a:gd name="connsiteY2" fmla="*/ 0 h 2677656"/>
               <a:gd name="connsiteX3" fmla="*/ 1417114 w 10369127"/>
-              <a:gd name="connsiteY3" fmla="*/ 0 h 2616101"/>
+              <a:gd name="connsiteY3" fmla="*/ 0 h 2677656"/>
               <a:gd name="connsiteX4" fmla="*/ 1993177 w 10369127"/>
-              <a:gd name="connsiteY4" fmla="*/ 0 h 2616101"/>
+              <a:gd name="connsiteY4" fmla="*/ 0 h 2677656"/>
               <a:gd name="connsiteX5" fmla="*/ 2361857 w 10369127"/>
-              <a:gd name="connsiteY5" fmla="*/ 0 h 2616101"/>
+              <a:gd name="connsiteY5" fmla="*/ 0 h 2677656"/>
               <a:gd name="connsiteX6" fmla="*/ 2834228 w 10369127"/>
-              <a:gd name="connsiteY6" fmla="*/ 0 h 2616101"/>
+              <a:gd name="connsiteY6" fmla="*/ 0 h 2677656"/>
               <a:gd name="connsiteX7" fmla="*/ 3410291 w 10369127"/>
-              <a:gd name="connsiteY7" fmla="*/ 0 h 2616101"/>
+              <a:gd name="connsiteY7" fmla="*/ 0 h 2677656"/>
               <a:gd name="connsiteX8" fmla="*/ 3778971 w 10369127"/>
-              <a:gd name="connsiteY8" fmla="*/ 0 h 2616101"/>
+              <a:gd name="connsiteY8" fmla="*/ 0 h 2677656"/>
               <a:gd name="connsiteX9" fmla="*/ 4458725 w 10369127"/>
-              <a:gd name="connsiteY9" fmla="*/ 0 h 2616101"/>
+              <a:gd name="connsiteY9" fmla="*/ 0 h 2677656"/>
               <a:gd name="connsiteX10" fmla="*/ 4827405 w 10369127"/>
-              <a:gd name="connsiteY10" fmla="*/ 0 h 2616101"/>
+              <a:gd name="connsiteY10" fmla="*/ 0 h 2677656"/>
               <a:gd name="connsiteX11" fmla="*/ 5092393 w 10369127"/>
-              <a:gd name="connsiteY11" fmla="*/ 0 h 2616101"/>
+              <a:gd name="connsiteY11" fmla="*/ 0 h 2677656"/>
               <a:gd name="connsiteX12" fmla="*/ 5772147 w 10369127"/>
-              <a:gd name="connsiteY12" fmla="*/ 0 h 2616101"/>
+              <a:gd name="connsiteY12" fmla="*/ 0 h 2677656"/>
               <a:gd name="connsiteX13" fmla="*/ 6037136 w 10369127"/>
-              <a:gd name="connsiteY13" fmla="*/ 0 h 2616101"/>
+              <a:gd name="connsiteY13" fmla="*/ 0 h 2677656"/>
               <a:gd name="connsiteX14" fmla="*/ 6509508 w 10369127"/>
-              <a:gd name="connsiteY14" fmla="*/ 0 h 2616101"/>
+              <a:gd name="connsiteY14" fmla="*/ 0 h 2677656"/>
               <a:gd name="connsiteX15" fmla="*/ 7189261 w 10369127"/>
-              <a:gd name="connsiteY15" fmla="*/ 0 h 2616101"/>
+              <a:gd name="connsiteY15" fmla="*/ 0 h 2677656"/>
               <a:gd name="connsiteX16" fmla="*/ 7869015 w 10369127"/>
-              <a:gd name="connsiteY16" fmla="*/ 0 h 2616101"/>
+              <a:gd name="connsiteY16" fmla="*/ 0 h 2677656"/>
               <a:gd name="connsiteX17" fmla="*/ 8341387 w 10369127"/>
-              <a:gd name="connsiteY17" fmla="*/ 0 h 2616101"/>
+              <a:gd name="connsiteY17" fmla="*/ 0 h 2677656"/>
               <a:gd name="connsiteX18" fmla="*/ 8606375 w 10369127"/>
-              <a:gd name="connsiteY18" fmla="*/ 0 h 2616101"/>
+              <a:gd name="connsiteY18" fmla="*/ 0 h 2677656"/>
               <a:gd name="connsiteX19" fmla="*/ 8975055 w 10369127"/>
-              <a:gd name="connsiteY19" fmla="*/ 0 h 2616101"/>
+              <a:gd name="connsiteY19" fmla="*/ 0 h 2677656"/>
               <a:gd name="connsiteX20" fmla="*/ 9654809 w 10369127"/>
-              <a:gd name="connsiteY20" fmla="*/ 0 h 2616101"/>
+              <a:gd name="connsiteY20" fmla="*/ 0 h 2677656"/>
               <a:gd name="connsiteX21" fmla="*/ 10369127 w 10369127"/>
-              <a:gd name="connsiteY21" fmla="*/ 0 h 2616101"/>
+              <a:gd name="connsiteY21" fmla="*/ 0 h 2677656"/>
               <a:gd name="connsiteX22" fmla="*/ 10369127 w 10369127"/>
-              <a:gd name="connsiteY22" fmla="*/ 497059 h 2616101"/>
+              <a:gd name="connsiteY22" fmla="*/ 508755 h 2677656"/>
               <a:gd name="connsiteX23" fmla="*/ 10369127 w 10369127"/>
-              <a:gd name="connsiteY23" fmla="*/ 994118 h 2616101"/>
+              <a:gd name="connsiteY23" fmla="*/ 1017509 h 2677656"/>
               <a:gd name="connsiteX24" fmla="*/ 10369127 w 10369127"/>
-              <a:gd name="connsiteY24" fmla="*/ 1491178 h 2616101"/>
+              <a:gd name="connsiteY24" fmla="*/ 1526264 h 2677656"/>
               <a:gd name="connsiteX25" fmla="*/ 10369127 w 10369127"/>
-              <a:gd name="connsiteY25" fmla="*/ 1988237 h 2616101"/>
+              <a:gd name="connsiteY25" fmla="*/ 2035019 h 2677656"/>
               <a:gd name="connsiteX26" fmla="*/ 10369127 w 10369127"/>
-              <a:gd name="connsiteY26" fmla="*/ 2616101 h 2616101"/>
+              <a:gd name="connsiteY26" fmla="*/ 2677656 h 2677656"/>
               <a:gd name="connsiteX27" fmla="*/ 10104138 w 10369127"/>
-              <a:gd name="connsiteY27" fmla="*/ 2616101 h 2616101"/>
+              <a:gd name="connsiteY27" fmla="*/ 2677656 h 2677656"/>
               <a:gd name="connsiteX28" fmla="*/ 9735458 w 10369127"/>
-              <a:gd name="connsiteY28" fmla="*/ 2616101 h 2616101"/>
+              <a:gd name="connsiteY28" fmla="*/ 2677656 h 2677656"/>
               <a:gd name="connsiteX29" fmla="*/ 9366778 w 10369127"/>
-              <a:gd name="connsiteY29" fmla="*/ 2616101 h 2616101"/>
+              <a:gd name="connsiteY29" fmla="*/ 2677656 h 2677656"/>
               <a:gd name="connsiteX30" fmla="*/ 8790715 w 10369127"/>
-              <a:gd name="connsiteY30" fmla="*/ 2616101 h 2616101"/>
+              <a:gd name="connsiteY30" fmla="*/ 2677656 h 2677656"/>
               <a:gd name="connsiteX31" fmla="*/ 8525727 w 10369127"/>
-              <a:gd name="connsiteY31" fmla="*/ 2616101 h 2616101"/>
+              <a:gd name="connsiteY31" fmla="*/ 2677656 h 2677656"/>
               <a:gd name="connsiteX32" fmla="*/ 8053355 w 10369127"/>
-              <a:gd name="connsiteY32" fmla="*/ 2616101 h 2616101"/>
+              <a:gd name="connsiteY32" fmla="*/ 2677656 h 2677656"/>
               <a:gd name="connsiteX33" fmla="*/ 7788367 w 10369127"/>
-              <a:gd name="connsiteY33" fmla="*/ 2616101 h 2616101"/>
+              <a:gd name="connsiteY33" fmla="*/ 2677656 h 2677656"/>
               <a:gd name="connsiteX34" fmla="*/ 7108613 w 10369127"/>
-              <a:gd name="connsiteY34" fmla="*/ 2616101 h 2616101"/>
+              <a:gd name="connsiteY34" fmla="*/ 2677656 h 2677656"/>
               <a:gd name="connsiteX35" fmla="*/ 6428859 w 10369127"/>
-              <a:gd name="connsiteY35" fmla="*/ 2616101 h 2616101"/>
+              <a:gd name="connsiteY35" fmla="*/ 2677656 h 2677656"/>
               <a:gd name="connsiteX36" fmla="*/ 5852796 w 10369127"/>
-              <a:gd name="connsiteY36" fmla="*/ 2616101 h 2616101"/>
+              <a:gd name="connsiteY36" fmla="*/ 2677656 h 2677656"/>
               <a:gd name="connsiteX37" fmla="*/ 5380425 w 10369127"/>
-              <a:gd name="connsiteY37" fmla="*/ 2616101 h 2616101"/>
+              <a:gd name="connsiteY37" fmla="*/ 2677656 h 2677656"/>
               <a:gd name="connsiteX38" fmla="*/ 4804362 w 10369127"/>
-              <a:gd name="connsiteY38" fmla="*/ 2616101 h 2616101"/>
+              <a:gd name="connsiteY38" fmla="*/ 2677656 h 2677656"/>
               <a:gd name="connsiteX39" fmla="*/ 4124608 w 10369127"/>
-              <a:gd name="connsiteY39" fmla="*/ 2616101 h 2616101"/>
+              <a:gd name="connsiteY39" fmla="*/ 2677656 h 2677656"/>
               <a:gd name="connsiteX40" fmla="*/ 3755928 w 10369127"/>
-              <a:gd name="connsiteY40" fmla="*/ 2616101 h 2616101"/>
+              <a:gd name="connsiteY40" fmla="*/ 2677656 h 2677656"/>
               <a:gd name="connsiteX41" fmla="*/ 3283557 w 10369127"/>
-              <a:gd name="connsiteY41" fmla="*/ 2616101 h 2616101"/>
+              <a:gd name="connsiteY41" fmla="*/ 2677656 h 2677656"/>
               <a:gd name="connsiteX42" fmla="*/ 2500112 w 10369127"/>
-              <a:gd name="connsiteY42" fmla="*/ 2616101 h 2616101"/>
+              <a:gd name="connsiteY42" fmla="*/ 2677656 h 2677656"/>
               <a:gd name="connsiteX43" fmla="*/ 2131432 w 10369127"/>
-              <a:gd name="connsiteY43" fmla="*/ 2616101 h 2616101"/>
+              <a:gd name="connsiteY43" fmla="*/ 2677656 h 2677656"/>
               <a:gd name="connsiteX44" fmla="*/ 1347987 w 10369127"/>
-              <a:gd name="connsiteY44" fmla="*/ 2616101 h 2616101"/>
+              <a:gd name="connsiteY44" fmla="*/ 2677656 h 2677656"/>
               <a:gd name="connsiteX45" fmla="*/ 668233 w 10369127"/>
-              <a:gd name="connsiteY45" fmla="*/ 2616101 h 2616101"/>
+              <a:gd name="connsiteY45" fmla="*/ 2677656 h 2677656"/>
               <a:gd name="connsiteX46" fmla="*/ 0 w 10369127"/>
-              <a:gd name="connsiteY46" fmla="*/ 2616101 h 2616101"/>
+              <a:gd name="connsiteY46" fmla="*/ 2677656 h 2677656"/>
               <a:gd name="connsiteX47" fmla="*/ 0 w 10369127"/>
-              <a:gd name="connsiteY47" fmla="*/ 2171364 h 2616101"/>
+              <a:gd name="connsiteY47" fmla="*/ 2222454 h 2677656"/>
               <a:gd name="connsiteX48" fmla="*/ 0 w 10369127"/>
-              <a:gd name="connsiteY48" fmla="*/ 1726627 h 2616101"/>
+              <a:gd name="connsiteY48" fmla="*/ 1767253 h 2677656"/>
               <a:gd name="connsiteX49" fmla="*/ 0 w 10369127"/>
-              <a:gd name="connsiteY49" fmla="*/ 1281889 h 2616101"/>
+              <a:gd name="connsiteY49" fmla="*/ 1312051 h 2677656"/>
               <a:gd name="connsiteX50" fmla="*/ 0 w 10369127"/>
-              <a:gd name="connsiteY50" fmla="*/ 758669 h 2616101"/>
+              <a:gd name="connsiteY50" fmla="*/ 776520 h 2677656"/>
               <a:gd name="connsiteX51" fmla="*/ 0 w 10369127"/>
-              <a:gd name="connsiteY51" fmla="*/ 0 h 2616101"/>
+              <a:gd name="connsiteY51" fmla="*/ 0 h 2677656"/>
             </a:gdLst>
             <a:ahLst/>
             <a:cxnLst>
@@ -8881,7 +8931,7 @@
             </a:cxnLst>
             <a:rect l="l" t="t" r="r" b="b"/>
             <a:pathLst>
-              <a:path w="10369127" h="2616101" fill="none" extrusionOk="0">
+              <a:path w="10369127" h="2677656" fill="none" extrusionOk="0">
                 <a:moveTo>
                   <a:pt x="0" y="0"/>
                 </a:moveTo>
@@ -8991,158 +9041,158 @@
                   <a:pt x="10369127" y="0"/>
                 </a:cubicBezTo>
                 <a:cubicBezTo>
-                  <a:pt x="10418087" y="179116"/>
-                  <a:pt x="10340587" y="393792"/>
-                  <a:pt x="10369127" y="497059"/>
-                </a:cubicBezTo>
-                <a:cubicBezTo>
-                  <a:pt x="10397667" y="600326"/>
-                  <a:pt x="10312396" y="819322"/>
-                  <a:pt x="10369127" y="994118"/>
-                </a:cubicBezTo>
-                <a:cubicBezTo>
-                  <a:pt x="10425858" y="1168914"/>
-                  <a:pt x="10347194" y="1326142"/>
-                  <a:pt x="10369127" y="1491178"/>
-                </a:cubicBezTo>
-                <a:cubicBezTo>
-                  <a:pt x="10391060" y="1656214"/>
-                  <a:pt x="10339835" y="1746329"/>
-                  <a:pt x="10369127" y="1988237"/>
-                </a:cubicBezTo>
-                <a:cubicBezTo>
-                  <a:pt x="10398419" y="2230145"/>
-                  <a:pt x="10352348" y="2421884"/>
-                  <a:pt x="10369127" y="2616101"/>
-                </a:cubicBezTo>
-                <a:cubicBezTo>
-                  <a:pt x="10278688" y="2622390"/>
-                  <a:pt x="10215676" y="2607444"/>
-                  <a:pt x="10104138" y="2616101"/>
-                </a:cubicBezTo>
-                <a:cubicBezTo>
-                  <a:pt x="9992600" y="2624758"/>
-                  <a:pt x="9843989" y="2596291"/>
-                  <a:pt x="9735458" y="2616101"/>
-                </a:cubicBezTo>
-                <a:cubicBezTo>
-                  <a:pt x="9626927" y="2635911"/>
-                  <a:pt x="9458457" y="2584898"/>
-                  <a:pt x="9366778" y="2616101"/>
-                </a:cubicBezTo>
-                <a:cubicBezTo>
-                  <a:pt x="9275099" y="2647304"/>
-                  <a:pt x="8930340" y="2593171"/>
-                  <a:pt x="8790715" y="2616101"/>
-                </a:cubicBezTo>
-                <a:cubicBezTo>
-                  <a:pt x="8651090" y="2639031"/>
-                  <a:pt x="8632266" y="2614342"/>
-                  <a:pt x="8525727" y="2616101"/>
-                </a:cubicBezTo>
-                <a:cubicBezTo>
-                  <a:pt x="8419188" y="2617860"/>
-                  <a:pt x="8218506" y="2612664"/>
-                  <a:pt x="8053355" y="2616101"/>
-                </a:cubicBezTo>
-                <a:cubicBezTo>
-                  <a:pt x="7888204" y="2619538"/>
-                  <a:pt x="7871496" y="2585868"/>
-                  <a:pt x="7788367" y="2616101"/>
-                </a:cubicBezTo>
-                <a:cubicBezTo>
-                  <a:pt x="7705238" y="2646334"/>
-                  <a:pt x="7288969" y="2574797"/>
-                  <a:pt x="7108613" y="2616101"/>
-                </a:cubicBezTo>
-                <a:cubicBezTo>
-                  <a:pt x="6928257" y="2657405"/>
-                  <a:pt x="6679715" y="2599691"/>
-                  <a:pt x="6428859" y="2616101"/>
-                </a:cubicBezTo>
-                <a:cubicBezTo>
-                  <a:pt x="6178003" y="2632511"/>
-                  <a:pt x="6018517" y="2594187"/>
-                  <a:pt x="5852796" y="2616101"/>
-                </a:cubicBezTo>
-                <a:cubicBezTo>
-                  <a:pt x="5687075" y="2638015"/>
-                  <a:pt x="5497204" y="2606835"/>
-                  <a:pt x="5380425" y="2616101"/>
-                </a:cubicBezTo>
-                <a:cubicBezTo>
-                  <a:pt x="5263646" y="2625367"/>
-                  <a:pt x="4920517" y="2567488"/>
-                  <a:pt x="4804362" y="2616101"/>
-                </a:cubicBezTo>
-                <a:cubicBezTo>
-                  <a:pt x="4688207" y="2664714"/>
-                  <a:pt x="4425047" y="2569988"/>
-                  <a:pt x="4124608" y="2616101"/>
-                </a:cubicBezTo>
-                <a:cubicBezTo>
-                  <a:pt x="3824169" y="2662214"/>
-                  <a:pt x="3934064" y="2599347"/>
-                  <a:pt x="3755928" y="2616101"/>
-                </a:cubicBezTo>
-                <a:cubicBezTo>
-                  <a:pt x="3577792" y="2632855"/>
-                  <a:pt x="3510885" y="2573080"/>
-                  <a:pt x="3283557" y="2616101"/>
-                </a:cubicBezTo>
-                <a:cubicBezTo>
-                  <a:pt x="3056229" y="2659122"/>
-                  <a:pt x="2793178" y="2553340"/>
-                  <a:pt x="2500112" y="2616101"/>
-                </a:cubicBezTo>
-                <a:cubicBezTo>
-                  <a:pt x="2207046" y="2678862"/>
-                  <a:pt x="2308794" y="2582800"/>
-                  <a:pt x="2131432" y="2616101"/>
-                </a:cubicBezTo>
-                <a:cubicBezTo>
-                  <a:pt x="1954070" y="2649402"/>
-                  <a:pt x="1670550" y="2606655"/>
-                  <a:pt x="1347987" y="2616101"/>
-                </a:cubicBezTo>
-                <a:cubicBezTo>
-                  <a:pt x="1025424" y="2625547"/>
-                  <a:pt x="807086" y="2592857"/>
-                  <a:pt x="668233" y="2616101"/>
-                </a:cubicBezTo>
-                <a:cubicBezTo>
-                  <a:pt x="529380" y="2639345"/>
-                  <a:pt x="217167" y="2550095"/>
-                  <a:pt x="0" y="2616101"/>
-                </a:cubicBezTo>
-                <a:cubicBezTo>
-                  <a:pt x="-31269" y="2473155"/>
-                  <a:pt x="4066" y="2343149"/>
-                  <a:pt x="0" y="2171364"/>
-                </a:cubicBezTo>
-                <a:cubicBezTo>
-                  <a:pt x="-4066" y="1999579"/>
-                  <a:pt x="32873" y="1869406"/>
-                  <a:pt x="0" y="1726627"/>
-                </a:cubicBezTo>
-                <a:cubicBezTo>
-                  <a:pt x="-32873" y="1583848"/>
-                  <a:pt x="8849" y="1445163"/>
-                  <a:pt x="0" y="1281889"/>
-                </a:cubicBezTo>
-                <a:cubicBezTo>
-                  <a:pt x="-8849" y="1118615"/>
-                  <a:pt x="34291" y="992555"/>
-                  <a:pt x="0" y="758669"/>
-                </a:cubicBezTo>
-                <a:cubicBezTo>
-                  <a:pt x="-34291" y="524783"/>
-                  <a:pt x="36871" y="373063"/>
+                  <a:pt x="10376183" y="169084"/>
+                  <a:pt x="10348099" y="283383"/>
+                  <a:pt x="10369127" y="508755"/>
+                </a:cubicBezTo>
+                <a:cubicBezTo>
+                  <a:pt x="10390155" y="734127"/>
+                  <a:pt x="10359469" y="817197"/>
+                  <a:pt x="10369127" y="1017509"/>
+                </a:cubicBezTo>
+                <a:cubicBezTo>
+                  <a:pt x="10378785" y="1217821"/>
+                  <a:pt x="10314498" y="1288745"/>
+                  <a:pt x="10369127" y="1526264"/>
+                </a:cubicBezTo>
+                <a:cubicBezTo>
+                  <a:pt x="10423756" y="1763784"/>
+                  <a:pt x="10327117" y="1881407"/>
+                  <a:pt x="10369127" y="2035019"/>
+                </a:cubicBezTo>
+                <a:cubicBezTo>
+                  <a:pt x="10411137" y="2188631"/>
+                  <a:pt x="10355173" y="2536947"/>
+                  <a:pt x="10369127" y="2677656"/>
+                </a:cubicBezTo>
+                <a:cubicBezTo>
+                  <a:pt x="10278688" y="2683945"/>
+                  <a:pt x="10215676" y="2668999"/>
+                  <a:pt x="10104138" y="2677656"/>
+                </a:cubicBezTo>
+                <a:cubicBezTo>
+                  <a:pt x="9992600" y="2686313"/>
+                  <a:pt x="9843989" y="2657846"/>
+                  <a:pt x="9735458" y="2677656"/>
+                </a:cubicBezTo>
+                <a:cubicBezTo>
+                  <a:pt x="9626927" y="2697466"/>
+                  <a:pt x="9458457" y="2646453"/>
+                  <a:pt x="9366778" y="2677656"/>
+                </a:cubicBezTo>
+                <a:cubicBezTo>
+                  <a:pt x="9275099" y="2708859"/>
+                  <a:pt x="8930340" y="2654726"/>
+                  <a:pt x="8790715" y="2677656"/>
+                </a:cubicBezTo>
+                <a:cubicBezTo>
+                  <a:pt x="8651090" y="2700586"/>
+                  <a:pt x="8632266" y="2675897"/>
+                  <a:pt x="8525727" y="2677656"/>
+                </a:cubicBezTo>
+                <a:cubicBezTo>
+                  <a:pt x="8419188" y="2679415"/>
+                  <a:pt x="8218506" y="2674219"/>
+                  <a:pt x="8053355" y="2677656"/>
+                </a:cubicBezTo>
+                <a:cubicBezTo>
+                  <a:pt x="7888204" y="2681093"/>
+                  <a:pt x="7871496" y="2647423"/>
+                  <a:pt x="7788367" y="2677656"/>
+                </a:cubicBezTo>
+                <a:cubicBezTo>
+                  <a:pt x="7705238" y="2707889"/>
+                  <a:pt x="7288969" y="2636352"/>
+                  <a:pt x="7108613" y="2677656"/>
+                </a:cubicBezTo>
+                <a:cubicBezTo>
+                  <a:pt x="6928257" y="2718960"/>
+                  <a:pt x="6679715" y="2661246"/>
+                  <a:pt x="6428859" y="2677656"/>
+                </a:cubicBezTo>
+                <a:cubicBezTo>
+                  <a:pt x="6178003" y="2694066"/>
+                  <a:pt x="6018517" y="2655742"/>
+                  <a:pt x="5852796" y="2677656"/>
+                </a:cubicBezTo>
+                <a:cubicBezTo>
+                  <a:pt x="5687075" y="2699570"/>
+                  <a:pt x="5497204" y="2668390"/>
+                  <a:pt x="5380425" y="2677656"/>
+                </a:cubicBezTo>
+                <a:cubicBezTo>
+                  <a:pt x="5263646" y="2686922"/>
+                  <a:pt x="4920517" y="2629043"/>
+                  <a:pt x="4804362" y="2677656"/>
+                </a:cubicBezTo>
+                <a:cubicBezTo>
+                  <a:pt x="4688207" y="2726269"/>
+                  <a:pt x="4425047" y="2631543"/>
+                  <a:pt x="4124608" y="2677656"/>
+                </a:cubicBezTo>
+                <a:cubicBezTo>
+                  <a:pt x="3824169" y="2723769"/>
+                  <a:pt x="3934064" y="2660902"/>
+                  <a:pt x="3755928" y="2677656"/>
+                </a:cubicBezTo>
+                <a:cubicBezTo>
+                  <a:pt x="3577792" y="2694410"/>
+                  <a:pt x="3510885" y="2634635"/>
+                  <a:pt x="3283557" y="2677656"/>
+                </a:cubicBezTo>
+                <a:cubicBezTo>
+                  <a:pt x="3056229" y="2720677"/>
+                  <a:pt x="2793178" y="2614895"/>
+                  <a:pt x="2500112" y="2677656"/>
+                </a:cubicBezTo>
+                <a:cubicBezTo>
+                  <a:pt x="2207046" y="2740417"/>
+                  <a:pt x="2308794" y="2644355"/>
+                  <a:pt x="2131432" y="2677656"/>
+                </a:cubicBezTo>
+                <a:cubicBezTo>
+                  <a:pt x="1954070" y="2710957"/>
+                  <a:pt x="1670550" y="2668210"/>
+                  <a:pt x="1347987" y="2677656"/>
+                </a:cubicBezTo>
+                <a:cubicBezTo>
+                  <a:pt x="1025424" y="2687102"/>
+                  <a:pt x="807086" y="2654412"/>
+                  <a:pt x="668233" y="2677656"/>
+                </a:cubicBezTo>
+                <a:cubicBezTo>
+                  <a:pt x="529380" y="2700900"/>
+                  <a:pt x="217167" y="2611650"/>
+                  <a:pt x="0" y="2677656"/>
+                </a:cubicBezTo>
+                <a:cubicBezTo>
+                  <a:pt x="-41031" y="2566207"/>
+                  <a:pt x="25101" y="2407884"/>
+                  <a:pt x="0" y="2222454"/>
+                </a:cubicBezTo>
+                <a:cubicBezTo>
+                  <a:pt x="-25101" y="2037024"/>
+                  <a:pt x="14988" y="1858909"/>
+                  <a:pt x="0" y="1767253"/>
+                </a:cubicBezTo>
+                <a:cubicBezTo>
+                  <a:pt x="-14988" y="1675597"/>
+                  <a:pt x="35492" y="1509954"/>
+                  <a:pt x="0" y="1312051"/>
+                </a:cubicBezTo>
+                <a:cubicBezTo>
+                  <a:pt x="-35492" y="1114148"/>
+                  <a:pt x="3729" y="1003602"/>
+                  <a:pt x="0" y="776520"/>
+                </a:cubicBezTo>
+                <a:cubicBezTo>
+                  <a:pt x="-3729" y="549438"/>
+                  <a:pt x="23033" y="303926"/>
                   <a:pt x="0" y="0"/>
                 </a:cubicBezTo>
                 <a:close/>
               </a:path>
-              <a:path w="10369127" h="2616101" stroke="0" extrusionOk="0">
+              <a:path w="10369127" h="2677656" stroke="0" extrusionOk="0">
                 <a:moveTo>
                   <a:pt x="0" y="0"/>
                 </a:moveTo>
@@ -9242,143 +9292,143 @@
                   <a:pt x="10369127" y="0"/>
                 </a:cubicBezTo>
                 <a:cubicBezTo>
-                  <a:pt x="10392972" y="159673"/>
-                  <a:pt x="10305696" y="366148"/>
-                  <a:pt x="10369127" y="549381"/>
-                </a:cubicBezTo>
-                <a:cubicBezTo>
-                  <a:pt x="10432558" y="732614"/>
-                  <a:pt x="10342643" y="988760"/>
-                  <a:pt x="10369127" y="1124923"/>
-                </a:cubicBezTo>
-                <a:cubicBezTo>
-                  <a:pt x="10395611" y="1261086"/>
-                  <a:pt x="10341026" y="1543797"/>
-                  <a:pt x="10369127" y="1674305"/>
-                </a:cubicBezTo>
-                <a:cubicBezTo>
-                  <a:pt x="10397228" y="1804813"/>
-                  <a:pt x="10331822" y="2026220"/>
-                  <a:pt x="10369127" y="2145203"/>
-                </a:cubicBezTo>
-                <a:cubicBezTo>
-                  <a:pt x="10406432" y="2264186"/>
-                  <a:pt x="10327383" y="2490374"/>
-                  <a:pt x="10369127" y="2616101"/>
-                </a:cubicBezTo>
-                <a:cubicBezTo>
-                  <a:pt x="10109786" y="2656189"/>
-                  <a:pt x="9848591" y="2566822"/>
-                  <a:pt x="9585682" y="2616101"/>
-                </a:cubicBezTo>
-                <a:cubicBezTo>
-                  <a:pt x="9322774" y="2665380"/>
-                  <a:pt x="9368773" y="2605700"/>
-                  <a:pt x="9217002" y="2616101"/>
-                </a:cubicBezTo>
-                <a:cubicBezTo>
-                  <a:pt x="9065231" y="2626502"/>
-                  <a:pt x="8815721" y="2540076"/>
-                  <a:pt x="8537248" y="2616101"/>
-                </a:cubicBezTo>
-                <a:cubicBezTo>
-                  <a:pt x="8258775" y="2692126"/>
-                  <a:pt x="8269206" y="2579982"/>
-                  <a:pt x="8168568" y="2616101"/>
-                </a:cubicBezTo>
-                <a:cubicBezTo>
-                  <a:pt x="8067930" y="2652220"/>
-                  <a:pt x="7844631" y="2550338"/>
-                  <a:pt x="7592505" y="2616101"/>
-                </a:cubicBezTo>
-                <a:cubicBezTo>
-                  <a:pt x="7340379" y="2681864"/>
-                  <a:pt x="7443389" y="2588965"/>
-                  <a:pt x="7327516" y="2616101"/>
-                </a:cubicBezTo>
-                <a:cubicBezTo>
-                  <a:pt x="7211643" y="2643237"/>
-                  <a:pt x="6705732" y="2548623"/>
-                  <a:pt x="6544071" y="2616101"/>
-                </a:cubicBezTo>
-                <a:cubicBezTo>
-                  <a:pt x="6382411" y="2683579"/>
-                  <a:pt x="6047781" y="2603679"/>
-                  <a:pt x="5760626" y="2616101"/>
-                </a:cubicBezTo>
-                <a:cubicBezTo>
-                  <a:pt x="5473472" y="2628523"/>
-                  <a:pt x="5348330" y="2603452"/>
-                  <a:pt x="5184564" y="2616101"/>
-                </a:cubicBezTo>
-                <a:cubicBezTo>
-                  <a:pt x="5020798" y="2628750"/>
-                  <a:pt x="4942767" y="2564251"/>
-                  <a:pt x="4712192" y="2616101"/>
-                </a:cubicBezTo>
-                <a:cubicBezTo>
-                  <a:pt x="4481617" y="2667951"/>
-                  <a:pt x="4362634" y="2544528"/>
-                  <a:pt x="4032438" y="2616101"/>
-                </a:cubicBezTo>
-                <a:cubicBezTo>
-                  <a:pt x="3702242" y="2687674"/>
-                  <a:pt x="3569148" y="2567385"/>
-                  <a:pt x="3248993" y="2616101"/>
-                </a:cubicBezTo>
-                <a:cubicBezTo>
-                  <a:pt x="2928839" y="2664817"/>
-                  <a:pt x="2956540" y="2610508"/>
-                  <a:pt x="2672931" y="2616101"/>
-                </a:cubicBezTo>
-                <a:cubicBezTo>
-                  <a:pt x="2389322" y="2621694"/>
-                  <a:pt x="2342801" y="2589831"/>
-                  <a:pt x="2200559" y="2616101"/>
-                </a:cubicBezTo>
-                <a:cubicBezTo>
-                  <a:pt x="2058317" y="2642371"/>
-                  <a:pt x="1886748" y="2583899"/>
-                  <a:pt x="1624497" y="2616101"/>
-                </a:cubicBezTo>
-                <a:cubicBezTo>
-                  <a:pt x="1362246" y="2648303"/>
-                  <a:pt x="1093629" y="2547674"/>
-                  <a:pt x="841051" y="2616101"/>
-                </a:cubicBezTo>
-                <a:cubicBezTo>
-                  <a:pt x="588473" y="2684528"/>
-                  <a:pt x="645737" y="2604359"/>
-                  <a:pt x="576063" y="2616101"/>
-                </a:cubicBezTo>
-                <a:cubicBezTo>
-                  <a:pt x="506389" y="2627843"/>
-                  <a:pt x="176466" y="2570204"/>
-                  <a:pt x="0" y="2616101"/>
-                </a:cubicBezTo>
-                <a:cubicBezTo>
-                  <a:pt x="-11534" y="2489610"/>
-                  <a:pt x="6469" y="2343176"/>
-                  <a:pt x="0" y="2092881"/>
-                </a:cubicBezTo>
-                <a:cubicBezTo>
-                  <a:pt x="-6469" y="1842586"/>
-                  <a:pt x="12000" y="1728410"/>
-                  <a:pt x="0" y="1569661"/>
-                </a:cubicBezTo>
-                <a:cubicBezTo>
-                  <a:pt x="-12000" y="1410912"/>
-                  <a:pt x="17363" y="1334200"/>
-                  <a:pt x="0" y="1098762"/>
-                </a:cubicBezTo>
-                <a:cubicBezTo>
-                  <a:pt x="-17363" y="863324"/>
-                  <a:pt x="33872" y="679504"/>
-                  <a:pt x="0" y="549381"/>
-                </a:cubicBezTo>
-                <a:cubicBezTo>
-                  <a:pt x="-33872" y="419258"/>
-                  <a:pt x="8053" y="121503"/>
+                  <a:pt x="10385146" y="167961"/>
+                  <a:pt x="10345465" y="314740"/>
+                  <a:pt x="10369127" y="562308"/>
+                </a:cubicBezTo>
+                <a:cubicBezTo>
+                  <a:pt x="10392789" y="809876"/>
+                  <a:pt x="10353355" y="873629"/>
+                  <a:pt x="10369127" y="1151392"/>
+                </a:cubicBezTo>
+                <a:cubicBezTo>
+                  <a:pt x="10384899" y="1429155"/>
+                  <a:pt x="10348029" y="1553772"/>
+                  <a:pt x="10369127" y="1713700"/>
+                </a:cubicBezTo>
+                <a:cubicBezTo>
+                  <a:pt x="10390225" y="1873628"/>
+                  <a:pt x="10320548" y="2074691"/>
+                  <a:pt x="10369127" y="2195678"/>
+                </a:cubicBezTo>
+                <a:cubicBezTo>
+                  <a:pt x="10417706" y="2316665"/>
+                  <a:pt x="10312423" y="2554963"/>
+                  <a:pt x="10369127" y="2677656"/>
+                </a:cubicBezTo>
+                <a:cubicBezTo>
+                  <a:pt x="10109786" y="2717744"/>
+                  <a:pt x="9848591" y="2628377"/>
+                  <a:pt x="9585682" y="2677656"/>
+                </a:cubicBezTo>
+                <a:cubicBezTo>
+                  <a:pt x="9322774" y="2726935"/>
+                  <a:pt x="9368773" y="2667255"/>
+                  <a:pt x="9217002" y="2677656"/>
+                </a:cubicBezTo>
+                <a:cubicBezTo>
+                  <a:pt x="9065231" y="2688057"/>
+                  <a:pt x="8815721" y="2601631"/>
+                  <a:pt x="8537248" y="2677656"/>
+                </a:cubicBezTo>
+                <a:cubicBezTo>
+                  <a:pt x="8258775" y="2753681"/>
+                  <a:pt x="8269206" y="2641537"/>
+                  <a:pt x="8168568" y="2677656"/>
+                </a:cubicBezTo>
+                <a:cubicBezTo>
+                  <a:pt x="8067930" y="2713775"/>
+                  <a:pt x="7844631" y="2611893"/>
+                  <a:pt x="7592505" y="2677656"/>
+                </a:cubicBezTo>
+                <a:cubicBezTo>
+                  <a:pt x="7340379" y="2743419"/>
+                  <a:pt x="7443389" y="2650520"/>
+                  <a:pt x="7327516" y="2677656"/>
+                </a:cubicBezTo>
+                <a:cubicBezTo>
+                  <a:pt x="7211643" y="2704792"/>
+                  <a:pt x="6705732" y="2610178"/>
+                  <a:pt x="6544071" y="2677656"/>
+                </a:cubicBezTo>
+                <a:cubicBezTo>
+                  <a:pt x="6382411" y="2745134"/>
+                  <a:pt x="6047781" y="2665234"/>
+                  <a:pt x="5760626" y="2677656"/>
+                </a:cubicBezTo>
+                <a:cubicBezTo>
+                  <a:pt x="5473472" y="2690078"/>
+                  <a:pt x="5348330" y="2665007"/>
+                  <a:pt x="5184564" y="2677656"/>
+                </a:cubicBezTo>
+                <a:cubicBezTo>
+                  <a:pt x="5020798" y="2690305"/>
+                  <a:pt x="4942767" y="2625806"/>
+                  <a:pt x="4712192" y="2677656"/>
+                </a:cubicBezTo>
+                <a:cubicBezTo>
+                  <a:pt x="4481617" y="2729506"/>
+                  <a:pt x="4362634" y="2606083"/>
+                  <a:pt x="4032438" y="2677656"/>
+                </a:cubicBezTo>
+                <a:cubicBezTo>
+                  <a:pt x="3702242" y="2749229"/>
+                  <a:pt x="3569148" y="2628940"/>
+                  <a:pt x="3248993" y="2677656"/>
+                </a:cubicBezTo>
+                <a:cubicBezTo>
+                  <a:pt x="2928839" y="2726372"/>
+                  <a:pt x="2956540" y="2672063"/>
+                  <a:pt x="2672931" y="2677656"/>
+                </a:cubicBezTo>
+                <a:cubicBezTo>
+                  <a:pt x="2389322" y="2683249"/>
+                  <a:pt x="2342801" y="2651386"/>
+                  <a:pt x="2200559" y="2677656"/>
+                </a:cubicBezTo>
+                <a:cubicBezTo>
+                  <a:pt x="2058317" y="2703926"/>
+                  <a:pt x="1886748" y="2645454"/>
+                  <a:pt x="1624497" y="2677656"/>
+                </a:cubicBezTo>
+                <a:cubicBezTo>
+                  <a:pt x="1362246" y="2709858"/>
+                  <a:pt x="1093629" y="2609229"/>
+                  <a:pt x="841051" y="2677656"/>
+                </a:cubicBezTo>
+                <a:cubicBezTo>
+                  <a:pt x="588473" y="2746083"/>
+                  <a:pt x="645737" y="2665914"/>
+                  <a:pt x="576063" y="2677656"/>
+                </a:cubicBezTo>
+                <a:cubicBezTo>
+                  <a:pt x="506389" y="2689398"/>
+                  <a:pt x="176466" y="2631759"/>
+                  <a:pt x="0" y="2677656"/>
+                </a:cubicBezTo>
+                <a:cubicBezTo>
+                  <a:pt x="-11517" y="2513366"/>
+                  <a:pt x="27249" y="2264686"/>
+                  <a:pt x="0" y="2142125"/>
+                </a:cubicBezTo>
+                <a:cubicBezTo>
+                  <a:pt x="-27249" y="2019564"/>
+                  <a:pt x="20335" y="1809639"/>
+                  <a:pt x="0" y="1606594"/>
+                </a:cubicBezTo>
+                <a:cubicBezTo>
+                  <a:pt x="-20335" y="1403549"/>
+                  <a:pt x="6812" y="1266381"/>
+                  <a:pt x="0" y="1124616"/>
+                </a:cubicBezTo>
+                <a:cubicBezTo>
+                  <a:pt x="-6812" y="982851"/>
+                  <a:pt x="42263" y="827101"/>
+                  <a:pt x="0" y="562308"/>
+                </a:cubicBezTo>
+                <a:cubicBezTo>
+                  <a:pt x="-42263" y="297515"/>
+                  <a:pt x="11573" y="217329"/>
                   <a:pt x="0" y="0"/>
                 </a:cubicBezTo>
                 <a:close/>
@@ -9414,7 +9464,7 @@
           <a:p>
             <a:pPr algn="ctr"/>
             <a:r>
-              <a:rPr lang="en-US" sz="4400" b="1" dirty="0"/>
+              <a:rPr lang="en-US" sz="4800" b="1" dirty="0"/>
               <a:t>Acknowledgements</a:t>
             </a:r>
           </a:p>
@@ -9426,13 +9476,13 @@
             </a:r>
             <a:r>
               <a:rPr lang="en-US" sz="4000" b="1" dirty="0" err="1">
-                <a:hlinkClick r:id="rId17"/>
+                <a:hlinkClick r:id="rId20"/>
               </a:rPr>
               <a:t>Zihuan</a:t>
             </a:r>
             <a:r>
               <a:rPr lang="en-US" sz="4000" b="1" dirty="0">
-                <a:hlinkClick r:id="rId17"/>
+                <a:hlinkClick r:id="rId20"/>
               </a:rPr>
               <a:t> Cao </a:t>
             </a:r>
@@ -9442,13 +9492,13 @@
             </a:r>
             <a:r>
               <a:rPr lang="en-US" sz="4000" b="1" dirty="0">
-                <a:hlinkClick r:id="rId18"/>
+                <a:hlinkClick r:id="rId21"/>
               </a:rPr>
               <a:t>Jay Plourde</a:t>
             </a:r>
             <a:r>
               <a:rPr lang="en-US" sz="4000" dirty="0">
-                <a:hlinkClick r:id="rId18"/>
+                <a:hlinkClick r:id="rId21"/>
               </a:rPr>
               <a:t> </a:t>
             </a:r>

</xml_diff>

<commit_message>
Updated some slides and added Lab 8 data
</commit_message>
<xml_diff>
--- a/Poster/Regression Lab Poster.pptx
+++ b/Poster/Regression Lab Poster.pptx
@@ -243,7 +243,7 @@
           <a:p>
             <a:fld id="{49A02A90-E5B2-4178-83FD-9ED89742CA66}" type="datetimeFigureOut">
               <a:rPr lang="en-US" smtClean="0"/>
-              <a:t>1/15/2025</a:t>
+              <a:t>1/17/2025</a:t>
             </a:fld>
             <a:endParaRPr lang="en-US"/>
           </a:p>
@@ -413,7 +413,7 @@
           <a:p>
             <a:fld id="{49A02A90-E5B2-4178-83FD-9ED89742CA66}" type="datetimeFigureOut">
               <a:rPr lang="en-US" smtClean="0"/>
-              <a:t>1/15/2025</a:t>
+              <a:t>1/17/2025</a:t>
             </a:fld>
             <a:endParaRPr lang="en-US"/>
           </a:p>
@@ -593,7 +593,7 @@
           <a:p>
             <a:fld id="{49A02A90-E5B2-4178-83FD-9ED89742CA66}" type="datetimeFigureOut">
               <a:rPr lang="en-US" smtClean="0"/>
-              <a:t>1/15/2025</a:t>
+              <a:t>1/17/2025</a:t>
             </a:fld>
             <a:endParaRPr lang="en-US"/>
           </a:p>
@@ -763,7 +763,7 @@
           <a:p>
             <a:fld id="{49A02A90-E5B2-4178-83FD-9ED89742CA66}" type="datetimeFigureOut">
               <a:rPr lang="en-US" smtClean="0"/>
-              <a:t>1/15/2025</a:t>
+              <a:t>1/17/2025</a:t>
             </a:fld>
             <a:endParaRPr lang="en-US"/>
           </a:p>
@@ -1007,7 +1007,7 @@
           <a:p>
             <a:fld id="{49A02A90-E5B2-4178-83FD-9ED89742CA66}" type="datetimeFigureOut">
               <a:rPr lang="en-US" smtClean="0"/>
-              <a:t>1/15/2025</a:t>
+              <a:t>1/17/2025</a:t>
             </a:fld>
             <a:endParaRPr lang="en-US"/>
           </a:p>
@@ -1239,7 +1239,7 @@
           <a:p>
             <a:fld id="{49A02A90-E5B2-4178-83FD-9ED89742CA66}" type="datetimeFigureOut">
               <a:rPr lang="en-US" smtClean="0"/>
-              <a:t>1/15/2025</a:t>
+              <a:t>1/17/2025</a:t>
             </a:fld>
             <a:endParaRPr lang="en-US"/>
           </a:p>
@@ -1606,7 +1606,7 @@
           <a:p>
             <a:fld id="{49A02A90-E5B2-4178-83FD-9ED89742CA66}" type="datetimeFigureOut">
               <a:rPr lang="en-US" smtClean="0"/>
-              <a:t>1/15/2025</a:t>
+              <a:t>1/17/2025</a:t>
             </a:fld>
             <a:endParaRPr lang="en-US"/>
           </a:p>
@@ -1724,7 +1724,7 @@
           <a:p>
             <a:fld id="{49A02A90-E5B2-4178-83FD-9ED89742CA66}" type="datetimeFigureOut">
               <a:rPr lang="en-US" smtClean="0"/>
-              <a:t>1/15/2025</a:t>
+              <a:t>1/17/2025</a:t>
             </a:fld>
             <a:endParaRPr lang="en-US"/>
           </a:p>
@@ -1819,7 +1819,7 @@
           <a:p>
             <a:fld id="{49A02A90-E5B2-4178-83FD-9ED89742CA66}" type="datetimeFigureOut">
               <a:rPr lang="en-US" smtClean="0"/>
-              <a:t>1/15/2025</a:t>
+              <a:t>1/17/2025</a:t>
             </a:fld>
             <a:endParaRPr lang="en-US"/>
           </a:p>
@@ -2096,7 +2096,7 @@
           <a:p>
             <a:fld id="{49A02A90-E5B2-4178-83FD-9ED89742CA66}" type="datetimeFigureOut">
               <a:rPr lang="en-US" smtClean="0"/>
-              <a:t>1/15/2025</a:t>
+              <a:t>1/17/2025</a:t>
             </a:fld>
             <a:endParaRPr lang="en-US"/>
           </a:p>
@@ -2353,7 +2353,7 @@
           <a:p>
             <a:fld id="{49A02A90-E5B2-4178-83FD-9ED89742CA66}" type="datetimeFigureOut">
               <a:rPr lang="en-US" smtClean="0"/>
-              <a:t>1/15/2025</a:t>
+              <a:t>1/17/2025</a:t>
             </a:fld>
             <a:endParaRPr lang="en-US"/>
           </a:p>
@@ -2566,7 +2566,7 @@
           <a:p>
             <a:fld id="{49A02A90-E5B2-4178-83FD-9ED89742CA66}" type="datetimeFigureOut">
               <a:rPr lang="en-US" smtClean="0"/>
-              <a:t>1/15/2025</a:t>
+              <a:t>1/17/2025</a:t>
             </a:fld>
             <a:endParaRPr lang="en-US"/>
           </a:p>
@@ -4408,7 +4408,7 @@
             </a:pPr>
             <a:r>
               <a:rPr lang="en-US" sz="4400" dirty="0"/>
-              <a:t>To view the desired lab  presentation, simply click on the ellipses! </a:t>
+              <a:t>To open Lab presentations, simply click on the ellipses! </a:t>
             </a:r>
           </a:p>
           <a:p>
@@ -4452,7 +4452,7 @@
             </a:r>
             <a:r>
               <a:rPr lang="en-US" sz="4400" dirty="0"/>
-              <a:t> you can download all files and view the slides without internet (extract all files, go to </a:t>
+              <a:t> to download all files and view the slides without internet (extract all files, go to </a:t>
             </a:r>
             <a:r>
               <a:rPr lang="en-US" sz="4400" b="1" dirty="0"/>
@@ -4460,7 +4460,7 @@
             </a:r>
             <a:r>
               <a:rPr lang="en-US" sz="4400" dirty="0"/>
-              <a:t>and click on the </a:t>
+              <a:t>folder and click on the </a:t>
             </a:r>
             <a:r>
               <a:rPr lang="en-US" sz="4400" b="1" dirty="0"/>
@@ -4468,15 +4468,7 @@
             </a:r>
             <a:r>
               <a:rPr lang="en-US" sz="4400" dirty="0"/>
-              <a:t>file</a:t>
-            </a:r>
-            <a:r>
-              <a:rPr lang="en-US" sz="4400" b="1" dirty="0"/>
-              <a:t> </a:t>
-            </a:r>
-            <a:r>
-              <a:rPr lang="en-US" sz="4400" dirty="0"/>
-              <a:t>corresponding to the desired lab).</a:t>
+              <a:t>file of a Lab).</a:t>
             </a:r>
           </a:p>
           <a:p>
@@ -4486,15 +4478,23 @@
             </a:pPr>
             <a:r>
               <a:rPr lang="en-US" sz="4400" dirty="0"/>
-              <a:t>Raw lab code can (.</a:t>
-            </a:r>
-            <a:r>
-              <a:rPr lang="en-US" sz="4400" dirty="0" err="1"/>
+              <a:t>Raw Lab code can (</a:t>
+            </a:r>
+            <a:r>
+              <a:rPr lang="en-US" sz="4400" b="1" dirty="0"/>
+              <a:t>.</a:t>
+            </a:r>
+            <a:r>
+              <a:rPr lang="en-US" sz="4400" b="1" dirty="0" err="1"/>
               <a:t>Rmd</a:t>
             </a:r>
             <a:r>
+              <a:rPr lang="en-US" sz="4400" b="1" dirty="0"/>
+              <a:t> </a:t>
+            </a:r>
+            <a:r>
               <a:rPr lang="en-US" sz="4400" dirty="0"/>
-              <a:t> files) be found </a:t>
+              <a:t>files) be found </a:t>
             </a:r>
             <a:r>
               <a:rPr lang="en-US" sz="4400" dirty="0">
@@ -4558,7 +4558,15 @@
             </a:pPr>
             <a:r>
               <a:rPr lang="en-US" sz="4400" dirty="0"/>
-              <a:t>See </a:t>
+              <a:t>Find out more about slides in Quarto using </a:t>
+            </a:r>
+            <a:r>
+              <a:rPr lang="en-US" sz="4400" dirty="0" err="1"/>
+              <a:t>Revealjs</a:t>
+            </a:r>
+            <a:r>
+              <a:rPr lang="en-US" sz="4400" dirty="0"/>
+              <a:t> </a:t>
             </a:r>
             <a:r>
               <a:rPr lang="en-US" sz="4400" dirty="0">
@@ -4568,15 +4576,7 @@
             </a:r>
             <a:r>
               <a:rPr lang="en-US" sz="4400" dirty="0"/>
-              <a:t> to find out more about slides in Quarto using </a:t>
-            </a:r>
-            <a:r>
-              <a:rPr lang="en-US" sz="4400" dirty="0" err="1"/>
-              <a:t>Revealjs</a:t>
-            </a:r>
-            <a:r>
-              <a:rPr lang="en-US" sz="4400" dirty="0"/>
-              <a:t> </a:t>
+              <a:t>! </a:t>
             </a:r>
           </a:p>
         </p:txBody>
@@ -6312,8 +6312,48 @@
                 <a:ea typeface="+mn-ea"/>
                 <a:cs typeface="+mn-cs"/>
               </a:rPr>
-              <a:t>Quadratic regression and non-linear alternatives</a:t>
-            </a:r>
+              <a:t>Quadratic Regression and Non-linear </a:t>
+            </a:r>
+            <a:r>
+              <a:rPr lang="en-US" sz="3600" dirty="0">
+                <a:solidFill>
+                  <a:prstClr val="black"/>
+                </a:solidFill>
+                <a:latin typeface="Calibri" panose="020F0502020204030204"/>
+              </a:rPr>
+              <a:t>A</a:t>
+            </a:r>
+            <a:r>
+              <a:rPr kumimoji="0" lang="en-US" sz="3600" b="0" i="0" u="none" strike="noStrike" kern="1200" cap="none" spc="0" normalizeH="0" baseline="0" noProof="0" dirty="0" err="1">
+                <a:ln>
+                  <a:noFill/>
+                </a:ln>
+                <a:solidFill>
+                  <a:prstClr val="black"/>
+                </a:solidFill>
+                <a:effectLst/>
+                <a:uLnTx/>
+                <a:uFillTx/>
+                <a:latin typeface="Calibri" panose="020F0502020204030204"/>
+                <a:ea typeface="+mn-ea"/>
+                <a:cs typeface="+mn-cs"/>
+              </a:rPr>
+              <a:t>lternatives</a:t>
+            </a:r>
+            <a:endParaRPr kumimoji="0" lang="en-US" sz="3600" b="0" i="0" u="none" strike="noStrike" kern="1200" cap="none" spc="0" normalizeH="0" baseline="0" noProof="0" dirty="0">
+              <a:ln>
+                <a:noFill/>
+              </a:ln>
+              <a:solidFill>
+                <a:prstClr val="black"/>
+              </a:solidFill>
+              <a:effectLst/>
+              <a:uLnTx/>
+              <a:uFillTx/>
+              <a:latin typeface="Calibri" panose="020F0502020204030204"/>
+              <a:ea typeface="+mn-ea"/>
+              <a:cs typeface="+mn-cs"/>
+            </a:endParaRPr>
           </a:p>
         </p:txBody>
       </p:sp>
@@ -6572,8 +6612,91 @@
                 <a:ea typeface="+mn-ea"/>
                 <a:cs typeface="+mn-cs"/>
               </a:rPr>
-              <a:t> between continuous variables</a:t>
-            </a:r>
+              <a:t> Between </a:t>
+            </a:r>
+            <a:r>
+              <a:rPr lang="en-US" sz="3600" dirty="0">
+                <a:solidFill>
+                  <a:prstClr val="black"/>
+                </a:solidFill>
+                <a:latin typeface="Calibri" panose="020F0502020204030204"/>
+              </a:rPr>
+              <a:t>C</a:t>
+            </a:r>
+            <a:r>
+              <a:rPr kumimoji="0" lang="en-US" sz="3600" b="0" i="0" u="none" strike="noStrike" kern="1200" cap="none" spc="0" normalizeH="0" baseline="0" noProof="0" dirty="0" err="1">
+                <a:ln>
+                  <a:noFill/>
+                </a:ln>
+                <a:solidFill>
+                  <a:prstClr val="black"/>
+                </a:solidFill>
+                <a:effectLst/>
+                <a:uLnTx/>
+                <a:uFillTx/>
+                <a:latin typeface="Calibri" panose="020F0502020204030204"/>
+                <a:ea typeface="+mn-ea"/>
+                <a:cs typeface="+mn-cs"/>
+              </a:rPr>
+              <a:t>ontinuous</a:t>
+            </a:r>
+            <a:r>
+              <a:rPr kumimoji="0" lang="en-US" sz="3600" b="0" i="0" u="none" strike="noStrike" kern="1200" cap="none" spc="0" normalizeH="0" baseline="0" noProof="0" dirty="0">
+                <a:ln>
+                  <a:noFill/>
+                </a:ln>
+                <a:solidFill>
+                  <a:prstClr val="black"/>
+                </a:solidFill>
+                <a:effectLst/>
+                <a:uLnTx/>
+                <a:uFillTx/>
+                <a:latin typeface="Calibri" panose="020F0502020204030204"/>
+                <a:ea typeface="+mn-ea"/>
+                <a:cs typeface="+mn-cs"/>
+              </a:rPr>
+              <a:t> </a:t>
+            </a:r>
+            <a:r>
+              <a:rPr lang="en-US" sz="3600" dirty="0">
+                <a:solidFill>
+                  <a:prstClr val="black"/>
+                </a:solidFill>
+                <a:latin typeface="Calibri" panose="020F0502020204030204"/>
+              </a:rPr>
+              <a:t>V</a:t>
+            </a:r>
+            <a:r>
+              <a:rPr kumimoji="0" lang="en-US" sz="3600" b="0" i="0" u="none" strike="noStrike" kern="1200" cap="none" spc="0" normalizeH="0" baseline="0" noProof="0" dirty="0" err="1">
+                <a:ln>
+                  <a:noFill/>
+                </a:ln>
+                <a:solidFill>
+                  <a:prstClr val="black"/>
+                </a:solidFill>
+                <a:effectLst/>
+                <a:uLnTx/>
+                <a:uFillTx/>
+                <a:latin typeface="Calibri" panose="020F0502020204030204"/>
+                <a:ea typeface="+mn-ea"/>
+                <a:cs typeface="+mn-cs"/>
+              </a:rPr>
+              <a:t>ariables</a:t>
+            </a:r>
+            <a:endParaRPr kumimoji="0" lang="en-US" sz="3600" b="0" i="0" u="none" strike="noStrike" kern="1200" cap="none" spc="0" normalizeH="0" baseline="0" noProof="0" dirty="0">
+              <a:ln>
+                <a:noFill/>
+              </a:ln>
+              <a:solidFill>
+                <a:prstClr val="black"/>
+              </a:solidFill>
+              <a:effectLst/>
+              <a:uLnTx/>
+              <a:uFillTx/>
+              <a:latin typeface="Calibri" panose="020F0502020204030204"/>
+              <a:ea typeface="+mn-ea"/>
+              <a:cs typeface="+mn-cs"/>
+            </a:endParaRPr>
           </a:p>
         </p:txBody>
       </p:sp>
@@ -7144,7 +7267,7 @@
                 <a:ea typeface="+mn-ea"/>
                 <a:cs typeface="+mn-cs"/>
               </a:rPr>
-              <a:t>Categorical  Interactions variable and ANOVA equivalence</a:t>
+              <a:t>Categorical Variables  Interactions and ANOVA Equivalence</a:t>
             </a:r>
           </a:p>
         </p:txBody>
@@ -8350,7 +8473,7 @@
         <p:spPr>
           <a:xfrm>
             <a:off x="37078319" y="7107564"/>
-            <a:ext cx="0" cy="4231397"/>
+            <a:ext cx="99083" cy="4142327"/>
           </a:xfrm>
           <a:prstGeom prst="line">
             <a:avLst/>
@@ -8395,8 +8518,8 @@
         </p:nvCxnSpPr>
         <p:spPr>
           <a:xfrm>
-            <a:off x="39986593" y="9788251"/>
-            <a:ext cx="114118" cy="5459176"/>
+            <a:off x="40001628" y="9725891"/>
+            <a:ext cx="99083" cy="5521536"/>
           </a:xfrm>
           <a:prstGeom prst="line">
             <a:avLst/>

</xml_diff>